<commit_message>
Purview Trainer Deck Updates
</commit_message>
<xml_diff>
--- a/Whiteboard design session/WDS trainer presentation - Azure Synapse Analytics and AI.pptx
+++ b/Whiteboard design session/WDS trainer presentation - Azure Synapse Analytics and AI.pptx
@@ -6,7 +6,7 @@
     <p:sldMasterId id="2147483665" r:id="rId5"/>
   </p:sldMasterIdLst>
   <p:notesMasterIdLst>
-    <p:notesMasterId r:id="rId45"/>
+    <p:notesMasterId r:id="rId47"/>
   </p:notesMasterIdLst>
   <p:sldIdLst>
     <p:sldId id="300" r:id="rId6"/>
@@ -40,14 +40,16 @@
     <p:sldId id="339" r:id="rId34"/>
     <p:sldId id="340" r:id="rId35"/>
     <p:sldId id="341" r:id="rId36"/>
-    <p:sldId id="319" r:id="rId37"/>
-    <p:sldId id="342" r:id="rId38"/>
-    <p:sldId id="343" r:id="rId39"/>
-    <p:sldId id="344" r:id="rId40"/>
-    <p:sldId id="348" r:id="rId41"/>
-    <p:sldId id="349" r:id="rId42"/>
-    <p:sldId id="318" r:id="rId43"/>
-    <p:sldId id="315" r:id="rId44"/>
+    <p:sldId id="350" r:id="rId37"/>
+    <p:sldId id="319" r:id="rId38"/>
+    <p:sldId id="342" r:id="rId39"/>
+    <p:sldId id="343" r:id="rId40"/>
+    <p:sldId id="351" r:id="rId41"/>
+    <p:sldId id="344" r:id="rId42"/>
+    <p:sldId id="348" r:id="rId43"/>
+    <p:sldId id="349" r:id="rId44"/>
+    <p:sldId id="318" r:id="rId45"/>
+    <p:sldId id="315" r:id="rId46"/>
   </p:sldIdLst>
   <p:sldSz cx="12192000" cy="6858000"/>
   <p:notesSz cx="6858000" cy="9144000"/>
@@ -236,7 +238,7 @@
           <a:p>
             <a:fld id="{52A13B17-C506-4D51-BB37-16B365906619}" type="datetimeFigureOut">
               <a:rPr lang="en-US" smtClean="0"/>
-              <a:t>10/7/2020</a:t>
+              <a:t>2021-06-09</a:t>
             </a:fld>
             <a:endParaRPr lang="en-US" dirty="0"/>
           </a:p>
@@ -691,124 +693,116 @@
           <a:bodyPr/>
           <a:lstStyle/>
           <a:p>
-            <a:r>
-              <a:rPr lang="en-US" sz="1200" b="0" kern="1200" dirty="0">
-                <a:solidFill>
-                  <a:schemeClr val="tx1"/>
+            <a:pPr marL="228600" indent="-228600" algn="l">
+              <a:buFont typeface="+mj-lt"/>
+              <a:buAutoNum type="arabicPeriod" startAt="5"/>
+            </a:pPr>
+            <a:r>
+              <a:rPr lang="en-US" b="0" i="0" dirty="0">
+                <a:solidFill>
+                  <a:srgbClr val="24292E"/>
                 </a:solidFill>
                 <a:effectLst/>
-                <a:latin typeface="+mn-lt"/>
-                <a:ea typeface="+mn-ea"/>
-                <a:cs typeface="+mn-cs"/>
-              </a:rPr>
-              <a:t>5. Minimize the number of disparate services they use across ingest, transformation, querying and storage, so that teams of data engineers, data scientists and database administrators can master one tool, and can build shared best practices for development, management and monitoring.</a:t>
-            </a:r>
-          </a:p>
-          <a:p>
-            <a:br>
-              <a:rPr lang="en-US" sz="1200" b="0" kern="1200" dirty="0">
-                <a:solidFill>
-                  <a:schemeClr val="tx1"/>
+                <a:latin typeface="-apple-system"/>
+              </a:rPr>
+              <a:t>Enhanced ability to discovery data using business or technical terms for business analysts.</a:t>
+            </a:r>
+          </a:p>
+          <a:p>
+            <a:pPr marL="228600" indent="-228600" algn="l">
+              <a:buFont typeface="+mj-lt"/>
+              <a:buAutoNum type="arabicPeriod" startAt="5"/>
+            </a:pPr>
+            <a:r>
+              <a:rPr lang="en-US" b="0" i="0" dirty="0">
+                <a:solidFill>
+                  <a:srgbClr val="24292E"/>
                 </a:solidFill>
                 <a:effectLst/>
-                <a:latin typeface="+mn-lt"/>
-                <a:ea typeface="+mn-ea"/>
-                <a:cs typeface="+mn-cs"/>
-              </a:rPr>
-            </a:br>
-            <a:r>
-              <a:rPr lang="en-US" sz="1200" b="0" kern="1200" dirty="0">
-                <a:solidFill>
-                  <a:schemeClr val="tx1"/>
+                <a:latin typeface="-apple-system"/>
+              </a:rPr>
+              <a:t>Minimize the number of disparate services they use across ingest, transformation, querying and storage, so that teams of data engineers, data scientists and database administrators can master one tool, and can build shared best practices for development, management and monitoring.</a:t>
+            </a:r>
+          </a:p>
+          <a:p>
+            <a:pPr marL="228600" indent="-228600" algn="l">
+              <a:buFont typeface="+mj-lt"/>
+              <a:buAutoNum type="arabicPeriod" startAt="5"/>
+            </a:pPr>
+            <a:r>
+              <a:rPr lang="en-US" b="0" i="0" dirty="0">
+                <a:solidFill>
+                  <a:srgbClr val="24292E"/>
                 </a:solidFill>
                 <a:effectLst/>
-                <a:latin typeface="+mn-lt"/>
-                <a:ea typeface="+mn-ea"/>
-                <a:cs typeface="+mn-cs"/>
-              </a:rPr>
-              <a:t>6. Work within a single collaborative environment.</a:t>
-            </a:r>
-          </a:p>
-          <a:p>
-            <a:br>
-              <a:rPr lang="en-US" sz="1200" b="0" kern="1200" dirty="0">
-                <a:solidFill>
-                  <a:schemeClr val="tx1"/>
+                <a:latin typeface="-apple-system"/>
+              </a:rPr>
+              <a:t>Work within a single collaborative environment.</a:t>
+            </a:r>
+          </a:p>
+          <a:p>
+            <a:pPr marL="228600" indent="-228600" algn="l">
+              <a:buFont typeface="+mj-lt"/>
+              <a:buAutoNum type="arabicPeriod" startAt="5"/>
+            </a:pPr>
+            <a:r>
+              <a:rPr lang="en-US" b="0" i="0" dirty="0">
+                <a:solidFill>
+                  <a:srgbClr val="24292E"/>
                 </a:solidFill>
                 <a:effectLst/>
-                <a:latin typeface="+mn-lt"/>
-                <a:ea typeface="+mn-ea"/>
-                <a:cs typeface="+mn-cs"/>
-              </a:rPr>
-            </a:br>
-            <a:r>
-              <a:rPr lang="en-US" sz="1200" b="0" kern="1200" dirty="0">
-                <a:solidFill>
-                  <a:schemeClr val="tx1"/>
+                <a:latin typeface="-apple-system"/>
+              </a:rPr>
+              <a:t>Concerned about performance, must make sure core approaches for best performance of the solution are well understood.</a:t>
+            </a:r>
+          </a:p>
+          <a:p>
+            <a:pPr marL="228600" indent="-228600" algn="l">
+              <a:buFont typeface="+mj-lt"/>
+              <a:buAutoNum type="arabicPeriod" startAt="5"/>
+            </a:pPr>
+            <a:r>
+              <a:rPr lang="en-US" b="0" i="0" dirty="0">
+                <a:solidFill>
+                  <a:srgbClr val="24292E"/>
                 </a:solidFill>
                 <a:effectLst/>
-                <a:latin typeface="+mn-lt"/>
-                <a:ea typeface="+mn-ea"/>
-                <a:cs typeface="+mn-cs"/>
-              </a:rPr>
-              <a:t>7. Concerned about performance, must make sure core approaches for best performance of the solution are well understood.</a:t>
-            </a:r>
-          </a:p>
-          <a:p>
-            <a:pPr marL="0" marR="0" lvl="0" indent="0" algn="l" defTabSz="914400" rtl="0" eaLnBrk="1" fontAlgn="auto" latinLnBrk="0" hangingPunct="1">
-              <a:lnSpc>
-                <a:spcPct val="100000"/>
-              </a:lnSpc>
-              <a:spcBef>
-                <a:spcPts val="0"/>
-              </a:spcBef>
-              <a:spcAft>
-                <a:spcPts val="0"/>
-              </a:spcAft>
-              <a:buClrTx/>
-              <a:buSzTx/>
-              <a:buFontTx/>
-              <a:buNone/>
-              <a:tabLst/>
-              <a:defRPr/>
+                <a:latin typeface="-apple-system"/>
+              </a:rPr>
+              <a:t>Worried about the side effects of data centralization. Data governance, regulatory compliance risks have to be managed.</a:t>
+            </a:r>
+          </a:p>
+          <a:p>
+            <a:pPr marL="228600" indent="-228600" algn="l">
+              <a:buFont typeface="+mj-lt"/>
+              <a:buAutoNum type="arabicPeriod" startAt="5"/>
             </a:pPr>
-            <a:br>
-              <a:rPr lang="en-US" sz="1200" b="0" kern="1200" dirty="0">
-                <a:solidFill>
-                  <a:schemeClr val="tx1"/>
+            <a:r>
+              <a:rPr lang="en-US" b="0" i="0" dirty="0">
+                <a:solidFill>
+                  <a:srgbClr val="24292E"/>
                 </a:solidFill>
                 <a:effectLst/>
-                <a:latin typeface="+mn-lt"/>
-                <a:ea typeface="+mn-ea"/>
-                <a:cs typeface="+mn-cs"/>
-              </a:rPr>
-            </a:br>
-            <a:r>
-              <a:rPr lang="en-US" sz="1200" b="0" kern="1200" dirty="0">
-                <a:solidFill>
-                  <a:schemeClr val="tx1"/>
+                <a:latin typeface="-apple-system"/>
+              </a:rPr>
+              <a:t>Monitor the use of data across pipelines and reports.</a:t>
+            </a:r>
+          </a:p>
+          <a:p>
+            <a:pPr marL="228600" indent="-228600" algn="l">
+              <a:buFont typeface="+mj-lt"/>
+              <a:buAutoNum type="arabicPeriod" startAt="5"/>
+            </a:pPr>
+            <a:r>
+              <a:rPr lang="en-US" b="0" i="0" dirty="0">
+                <a:solidFill>
+                  <a:srgbClr val="24292E"/>
                 </a:solidFill>
                 <a:effectLst/>
-                <a:latin typeface="+mn-lt"/>
-                <a:ea typeface="+mn-ea"/>
-                <a:cs typeface="+mn-cs"/>
-              </a:rPr>
-              <a:t>8. Create a solution that provides a consistent security model across all components.</a:t>
-            </a:r>
-          </a:p>
-          <a:p>
-            <a:endParaRPr lang="en-US" sz="1200" b="0" kern="1200" dirty="0">
-              <a:solidFill>
-                <a:schemeClr val="tx1"/>
-              </a:solidFill>
-              <a:effectLst/>
-              <a:latin typeface="+mn-lt"/>
-              <a:ea typeface="+mn-ea"/>
-              <a:cs typeface="+mn-cs"/>
-            </a:endParaRPr>
-          </a:p>
-          <a:p>
-            <a:endParaRPr lang="en-US" dirty="0"/>
+                <a:latin typeface="-apple-system"/>
+              </a:rPr>
+              <a:t>Create a solution that provides a consistent security model across all components.</a:t>
+            </a:r>
           </a:p>
         </p:txBody>
       </p:sp>
@@ -1669,6 +1663,31 @@
               <a:t>The serving layer can consist of dedicated Azure Synapse SQL Pools to provide pre-provisioned compute capacity to serve both data from the relational data warehouse or data sourced from the data lake. Additionally, the serving layer can use Azure Synapse SQL serverless to provide ad-hoc compute capacity for querying data stored in the data lake. Either of these serving options can be used by Power BI reports created within Azure Synapse Analytics, or by external applications. The important take away from this architecture is that all of the components shown are completely managed within Azure Synapse Analytics.</a:t>
             </a:r>
           </a:p>
+          <a:p>
+            <a:pPr marL="171450" indent="-171450">
+              <a:buFont typeface="Arial" panose="020B0604020202020204" pitchFamily="34" charset="0"/>
+              <a:buChar char="•"/>
+            </a:pPr>
+            <a:r>
+              <a:rPr lang="en-US" b="0" i="0" dirty="0">
+                <a:solidFill>
+                  <a:srgbClr val="24292E"/>
+                </a:solidFill>
+                <a:effectLst/>
+                <a:latin typeface="-apple-system"/>
+              </a:rPr>
+              <a:t>Data governance is another challenge in large enterprise environments. On the one hand, business analysts need to discover and understand data assets that can help them solve business problems. On the other hand, Chief Data Officers want insights on the privacy and security of business data. WWI can use Azure Purview for data discovery and governance, insights into their data assets, data classification, and sensitivity covering the entire organizational data landscape. In addition, WWI can register all their data sources and set up regular scans to automatically catalog and update relevant metadata about data assets in the organization. Azure Purview can manage on-premises, multi-cloud, and software as a service (SaaS) data if required.</a:t>
+            </a:r>
+            <a:endParaRPr lang="en-US" sz="1200" b="0" kern="1200" dirty="0">
+              <a:solidFill>
+                <a:schemeClr val="tx1"/>
+              </a:solidFill>
+              <a:effectLst/>
+              <a:latin typeface="+mn-lt"/>
+              <a:ea typeface="+mn-ea"/>
+              <a:cs typeface="+mn-cs"/>
+            </a:endParaRPr>
+          </a:p>
         </p:txBody>
       </p:sp>
       <p:sp>
@@ -2068,6 +2087,85 @@
           </a:p>
           <a:p>
             <a:r>
+              <a:rPr lang="en-US" b="1" i="0" dirty="0">
+                <a:solidFill>
+                  <a:srgbClr val="24292E"/>
+                </a:solidFill>
+                <a:effectLst/>
+                <a:latin typeface="-apple-system"/>
+              </a:rPr>
+              <a:t>How will WII make sure they have discovered all data sets for the unification process?</a:t>
+            </a:r>
+            <a:endParaRPr lang="en-US" sz="1200" b="1" i="0" u="none" strike="noStrike" kern="1200" dirty="0">
+              <a:solidFill>
+                <a:schemeClr val="tx1"/>
+              </a:solidFill>
+              <a:effectLst/>
+              <a:latin typeface="+mn-lt"/>
+              <a:ea typeface="+mn-ea"/>
+              <a:cs typeface="+mn-cs"/>
+            </a:endParaRPr>
+          </a:p>
+          <a:p>
+            <a:endParaRPr lang="en-US" sz="1200" b="0" i="0" u="none" strike="noStrike" kern="1200" dirty="0">
+              <a:solidFill>
+                <a:schemeClr val="tx1"/>
+              </a:solidFill>
+              <a:effectLst/>
+              <a:latin typeface="+mn-lt"/>
+              <a:ea typeface="+mn-ea"/>
+              <a:cs typeface="+mn-cs"/>
+            </a:endParaRPr>
+          </a:p>
+          <a:p>
+            <a:pPr algn="l"/>
+            <a:r>
+              <a:rPr lang="en-US" b="0" i="0" dirty="0">
+                <a:solidFill>
+                  <a:srgbClr val="24292E"/>
+                </a:solidFill>
+                <a:effectLst/>
+                <a:latin typeface="-apple-system"/>
+              </a:rPr>
+              <a:t>Data discovery is the first step for a data analytics or data governance workload for data consumers. Data discovery can be time-consuming because you may not know where to find the data that you want. Furthermore, even after finding the data, you may have doubts about whether or not you can trust the data and take a dependency on it.</a:t>
+            </a:r>
+          </a:p>
+          <a:p>
+            <a:pPr algn="l"/>
+            <a:endParaRPr lang="en-US" b="0" i="0" dirty="0">
+              <a:solidFill>
+                <a:srgbClr val="24292E"/>
+              </a:solidFill>
+              <a:effectLst/>
+              <a:latin typeface="-apple-system"/>
+            </a:endParaRPr>
+          </a:p>
+          <a:p>
+            <a:pPr algn="l"/>
+            <a:r>
+              <a:rPr lang="en-US" b="0" i="0" dirty="0">
+                <a:solidFill>
+                  <a:srgbClr val="24292E"/>
+                </a:solidFill>
+                <a:effectLst/>
+                <a:latin typeface="-apple-system"/>
+              </a:rPr>
+              <a:t>Once all data sources are registered and scanned by Purview, the Data map extracts information about the structure (hierarchical namespace) of the data source. This information is used to build the browsing experience for data discovery. As a result, the data search experience enhanced with Semantic search speeds up the process of data discovery to quickly find the data that matters.</a:t>
+            </a:r>
+          </a:p>
+          <a:p>
+            <a:endParaRPr lang="en-US" sz="1200" b="0" i="0" u="none" strike="noStrike" kern="1200" dirty="0">
+              <a:solidFill>
+                <a:schemeClr val="tx1"/>
+              </a:solidFill>
+              <a:effectLst/>
+              <a:latin typeface="+mn-lt"/>
+              <a:ea typeface="+mn-ea"/>
+              <a:cs typeface="+mn-cs"/>
+            </a:endParaRPr>
+          </a:p>
+          <a:p>
+            <a:r>
               <a:rPr lang="en-US" sz="1200" b="1" i="0" u="none" strike="noStrike" kern="1200" dirty="0">
                 <a:solidFill>
                   <a:schemeClr val="tx1"/>
@@ -4381,6 +4479,70 @@
               <a:t>Result cache is evicted regularly based on a time-aware least recently used algorithm (TLRU).</a:t>
             </a:r>
           </a:p>
+          <a:p>
+            <a:endParaRPr lang="en-US" sz="1200" b="0" i="0" u="none" strike="noStrike" kern="1200" dirty="0">
+              <a:solidFill>
+                <a:schemeClr val="tx1"/>
+              </a:solidFill>
+              <a:effectLst/>
+              <a:latin typeface="+mn-lt"/>
+              <a:ea typeface="+mn-ea"/>
+              <a:cs typeface="+mn-cs"/>
+            </a:endParaRPr>
+          </a:p>
+          <a:p>
+            <a:r>
+              <a:rPr lang="en-US" b="1" i="0" dirty="0">
+                <a:solidFill>
+                  <a:srgbClr val="24292E"/>
+                </a:solidFill>
+                <a:effectLst/>
+                <a:latin typeface="-apple-system"/>
+              </a:rPr>
+              <a:t>How can WWI business analysts find and access the correct data ingested into the unified environment by simply using business or technical terms?</a:t>
+            </a:r>
+            <a:endParaRPr lang="en-US" sz="1200" b="1" i="0" u="none" strike="noStrike" kern="1200" dirty="0">
+              <a:solidFill>
+                <a:schemeClr val="tx1"/>
+              </a:solidFill>
+              <a:effectLst/>
+              <a:latin typeface="+mn-lt"/>
+              <a:ea typeface="+mn-ea"/>
+              <a:cs typeface="+mn-cs"/>
+            </a:endParaRPr>
+          </a:p>
+          <a:p>
+            <a:endParaRPr lang="en-US" sz="1200" b="0" i="0" u="none" strike="noStrike" kern="1200" dirty="0">
+              <a:solidFill>
+                <a:schemeClr val="tx1"/>
+              </a:solidFill>
+              <a:effectLst/>
+              <a:latin typeface="+mn-lt"/>
+              <a:ea typeface="+mn-ea"/>
+              <a:cs typeface="+mn-cs"/>
+            </a:endParaRPr>
+          </a:p>
+          <a:p>
+            <a:r>
+              <a:rPr lang="en-US" b="0" i="0" dirty="0">
+                <a:solidFill>
+                  <a:srgbClr val="24292E"/>
+                </a:solidFill>
+                <a:effectLst/>
+                <a:latin typeface="-apple-system"/>
+              </a:rPr>
+              <a:t>The search functionality in Azure Purview Data Catalog supports Semantic search that enables data discovery using business or technical terms. Moreover, Azure Purview allows you to create a glossary of essential terms for enriching your data. A glossary provides a vocabulary for business users. It consists of business terms that can be related to each other and allows them to be categorized to be understood in different contexts. These terms can then be mapped to assets like a database, tables, columns, etc. This helps abstract the technical jargon associated with the data repositories and allows the business user to discover and work with data in the vocabulary that is more familiar to them.</a:t>
+            </a:r>
+            <a:endParaRPr lang="en-US" sz="1200" b="0" i="0" u="none" strike="noStrike" kern="1200" dirty="0">
+              <a:solidFill>
+                <a:schemeClr val="tx1"/>
+              </a:solidFill>
+              <a:effectLst/>
+              <a:latin typeface="+mn-lt"/>
+              <a:ea typeface="+mn-ea"/>
+              <a:cs typeface="+mn-cs"/>
+            </a:endParaRPr>
+          </a:p>
         </p:txBody>
       </p:sp>
       <p:sp>
@@ -6547,127 +6709,218 @@
           <a:bodyPr/>
           <a:lstStyle/>
           <a:p>
-            <a:r>
-              <a:rPr lang="en-US" sz="1200" b="1" i="0" u="none" strike="noStrike" kern="1200" dirty="0">
-                <a:solidFill>
-                  <a:schemeClr val="tx1"/>
+            <a:pPr algn="l"/>
+            <a:r>
+              <a:rPr lang="en-US" b="1" i="0" dirty="0">
+                <a:solidFill>
+                  <a:srgbClr val="24292E"/>
                 </a:solidFill>
                 <a:effectLst/>
-                <a:latin typeface="+mn-lt"/>
-                <a:ea typeface="+mn-ea"/>
-                <a:cs typeface="+mn-cs"/>
-              </a:rPr>
-              <a:t>WWI understands that Azure offers several services with overlapping capabilities.  They do not want to spend the time stitching them together to get to the desired analytics solution.</a:t>
-            </a:r>
-            <a:br>
-              <a:rPr lang="en-US" sz="1200" b="1" i="0" u="none" strike="noStrike" kern="1200" dirty="0">
-                <a:solidFill>
-                  <a:schemeClr val="tx1"/>
-                </a:solidFill>
-                <a:effectLst/>
-                <a:latin typeface="+mn-lt"/>
-                <a:ea typeface="+mn-ea"/>
-                <a:cs typeface="+mn-cs"/>
-              </a:rPr>
-            </a:br>
-            <a:endParaRPr lang="en-US" sz="1200" b="1" i="0" u="none" strike="noStrike" kern="1200" dirty="0">
+                <a:latin typeface="-apple-system"/>
+              </a:rPr>
+              <a:t>How can you help WWI monitor their data from various sources as it flows through multiple processes and lands in multiple reports?</a:t>
+            </a:r>
+          </a:p>
+          <a:p>
+            <a:pPr algn="l"/>
+            <a:endParaRPr lang="en-US" b="0" i="0" dirty="0">
               <a:solidFill>
-                <a:schemeClr val="tx1"/>
+                <a:srgbClr val="24292E"/>
               </a:solidFill>
               <a:effectLst/>
-              <a:latin typeface="+mn-lt"/>
-              <a:ea typeface="+mn-ea"/>
-              <a:cs typeface="+mn-cs"/>
+              <a:latin typeface="-apple-system"/>
             </a:endParaRPr>
           </a:p>
           <a:p>
-            <a:r>
-              <a:rPr lang="en-US" sz="1200" b="0" i="0" u="none" strike="noStrike" kern="1200" dirty="0">
-                <a:solidFill>
-                  <a:schemeClr val="tx1"/>
+            <a:pPr algn="l"/>
+            <a:r>
+              <a:rPr lang="en-US" b="0" i="0" dirty="0">
+                <a:solidFill>
+                  <a:srgbClr val="24292E"/>
                 </a:solidFill>
                 <a:effectLst/>
-                <a:latin typeface="+mn-lt"/>
-                <a:ea typeface="+mn-ea"/>
-                <a:cs typeface="+mn-cs"/>
-              </a:rPr>
-              <a:t>Azure Synapse Analytics was designed to address exactly this situation and enables customers to quickly get to creating business value from their analytics instead of spending time on plumbing infrastructure connecting disparate services.</a:t>
-            </a:r>
-          </a:p>
-          <a:p>
-            <a:endParaRPr lang="en-US" sz="1200" b="0" i="0" u="none" strike="noStrike" kern="1200" dirty="0">
+                <a:latin typeface="-apple-system"/>
+              </a:rPr>
+              <a:t>One of the platform features of Azure Purview is the ability to show the </a:t>
+            </a:r>
+            <a:r>
+              <a:rPr lang="en-US" b="0" i="0" u="none" strike="noStrike" dirty="0">
+                <a:solidFill>
+                  <a:srgbClr val="24292E"/>
+                </a:solidFill>
+                <a:effectLst/>
+                <a:latin typeface="-apple-system"/>
+                <a:hlinkClick r:id="rId3"/>
+              </a:rPr>
+              <a:t>lineage</a:t>
+            </a:r>
+            <a:r>
+              <a:rPr lang="en-US" b="0" i="0" dirty="0">
+                <a:solidFill>
+                  <a:srgbClr val="24292E"/>
+                </a:solidFill>
+                <a:effectLst/>
+                <a:latin typeface="-apple-system"/>
+              </a:rPr>
+              <a:t> between datasets created by data processes. Azure Purview can automatically add data lineage information based on information from </a:t>
+            </a:r>
+            <a:r>
+              <a:rPr lang="en-US" b="0" i="0" u="none" strike="noStrike" dirty="0">
+                <a:solidFill>
+                  <a:srgbClr val="24292E"/>
+                </a:solidFill>
+                <a:effectLst/>
+                <a:latin typeface="-apple-system"/>
+                <a:hlinkClick r:id="rId4"/>
+              </a:rPr>
+              <a:t>Azure Data Factory or Azure Synapse pipelines</a:t>
+            </a:r>
+            <a:r>
+              <a:rPr lang="en-US" b="0" i="0" dirty="0">
+                <a:solidFill>
+                  <a:srgbClr val="24292E"/>
+                </a:solidFill>
+                <a:effectLst/>
+                <a:latin typeface="-apple-system"/>
+              </a:rPr>
+              <a:t>. Metadata collected in Azure Purview from enterprise data systems are stitched across to show an end to end data lineage. Data Factory, Data Share, Synapse, Azure Databricks can push lineage in to Azure Purview at execution time. Databases &amp; storage solutions such as SQL Server, Teradata, and SAP have query engines to transform data using scripting language. Data lineage from stored procedures is collected in to Purview and stitched with lineage from other systems. Data systems like Azure ML and Power BI report lineage into Azure Purview as well.</a:t>
+            </a:r>
+          </a:p>
+          <a:p>
+            <a:pPr algn="l"/>
+            <a:endParaRPr lang="en-US" b="0" i="0" dirty="0">
               <a:solidFill>
-                <a:schemeClr val="tx1"/>
+                <a:srgbClr val="24292E"/>
               </a:solidFill>
               <a:effectLst/>
-              <a:latin typeface="+mn-lt"/>
-              <a:ea typeface="+mn-ea"/>
-              <a:cs typeface="+mn-cs"/>
+              <a:latin typeface="-apple-system"/>
             </a:endParaRPr>
           </a:p>
           <a:p>
-            <a:r>
-              <a:rPr lang="en-US" sz="1200" b="1" i="0" u="none" strike="noStrike" kern="1200" dirty="0">
-                <a:solidFill>
-                  <a:schemeClr val="tx1"/>
+            <a:pPr algn="l"/>
+            <a:r>
+              <a:rPr lang="en-US" b="1" i="0" dirty="0">
+                <a:solidFill>
+                  <a:srgbClr val="24292E"/>
                 </a:solidFill>
                 <a:effectLst/>
-                <a:latin typeface="+mn-lt"/>
-                <a:ea typeface="+mn-ea"/>
-                <a:cs typeface="+mn-cs"/>
-              </a:rPr>
-              <a:t>WWI have seen demos from competing systems that claim to load massive datasets in seconds. Does Azure offer such a solution?</a:t>
-            </a:r>
-          </a:p>
-          <a:p>
-            <a:endParaRPr lang="en-US" sz="1200" b="1" i="0" u="none" strike="noStrike" kern="1200" dirty="0">
+                <a:latin typeface="-apple-system"/>
+              </a:rPr>
+              <a:t>Throughout the unification process, how can WWI make sure the proper regulatory compliance and risk management practices are applied to the right data sets?</a:t>
+            </a:r>
+          </a:p>
+          <a:p>
+            <a:pPr algn="l"/>
+            <a:endParaRPr lang="en-US" b="0" i="0" dirty="0">
               <a:solidFill>
-                <a:schemeClr val="tx1"/>
+                <a:srgbClr val="24292E"/>
               </a:solidFill>
               <a:effectLst/>
-              <a:latin typeface="+mn-lt"/>
-              <a:ea typeface="+mn-ea"/>
-              <a:cs typeface="+mn-cs"/>
+              <a:latin typeface="-apple-system"/>
             </a:endParaRPr>
           </a:p>
           <a:p>
-            <a:r>
-              <a:rPr lang="en-US" sz="1200" b="0" i="0" u="none" strike="noStrike" kern="1200" dirty="0">
-                <a:solidFill>
-                  <a:schemeClr val="tx1"/>
+            <a:pPr algn="l"/>
+            <a:r>
+              <a:rPr lang="en-US" b="0" i="0" dirty="0">
+                <a:solidFill>
+                  <a:srgbClr val="24292E"/>
                 </a:solidFill>
                 <a:effectLst/>
-                <a:latin typeface="+mn-lt"/>
-                <a:ea typeface="+mn-ea"/>
-                <a:cs typeface="+mn-cs"/>
-              </a:rPr>
-              <a:t>Azure Synapse Analytics is Microsoft's answer to this challenge and is designed for supporting fast loads of massive datasets.</a:t>
-            </a:r>
-          </a:p>
-          <a:p>
-            <a:endParaRPr lang="en-US" sz="1200" b="0" i="0" u="none" strike="noStrike" kern="1200" dirty="0">
+                <a:latin typeface="-apple-system"/>
+              </a:rPr>
+              <a:t>Azure Purview can scan and automatically classify data in various platforms such as Azure Synapse, SAP ECC, SAP S4/HANA, and Oracle Database (</a:t>
+            </a:r>
+            <a:r>
+              <a:rPr lang="en-US" b="0" i="0" u="none" strike="noStrike" dirty="0">
+                <a:solidFill>
+                  <a:srgbClr val="24292E"/>
+                </a:solidFill>
+                <a:effectLst/>
+                <a:latin typeface="-apple-system"/>
+                <a:hlinkClick r:id="rId5"/>
+              </a:rPr>
+              <a:t>see more</a:t>
+            </a:r>
+            <a:r>
+              <a:rPr lang="en-US" b="0" i="0" dirty="0">
+                <a:solidFill>
+                  <a:srgbClr val="24292E"/>
+                </a:solidFill>
+                <a:effectLst/>
+                <a:latin typeface="-apple-system"/>
+              </a:rPr>
+              <a:t>). Data sources captured by Azure Purview can be classified and labeled by out-of-box and custom-sensitive information types. In addition, Azure Purview supports 100+ built-in classifications that range from credit cards, account numbers through a wide range of types such as government IDs, location data, and more.</a:t>
+            </a:r>
+          </a:p>
+          <a:p>
+            <a:pPr algn="l"/>
+            <a:endParaRPr lang="en-US" b="0" i="0" dirty="0">
               <a:solidFill>
-                <a:schemeClr val="tx1"/>
+                <a:srgbClr val="24292E"/>
               </a:solidFill>
               <a:effectLst/>
-              <a:latin typeface="+mn-lt"/>
-              <a:ea typeface="+mn-ea"/>
-              <a:cs typeface="+mn-cs"/>
+              <a:latin typeface="-apple-system"/>
             </a:endParaRPr>
           </a:p>
           <a:p>
-            <a:endParaRPr lang="en-US" sz="1200" b="0" i="0" u="none" strike="noStrike" kern="1200" dirty="0">
+            <a:pPr algn="l"/>
+            <a:r>
+              <a:rPr lang="en-US" b="0" i="0" dirty="0">
+                <a:solidFill>
+                  <a:srgbClr val="24292E"/>
+                </a:solidFill>
+                <a:effectLst/>
+                <a:latin typeface="-apple-system"/>
+              </a:rPr>
+              <a:t>In Purview, classifications are similar to subject tags and are used to mark and identify data of a specific type found within your data estate during scanning. Purview uses the same classifications, also known as sensitive information types, like Microsoft 365. MIP sensitivity labels are created in the Microsoft 365 Security and Compliance Center (SCC). This enables you to extend your existing sensitivity labels across your Azure Purview assets. By extending MIP’s sensitivity labels with Azure Purview, organizations can now discover, classify, and get insight into sensitivity across a broader range of data sources, minimizing compliance risk.</a:t>
+            </a:r>
+          </a:p>
+          <a:p>
+            <a:pPr algn="l"/>
+            <a:endParaRPr lang="en-US" b="0" i="0" dirty="0">
               <a:solidFill>
-                <a:schemeClr val="tx1"/>
+                <a:srgbClr val="24292E"/>
               </a:solidFill>
               <a:effectLst/>
-              <a:latin typeface="+mn-lt"/>
-              <a:ea typeface="+mn-ea"/>
-              <a:cs typeface="+mn-cs"/>
+              <a:latin typeface="-apple-system"/>
             </a:endParaRPr>
           </a:p>
           <a:p>
-            <a:endParaRPr lang="en-US" dirty="0"/>
+            <a:pPr algn="l"/>
+            <a:r>
+              <a:rPr lang="en-US" b="1" i="0" dirty="0">
+                <a:solidFill>
+                  <a:srgbClr val="24292E"/>
+                </a:solidFill>
+                <a:effectLst/>
+                <a:latin typeface="-apple-system"/>
+              </a:rPr>
+              <a:t>How does your solution help WWI to visually monitor their data assets and their relationships?</a:t>
+            </a:r>
+          </a:p>
+          <a:p>
+            <a:pPr algn="l"/>
+            <a:endParaRPr lang="en-US" b="0" i="0" dirty="0">
+              <a:solidFill>
+                <a:srgbClr val="24292E"/>
+              </a:solidFill>
+              <a:effectLst/>
+              <a:latin typeface="-apple-system"/>
+            </a:endParaRPr>
+          </a:p>
+          <a:p>
+            <a:pPr algn="l"/>
+            <a:r>
+              <a:rPr lang="en-US" b="0" i="0" dirty="0">
+                <a:solidFill>
+                  <a:srgbClr val="24292E"/>
+                </a:solidFill>
+                <a:effectLst/>
+                <a:latin typeface="-apple-system"/>
+              </a:rPr>
+              <a:t>Azure Purview Data Map captures metadata across various data sources and file types with automated data discovery and sensitive data classification. The Purview Data Map is a unified map of your data assets and relationships that enable more effective governance for your data estate. It is a knowledge graph that is the underpinning for the Purview Data Catalog and all the features that it has to offer. Business users can configure and use the Purview Data Map through an intuitive UI, and developers can programmatically interact with the Data Map using open-source Apache Atlas 2.0 APIs. Azure Purview Data Map powers the Purview Data Catalog and Purview data insights as unified experiences within the Purview Studio.</a:t>
+            </a:r>
           </a:p>
         </p:txBody>
       </p:sp>
@@ -6678,7 +6931,7 @@
             <a:spLocks noGrp="1"/>
           </p:cNvSpPr>
           <p:nvPr>
-            <p:ph type="sldNum" sz="quarter" idx="10"/>
+            <p:ph type="sldNum" sz="quarter" idx="5"/>
           </p:nvPr>
         </p:nvSpPr>
         <p:spPr/>
@@ -6697,7 +6950,7 @@
     </p:spTree>
     <p:extLst>
       <p:ext uri="{BB962C8B-B14F-4D97-AF65-F5344CB8AC3E}">
-        <p14:creationId xmlns:p14="http://schemas.microsoft.com/office/powerpoint/2010/main" val="4115832635"/>
+        <p14:creationId xmlns:p14="http://schemas.microsoft.com/office/powerpoint/2010/main" val="1425712429"/>
       </p:ext>
     </p:extLst>
   </p:cSld>
@@ -6761,10 +7014,19 @@
                 <a:ea typeface="+mn-ea"/>
                 <a:cs typeface="+mn-cs"/>
               </a:rPr>
-              <a:t>Is it really possible to minimize the number of disparate services they use across ingest, transformation, querying and storage, so that WWI team of data engineers, data scientists and database administrators can master one tool, and can build shared best practices for development, management and monitoring?</a:t>
-            </a:r>
-          </a:p>
-          <a:p>
+              <a:t>WWI understands that Azure offers several services with overlapping capabilities.  They do not want to spend the time stitching them together to get to the desired analytics solution.</a:t>
+            </a:r>
+            <a:br>
+              <a:rPr lang="en-US" sz="1200" b="1" i="0" u="none" strike="noStrike" kern="1200" dirty="0">
+                <a:solidFill>
+                  <a:schemeClr val="tx1"/>
+                </a:solidFill>
+                <a:effectLst/>
+                <a:latin typeface="+mn-lt"/>
+                <a:ea typeface="+mn-ea"/>
+                <a:cs typeface="+mn-cs"/>
+              </a:rPr>
+            </a:br>
             <a:endParaRPr lang="en-US" sz="1200" b="1" i="0" u="none" strike="noStrike" kern="1200" dirty="0">
               <a:solidFill>
                 <a:schemeClr val="tx1"/>
@@ -6786,7 +7048,7 @@
                 <a:ea typeface="+mn-ea"/>
                 <a:cs typeface="+mn-cs"/>
               </a:rPr>
-              <a:t>Yes, Azure Synapse Analytics provides an integrated environment that does exactly this.</a:t>
+              <a:t>Azure Synapse Analytics was designed to address exactly this situation and enables customers to quickly get to creating business value from their analytics instead of spending time on plumbing infrastructure connecting disparate services.</a:t>
             </a:r>
           </a:p>
           <a:p>
@@ -6811,7 +7073,7 @@
                 <a:ea typeface="+mn-ea"/>
                 <a:cs typeface="+mn-cs"/>
               </a:rPr>
-              <a:t>WWI have heard of serverless querying, does Azure offer this? Does it support querying the data at the scale of WWI and what formats does it support? Would this be appropriate for supporting WWI dashboards or reports?</a:t>
+              <a:t>WWI have seen demos from competing systems that claim to load massive datasets in seconds. Does Azure offer such a solution?</a:t>
             </a:r>
           </a:p>
           <a:p>
@@ -6836,7 +7098,7 @@
                 <a:ea typeface="+mn-ea"/>
                 <a:cs typeface="+mn-cs"/>
               </a:rPr>
-              <a:t>Azure Synapse Analytics support serverless querying via the serverless SQL endpoint.</a:t>
+              <a:t>Azure Synapse Analytics is Microsoft's answer to this challenge and is designed for supporting fast loads of massive datasets.</a:t>
             </a:r>
           </a:p>
           <a:p>
@@ -6851,20 +7113,6 @@
             </a:endParaRPr>
           </a:p>
           <a:p>
-            <a:r>
-              <a:rPr lang="en-US" sz="1200" b="0" i="0" u="none" strike="noStrike" kern="1200" dirty="0">
-                <a:solidFill>
-                  <a:schemeClr val="tx1"/>
-                </a:solidFill>
-                <a:effectLst/>
-                <a:latin typeface="+mn-lt"/>
-                <a:ea typeface="+mn-ea"/>
-                <a:cs typeface="+mn-cs"/>
-              </a:rPr>
-              <a:t>Azure Synapse SQL serverless is an always available SQL endpoint that provides T-SQL querying over high scale data in Azure Storage, and is ideal for ad hoc or bursty workloads.</a:t>
-            </a:r>
-          </a:p>
-          <a:p>
             <a:endParaRPr lang="en-US" sz="1200" b="0" i="0" u="none" strike="noStrike" kern="1200" dirty="0">
               <a:solidFill>
                 <a:schemeClr val="tx1"/>
@@ -6876,43 +7124,7 @@
             </a:endParaRPr>
           </a:p>
           <a:p>
-            <a:r>
-              <a:rPr lang="en-US" sz="1200" b="0" i="0" u="none" strike="noStrike" kern="1200" dirty="0">
-                <a:solidFill>
-                  <a:schemeClr val="tx1"/>
-                </a:solidFill>
-                <a:effectLst/>
-                <a:latin typeface="+mn-lt"/>
-                <a:ea typeface="+mn-ea"/>
-                <a:cs typeface="+mn-cs"/>
-              </a:rPr>
-              <a:t>Supports data in various formats (Parquet, CSV, JSON)</a:t>
-            </a:r>
-          </a:p>
-          <a:p>
-            <a:endParaRPr lang="en-US" sz="1200" b="0" i="0" u="none" strike="noStrike" kern="1200" dirty="0">
-              <a:solidFill>
-                <a:schemeClr val="tx1"/>
-              </a:solidFill>
-              <a:effectLst/>
-              <a:latin typeface="+mn-lt"/>
-              <a:ea typeface="+mn-ea"/>
-              <a:cs typeface="+mn-cs"/>
-            </a:endParaRPr>
-          </a:p>
-          <a:p>
-            <a:r>
-              <a:rPr lang="en-US" sz="1200" b="0" i="0" u="none" strike="noStrike" kern="1200" dirty="0">
-                <a:solidFill>
-                  <a:schemeClr val="tx1"/>
-                </a:solidFill>
-                <a:effectLst/>
-                <a:latin typeface="+mn-lt"/>
-                <a:ea typeface="+mn-ea"/>
-                <a:cs typeface="+mn-cs"/>
-              </a:rPr>
-              <a:t>It would be appropriate for dashboards and reports, as it supports Power BI and can be used refresh dashboard datasets. It is also appropriate for basic data discovery and exploration and supporting "single query ETL" that  transforms Azure Storage based data in a massively parallel fashion.</a:t>
-            </a:r>
+            <a:endParaRPr lang="en-US" dirty="0"/>
           </a:p>
         </p:txBody>
       </p:sp>
@@ -6942,7 +7154,7 @@
     </p:spTree>
     <p:extLst>
       <p:ext uri="{BB962C8B-B14F-4D97-AF65-F5344CB8AC3E}">
-        <p14:creationId xmlns:p14="http://schemas.microsoft.com/office/powerpoint/2010/main" val="207936309"/>
+        <p14:creationId xmlns:p14="http://schemas.microsoft.com/office/powerpoint/2010/main" val="4115832635"/>
       </p:ext>
     </p:extLst>
   </p:cSld>
@@ -7006,7 +7218,7 @@
                 <a:ea typeface="+mn-ea"/>
                 <a:cs typeface="+mn-cs"/>
               </a:rPr>
-              <a:t>If Azure provides serverless querying, does selecting serverless remove the option of using pre-allocated query resources?</a:t>
+              <a:t>Is it really possible to minimize the number of disparate services they use across ingest, transformation, querying and storage, so that WWI team of data engineers, data scientists and database administrators can master one tool, and can build shared best practices for development, management and monitoring?</a:t>
             </a:r>
           </a:p>
           <a:p>
@@ -7031,7 +7243,7 @@
                 <a:ea typeface="+mn-ea"/>
                 <a:cs typeface="+mn-cs"/>
               </a:rPr>
-              <a:t>No. This is a unique differentiator of Azure Synapse Analytics. Within one Azure Synapse Analytics workspace, they can have pre-provisioned Azure Synapse SQL Pools, and also have serverless querying using the Azure Synapse SQL serverless endpoint.</a:t>
+              <a:t>Yes, Azure Synapse Analytics provides an integrated environment that does exactly this.</a:t>
             </a:r>
           </a:p>
           <a:p>
@@ -7056,7 +7268,7 @@
                 <a:ea typeface="+mn-ea"/>
                 <a:cs typeface="+mn-cs"/>
               </a:rPr>
-              <a:t>Would data be protected at rest and are there controls over the keys used to encrypt it?</a:t>
+              <a:t>WWI have heard of serverless querying, does Azure offer this? Does it support querying the data at the scale of WWI and what formats does it support? Would this be appropriate for supporting WWI dashboards or reports?</a:t>
             </a:r>
           </a:p>
           <a:p>
@@ -7081,7 +7293,7 @@
                 <a:ea typeface="+mn-ea"/>
                 <a:cs typeface="+mn-cs"/>
               </a:rPr>
-              <a:t>For data stored in Azure Synapse SQL databases as well as data stored in Azure Storage (including Azure Data Lake Store Gen2), Azure Synapse Analytics supports transparent data encryption (TDE), which means all data is encrypted when written to disk and decrypted when read. When it comes to the keys used for encryption and decryption, TDE provides the option of using service managed keys that are supplied by Microsoft, or user managed keys that are provided by the customer and are stored securely in Azure Key Vault.</a:t>
+              <a:t>Azure Synapse Analytics support serverless querying via the serverless SQL endpoint.</a:t>
             </a:r>
           </a:p>
           <a:p>
@@ -7094,6 +7306,70 @@
               <a:ea typeface="+mn-ea"/>
               <a:cs typeface="+mn-cs"/>
             </a:endParaRPr>
+          </a:p>
+          <a:p>
+            <a:r>
+              <a:rPr lang="en-US" sz="1200" b="0" i="0" u="none" strike="noStrike" kern="1200" dirty="0">
+                <a:solidFill>
+                  <a:schemeClr val="tx1"/>
+                </a:solidFill>
+                <a:effectLst/>
+                <a:latin typeface="+mn-lt"/>
+                <a:ea typeface="+mn-ea"/>
+                <a:cs typeface="+mn-cs"/>
+              </a:rPr>
+              <a:t>Azure Synapse SQL serverless is an always available SQL endpoint that provides T-SQL querying over high scale data in Azure Storage, and is ideal for ad hoc or bursty workloads.</a:t>
+            </a:r>
+          </a:p>
+          <a:p>
+            <a:endParaRPr lang="en-US" sz="1200" b="0" i="0" u="none" strike="noStrike" kern="1200" dirty="0">
+              <a:solidFill>
+                <a:schemeClr val="tx1"/>
+              </a:solidFill>
+              <a:effectLst/>
+              <a:latin typeface="+mn-lt"/>
+              <a:ea typeface="+mn-ea"/>
+              <a:cs typeface="+mn-cs"/>
+            </a:endParaRPr>
+          </a:p>
+          <a:p>
+            <a:r>
+              <a:rPr lang="en-US" sz="1200" b="0" i="0" u="none" strike="noStrike" kern="1200" dirty="0">
+                <a:solidFill>
+                  <a:schemeClr val="tx1"/>
+                </a:solidFill>
+                <a:effectLst/>
+                <a:latin typeface="+mn-lt"/>
+                <a:ea typeface="+mn-ea"/>
+                <a:cs typeface="+mn-cs"/>
+              </a:rPr>
+              <a:t>Supports data in various formats (Parquet, CSV, JSON)</a:t>
+            </a:r>
+          </a:p>
+          <a:p>
+            <a:endParaRPr lang="en-US" sz="1200" b="0" i="0" u="none" strike="noStrike" kern="1200" dirty="0">
+              <a:solidFill>
+                <a:schemeClr val="tx1"/>
+              </a:solidFill>
+              <a:effectLst/>
+              <a:latin typeface="+mn-lt"/>
+              <a:ea typeface="+mn-ea"/>
+              <a:cs typeface="+mn-cs"/>
+            </a:endParaRPr>
+          </a:p>
+          <a:p>
+            <a:r>
+              <a:rPr lang="en-US" sz="1200" b="0" i="0" u="none" strike="noStrike" kern="1200" dirty="0">
+                <a:solidFill>
+                  <a:schemeClr val="tx1"/>
+                </a:solidFill>
+                <a:effectLst/>
+                <a:latin typeface="+mn-lt"/>
+                <a:ea typeface="+mn-ea"/>
+                <a:cs typeface="+mn-cs"/>
+              </a:rPr>
+              <a:t>It would be appropriate for dashboards and reports, as it supports Power BI and can be used refresh dashboard datasets. It is also appropriate for basic data discovery and exploration and supporting "single query ETL" that  transforms Azure Storage based data in a massively parallel fashion.</a:t>
+            </a:r>
           </a:p>
         </p:txBody>
       </p:sp>
@@ -7123,7 +7399,7 @@
     </p:spTree>
     <p:extLst>
       <p:ext uri="{BB962C8B-B14F-4D97-AF65-F5344CB8AC3E}">
-        <p14:creationId xmlns:p14="http://schemas.microsoft.com/office/powerpoint/2010/main" val="1681056147"/>
+        <p14:creationId xmlns:p14="http://schemas.microsoft.com/office/powerpoint/2010/main" val="207936309"/>
       </p:ext>
     </p:extLst>
   </p:cSld>
@@ -7177,6 +7453,108 @@
           <a:bodyPr/>
           <a:lstStyle/>
           <a:p>
+            <a:r>
+              <a:rPr lang="en-US" sz="1200" b="1" i="0" u="none" strike="noStrike" kern="1200" dirty="0">
+                <a:solidFill>
+                  <a:schemeClr val="tx1"/>
+                </a:solidFill>
+                <a:effectLst/>
+                <a:latin typeface="+mn-lt"/>
+                <a:ea typeface="+mn-ea"/>
+                <a:cs typeface="+mn-cs"/>
+              </a:rPr>
+              <a:t>If Azure provides serverless querying, does selecting serverless remove the option of using pre-allocated query resources?</a:t>
+            </a:r>
+          </a:p>
+          <a:p>
+            <a:endParaRPr lang="en-US" sz="1200" b="1" i="0" u="none" strike="noStrike" kern="1200" dirty="0">
+              <a:solidFill>
+                <a:schemeClr val="tx1"/>
+              </a:solidFill>
+              <a:effectLst/>
+              <a:latin typeface="+mn-lt"/>
+              <a:ea typeface="+mn-ea"/>
+              <a:cs typeface="+mn-cs"/>
+            </a:endParaRPr>
+          </a:p>
+          <a:p>
+            <a:r>
+              <a:rPr lang="en-US" sz="1200" b="0" i="0" u="none" strike="noStrike" kern="1200" dirty="0">
+                <a:solidFill>
+                  <a:schemeClr val="tx1"/>
+                </a:solidFill>
+                <a:effectLst/>
+                <a:latin typeface="+mn-lt"/>
+                <a:ea typeface="+mn-ea"/>
+                <a:cs typeface="+mn-cs"/>
+              </a:rPr>
+              <a:t>No. This is a unique differentiator of Azure Synapse Analytics. Within one Azure Synapse Analytics workspace, they can have pre-provisioned Azure Synapse SQL Pools, and also have serverless querying using the Azure Synapse SQL serverless endpoint.</a:t>
+            </a:r>
+          </a:p>
+          <a:p>
+            <a:endParaRPr lang="en-US" sz="1200" b="0" i="0" u="none" strike="noStrike" kern="1200" dirty="0">
+              <a:solidFill>
+                <a:schemeClr val="tx1"/>
+              </a:solidFill>
+              <a:effectLst/>
+              <a:latin typeface="+mn-lt"/>
+              <a:ea typeface="+mn-ea"/>
+              <a:cs typeface="+mn-cs"/>
+            </a:endParaRPr>
+          </a:p>
+          <a:p>
+            <a:r>
+              <a:rPr lang="en-US" b="1" i="0" dirty="0">
+                <a:solidFill>
+                  <a:srgbClr val="24292E"/>
+                </a:solidFill>
+                <a:effectLst/>
+                <a:latin typeface="-apple-system"/>
+              </a:rPr>
+              <a:t>Having multiple data sources, pipelines and reports makes it hard to track what data goes where and is accessed by who. Is there a way to visualize a complete data supply chain from raw data to business insights?</a:t>
+            </a:r>
+          </a:p>
+          <a:p>
+            <a:endParaRPr lang="en-US" sz="1200" b="0" i="0" u="none" strike="noStrike" kern="1200" dirty="0">
+              <a:solidFill>
+                <a:srgbClr val="24292E"/>
+              </a:solidFill>
+              <a:effectLst/>
+              <a:latin typeface="-apple-system"/>
+              <a:ea typeface="+mn-ea"/>
+              <a:cs typeface="+mn-cs"/>
+            </a:endParaRPr>
+          </a:p>
+          <a:p>
+            <a:pPr marL="0" marR="0" lvl="0" indent="0" algn="l" defTabSz="914400" rtl="0" eaLnBrk="1" fontAlgn="auto" latinLnBrk="0" hangingPunct="1">
+              <a:lnSpc>
+                <a:spcPct val="100000"/>
+              </a:lnSpc>
+              <a:spcBef>
+                <a:spcPts val="0"/>
+              </a:spcBef>
+              <a:spcAft>
+                <a:spcPts val="0"/>
+              </a:spcAft>
+              <a:buClrTx/>
+              <a:buSzTx/>
+              <a:buFontTx/>
+              <a:buNone/>
+              <a:tabLst/>
+              <a:defRPr/>
+            </a:pPr>
+            <a:r>
+              <a:rPr lang="en-US" b="0" i="0" dirty="0">
+                <a:solidFill>
+                  <a:srgbClr val="24292E"/>
+                </a:solidFill>
+                <a:effectLst/>
+                <a:latin typeface="-apple-system"/>
+              </a:rPr>
+              <a:t>Azure Purview Data Catalog can connect with data processing, storage, and analytics systems to extract lineage information. Data lineage is broadly understood as the lifecycle that spans the data’s origin and where it moves over time across the data estate. It is used for different kinds of backward-looking scenarios such as troubleshooting, tracing root causes in data pipelines, and debugging. Lineage is also used for data quality analysis, compliance, and “what if” scenarios, often referred to as impact analysis. In Azure Purview, the Lineage is represented visually to show data moving from source to destination, including how the data was transformed. The information is combined to represent a generic, scenario-specific lineage experience in the Catalog.</a:t>
+            </a:r>
+          </a:p>
+          <a:p>
             <a:endParaRPr lang="en-US" sz="1200" b="0" i="0" u="none" strike="noStrike" kern="1200" dirty="0">
               <a:solidFill>
                 <a:schemeClr val="tx1"/>
@@ -7215,7 +7593,7 @@
     </p:spTree>
     <p:extLst>
       <p:ext uri="{BB962C8B-B14F-4D97-AF65-F5344CB8AC3E}">
-        <p14:creationId xmlns:p14="http://schemas.microsoft.com/office/powerpoint/2010/main" val="1184667087"/>
+        <p14:creationId xmlns:p14="http://schemas.microsoft.com/office/powerpoint/2010/main" val="1681056147"/>
       </p:ext>
     </p:extLst>
   </p:cSld>
@@ -7269,32 +7647,53 @@
           <a:bodyPr/>
           <a:lstStyle/>
           <a:p>
-            <a:pPr marL="0" marR="0" lvl="0" indent="0" algn="l" defTabSz="914400" rtl="0" eaLnBrk="1" fontAlgn="auto" latinLnBrk="0" hangingPunct="1">
-              <a:lnSpc>
-                <a:spcPct val="100000"/>
-              </a:lnSpc>
-              <a:spcBef>
-                <a:spcPts val="0"/>
-              </a:spcBef>
-              <a:spcAft>
-                <a:spcPts val="0"/>
-              </a:spcAft>
-              <a:buClrTx/>
-              <a:buSzTx/>
-              <a:buFontTx/>
-              <a:buNone/>
-              <a:tabLst/>
-              <a:defRPr/>
-            </a:pPr>
-            <a:r>
-              <a:rPr lang="en-US" b="0" dirty="0">
-                <a:solidFill>
-                  <a:srgbClr val="D4D4D4"/>
+            <a:endParaRPr lang="en-US" sz="1200" b="0" i="0" u="none" strike="noStrike" kern="1200" dirty="0">
+              <a:solidFill>
+                <a:schemeClr val="tx1"/>
+              </a:solidFill>
+              <a:effectLst/>
+              <a:latin typeface="+mn-lt"/>
+              <a:ea typeface="+mn-ea"/>
+              <a:cs typeface="+mn-cs"/>
+            </a:endParaRPr>
+          </a:p>
+          <a:p>
+            <a:r>
+              <a:rPr lang="en-US" sz="1200" b="1" i="0" u="none" strike="noStrike" kern="1200" dirty="0">
+                <a:solidFill>
+                  <a:schemeClr val="tx1"/>
                 </a:solidFill>
                 <a:effectLst/>
-                <a:latin typeface="Consolas" panose="020B0609020204030204" pitchFamily="49" charset="0"/>
-              </a:rPr>
-              <a:t>By using Azure Machine Learning in the solution, WWI will be able to take the models trained elsewhere in the solution and deploy them as REST webservices that are hosted in the Azure Kubernetes Services or Azure Container Instances. They can deploy the webservices from AKS using the Azure Machine Learning SDK or directly within the Azure Machine Learning Studio product. Depending on the model it may be possible to have a code-free model deployment using AML Studio – or  Model deployment may involve creating a scoring web service script that contains the logic of the web service. This script loads the model from disk and then uses the model for scoring and returns the scored result. By integrating with the Azure Machine Learning model registry, the scoring script can automatically pull the latest model directly from the Azure Machine Learning model registry when the webservice first starts up, ensuring that the web service is always using the latest model, if this is desired. Web services deployed in this fashion can be configured to expose a Swagger OpenAPI endpoint that makes it easy for developers by providing auto-generated documentation and the ability to create client libraries for invoking the web service using developer tools.</a:t>
+                <a:latin typeface="+mn-lt"/>
+                <a:ea typeface="+mn-ea"/>
+                <a:cs typeface="+mn-cs"/>
+              </a:rPr>
+              <a:t>Would data be protected at rest and are there controls over the keys used to encrypt it?</a:t>
+            </a:r>
+          </a:p>
+          <a:p>
+            <a:endParaRPr lang="en-US" sz="1200" b="1" i="0" u="none" strike="noStrike" kern="1200" dirty="0">
+              <a:solidFill>
+                <a:schemeClr val="tx1"/>
+              </a:solidFill>
+              <a:effectLst/>
+              <a:latin typeface="+mn-lt"/>
+              <a:ea typeface="+mn-ea"/>
+              <a:cs typeface="+mn-cs"/>
+            </a:endParaRPr>
+          </a:p>
+          <a:p>
+            <a:r>
+              <a:rPr lang="en-US" sz="1200" b="0" i="0" u="none" strike="noStrike" kern="1200" dirty="0">
+                <a:solidFill>
+                  <a:schemeClr val="tx1"/>
+                </a:solidFill>
+                <a:effectLst/>
+                <a:latin typeface="+mn-lt"/>
+                <a:ea typeface="+mn-ea"/>
+                <a:cs typeface="+mn-cs"/>
+              </a:rPr>
+              <a:t>For data stored in Azure Synapse SQL databases as well as data stored in Azure Storage (including Azure Data Lake Store Gen2), Azure Synapse Analytics supports transparent data encryption (TDE), which means all data is encrypted when written to disk and decrypted when read. When it comes to the keys used for encryption and decryption, TDE provides the option of using service managed keys that are supplied by Microsoft, or user managed keys that are provided by the customer and are stored securely in Azure Key Vault.</a:t>
             </a:r>
           </a:p>
           <a:p>
@@ -7336,7 +7735,7 @@
     </p:spTree>
     <p:extLst>
       <p:ext uri="{BB962C8B-B14F-4D97-AF65-F5344CB8AC3E}">
-        <p14:creationId xmlns:p14="http://schemas.microsoft.com/office/powerpoint/2010/main" val="2892108141"/>
+        <p14:creationId xmlns:p14="http://schemas.microsoft.com/office/powerpoint/2010/main" val="837944514"/>
       </p:ext>
     </p:extLst>
   </p:cSld>
@@ -7390,33 +7789,6 @@
           <a:bodyPr/>
           <a:lstStyle/>
           <a:p>
-            <a:pPr marL="0" marR="0" lvl="0" indent="0" algn="l" defTabSz="914400" rtl="0" eaLnBrk="1" fontAlgn="auto" latinLnBrk="0" hangingPunct="1">
-              <a:lnSpc>
-                <a:spcPct val="100000"/>
-              </a:lnSpc>
-              <a:spcBef>
-                <a:spcPts val="0"/>
-              </a:spcBef>
-              <a:spcAft>
-                <a:spcPts val="0"/>
-              </a:spcAft>
-              <a:buClrTx/>
-              <a:buSzTx/>
-              <a:buFontTx/>
-              <a:buNone/>
-              <a:tabLst/>
-              <a:defRPr/>
-            </a:pPr>
-            <a:r>
-              <a:rPr lang="en-US" b="0" dirty="0">
-                <a:solidFill>
-                  <a:srgbClr val="D4D4D4"/>
-                </a:solidFill>
-                <a:effectLst/>
-                <a:latin typeface="Consolas" panose="020B0609020204030204" pitchFamily="49" charset="0"/>
-              </a:rPr>
-              <a:t>The model re-training process can be fully integrated with the DevOps process in an approach referred to as MLOps. This approach leverages Azure DevOps. The overall approach is to orchestrate continuous integration and continuous delivery Azure Pipelines from Azure DevOps. These pipelines are triggered by changes to artifacts that describe a machine learning pipeline. These pipelines are created with the Azure Machine Learning SDK or directly within the AML Studio UI. For example, checking in a change to the model training script executes the Azure Pipelines Build Pipeline, which trains (or re-trains) the model and creates the container image. Then this triggers an Azure Pipelines Release pipeline that deploys the model as a web service, by using the Docker image that was created in the Build pipeline. Once in production, the scoring web service is monitored using a combination of Application Insights and Azure Storage. This approach enables the deployment pipeline to be re-run to update any component of the solution, included models which have been re-trained.</a:t>
-            </a:r>
             <a:endParaRPr lang="en-US" sz="1200" b="0" i="0" u="none" strike="noStrike" kern="1200" dirty="0">
               <a:solidFill>
                 <a:schemeClr val="tx1"/>
@@ -7455,7 +7827,7 @@
     </p:spTree>
     <p:extLst>
       <p:ext uri="{BB962C8B-B14F-4D97-AF65-F5344CB8AC3E}">
-        <p14:creationId xmlns:p14="http://schemas.microsoft.com/office/powerpoint/2010/main" val="3100247705"/>
+        <p14:creationId xmlns:p14="http://schemas.microsoft.com/office/powerpoint/2010/main" val="1184667087"/>
       </p:ext>
     </p:extLst>
   </p:cSld>
@@ -7509,7 +7881,44 @@
           <a:bodyPr/>
           <a:lstStyle/>
           <a:p>
-            <a:endParaRPr lang="en-US" dirty="0"/>
+            <a:pPr marL="0" marR="0" lvl="0" indent="0" algn="l" defTabSz="914400" rtl="0" eaLnBrk="1" fontAlgn="auto" latinLnBrk="0" hangingPunct="1">
+              <a:lnSpc>
+                <a:spcPct val="100000"/>
+              </a:lnSpc>
+              <a:spcBef>
+                <a:spcPts val="0"/>
+              </a:spcBef>
+              <a:spcAft>
+                <a:spcPts val="0"/>
+              </a:spcAft>
+              <a:buClrTx/>
+              <a:buSzTx/>
+              <a:buFontTx/>
+              <a:buNone/>
+              <a:tabLst/>
+              <a:defRPr/>
+            </a:pPr>
+            <a:r>
+              <a:rPr lang="en-US" b="0" dirty="0">
+                <a:solidFill>
+                  <a:srgbClr val="D4D4D4"/>
+                </a:solidFill>
+                <a:effectLst/>
+                <a:latin typeface="Consolas" panose="020B0609020204030204" pitchFamily="49" charset="0"/>
+              </a:rPr>
+              <a:t>By using Azure Machine Learning in the solution, WWI will be able to take the models trained elsewhere in the solution and deploy them as REST webservices that are hosted in the Azure Kubernetes Services or Azure Container Instances. They can deploy the webservices from AKS using the Azure Machine Learning SDK or directly within the Azure Machine Learning Studio product. Depending on the model it may be possible to have a code-free model deployment using AML Studio – or  Model deployment may involve creating a scoring web service script that contains the logic of the web service. This script loads the model from disk and then uses the model for scoring and returns the scored result. By integrating with the Azure Machine Learning model registry, the scoring script can automatically pull the latest model directly from the Azure Machine Learning model registry when the webservice first starts up, ensuring that the web service is always using the latest model, if this is desired. Web services deployed in this fashion can be configured to expose a Swagger OpenAPI endpoint that makes it easy for developers by providing auto-generated documentation and the ability to create client libraries for invoking the web service using developer tools.</a:t>
+            </a:r>
+          </a:p>
+          <a:p>
+            <a:endParaRPr lang="en-US" sz="1200" b="0" i="0" u="none" strike="noStrike" kern="1200" dirty="0">
+              <a:solidFill>
+                <a:schemeClr val="tx1"/>
+              </a:solidFill>
+              <a:effectLst/>
+              <a:latin typeface="+mn-lt"/>
+              <a:ea typeface="+mn-ea"/>
+              <a:cs typeface="+mn-cs"/>
+            </a:endParaRPr>
           </a:p>
         </p:txBody>
       </p:sp>
@@ -7539,7 +7948,7 @@
     </p:spTree>
     <p:extLst>
       <p:ext uri="{BB962C8B-B14F-4D97-AF65-F5344CB8AC3E}">
-        <p14:creationId xmlns:p14="http://schemas.microsoft.com/office/powerpoint/2010/main" val="671285550"/>
+        <p14:creationId xmlns:p14="http://schemas.microsoft.com/office/powerpoint/2010/main" val="2892108141"/>
       </p:ext>
     </p:extLst>
   </p:cSld>
@@ -7576,12 +7985,7 @@
             <p:ph type="sldImg"/>
           </p:nvPr>
         </p:nvSpPr>
-        <p:spPr>
-          <a:xfrm>
-            <a:off x="381000" y="685800"/>
-            <a:ext cx="6096000" cy="3429000"/>
-          </a:xfrm>
-        </p:spPr>
+        <p:spPr/>
       </p:sp>
       <p:sp>
         <p:nvSpPr>
@@ -7595,54 +7999,56 @@
         </p:nvSpPr>
         <p:spPr/>
         <p:txBody>
-          <a:bodyPr>
-            <a:normAutofit/>
-          </a:bodyPr>
+          <a:bodyPr/>
           <a:lstStyle/>
           <a:p>
-            <a:endParaRPr lang="en-US" dirty="0"/>
+            <a:pPr marL="0" marR="0" lvl="0" indent="0" algn="l" defTabSz="914400" rtl="0" eaLnBrk="1" fontAlgn="auto" latinLnBrk="0" hangingPunct="1">
+              <a:lnSpc>
+                <a:spcPct val="100000"/>
+              </a:lnSpc>
+              <a:spcBef>
+                <a:spcPts val="0"/>
+              </a:spcBef>
+              <a:spcAft>
+                <a:spcPts val="0"/>
+              </a:spcAft>
+              <a:buClrTx/>
+              <a:buSzTx/>
+              <a:buFontTx/>
+              <a:buNone/>
+              <a:tabLst/>
+              <a:defRPr/>
+            </a:pPr>
+            <a:r>
+              <a:rPr lang="en-US" b="0" dirty="0">
+                <a:solidFill>
+                  <a:srgbClr val="D4D4D4"/>
+                </a:solidFill>
+                <a:effectLst/>
+                <a:latin typeface="Consolas" panose="020B0609020204030204" pitchFamily="49" charset="0"/>
+              </a:rPr>
+              <a:t>The model re-training process can be fully integrated with the DevOps process in an approach referred to as MLOps. This approach leverages Azure DevOps. The overall approach is to orchestrate continuous integration and continuous delivery Azure Pipelines from Azure DevOps. These pipelines are triggered by changes to artifacts that describe a machine learning pipeline. These pipelines are created with the Azure Machine Learning SDK or directly within the AML Studio UI. For example, checking in a change to the model training script executes the Azure Pipelines Build Pipeline, which trains (or re-trains) the model and creates the container image. Then this triggers an Azure Pipelines Release pipeline that deploys the model as a web service, by using the Docker image that was created in the Build pipeline. Once in production, the scoring web service is monitored using a combination of Application Insights and Azure Storage. This approach enables the deployment pipeline to be re-run to update any component of the solution, included models which have been re-trained.</a:t>
+            </a:r>
+            <a:endParaRPr lang="en-US" sz="1200" b="0" i="0" u="none" strike="noStrike" kern="1200" dirty="0">
+              <a:solidFill>
+                <a:schemeClr val="tx1"/>
+              </a:solidFill>
+              <a:effectLst/>
+              <a:latin typeface="+mn-lt"/>
+              <a:ea typeface="+mn-ea"/>
+              <a:cs typeface="+mn-cs"/>
+            </a:endParaRPr>
           </a:p>
         </p:txBody>
       </p:sp>
       <p:sp>
         <p:nvSpPr>
-          <p:cNvPr id="4" name="Header Placeholder 3"/>
+          <p:cNvPr id="4" name="Slide Number Placeholder 3"/>
           <p:cNvSpPr>
             <a:spLocks noGrp="1"/>
           </p:cNvSpPr>
           <p:nvPr>
-            <p:ph type="hdr" sz="quarter" idx="10"/>
-          </p:nvPr>
-        </p:nvSpPr>
-        <p:spPr>
-          <a:xfrm>
-            <a:off x="0" y="0"/>
-            <a:ext cx="2971800" cy="457200"/>
-          </a:xfrm>
-          <a:prstGeom prst="rect">
-            <a:avLst/>
-          </a:prstGeom>
-        </p:spPr>
-        <p:txBody>
-          <a:bodyPr/>
-          <a:lstStyle/>
-          <a:p>
-            <a:endParaRPr lang="en-US" dirty="0">
-              <a:solidFill>
-                <a:prstClr val="black"/>
-              </a:solidFill>
-            </a:endParaRPr>
-          </a:p>
-        </p:txBody>
-      </p:sp>
-      <p:sp>
-        <p:nvSpPr>
-          <p:cNvPr id="5" name="Date Placeholder 4"/>
-          <p:cNvSpPr>
-            <a:spLocks noGrp="1"/>
-          </p:cNvSpPr>
-          <p:nvPr>
-            <p:ph type="dt" idx="11"/>
+            <p:ph type="sldNum" sz="quarter" idx="10"/>
           </p:nvPr>
         </p:nvSpPr>
         <p:spPr/>
@@ -7650,96 +8056,18 @@
           <a:bodyPr/>
           <a:lstStyle/>
           <a:p>
-            <a:fld id="{8AB9A6D4-FB34-4BDB-BA1E-7271914431FC}" type="datetime8">
-              <a:rPr lang="en-US" smtClean="0">
-                <a:solidFill>
-                  <a:prstClr val="black"/>
-                </a:solidFill>
-              </a:rPr>
-              <a:t>10/7/2020 9:27 AM</a:t>
-            </a:fld>
-            <a:endParaRPr lang="en-US" dirty="0">
-              <a:solidFill>
-                <a:prstClr val="black"/>
-              </a:solidFill>
-            </a:endParaRPr>
-          </a:p>
-        </p:txBody>
-      </p:sp>
-      <p:sp>
-        <p:nvSpPr>
-          <p:cNvPr id="7" name="Slide Number Placeholder 6"/>
-          <p:cNvSpPr>
-            <a:spLocks noGrp="1"/>
-          </p:cNvSpPr>
-          <p:nvPr>
-            <p:ph type="sldNum" sz="quarter" idx="13"/>
-          </p:nvPr>
-        </p:nvSpPr>
-        <p:spPr/>
-        <p:txBody>
-          <a:bodyPr/>
-          <a:lstStyle/>
-          <a:p>
-            <a:fld id="{EC87E0CF-87F6-4B58-B8B8-DCAB2DAAF3CA}" type="slidenum">
-              <a:rPr lang="en-US" smtClean="0">
-                <a:solidFill>
-                  <a:prstClr val="black"/>
-                </a:solidFill>
-              </a:rPr>
-              <a:pPr/>
+            <a:fld id="{0998D5BB-B127-481F-BC0A-2F77C576BB34}" type="slidenum">
+              <a:rPr lang="en-US" smtClean="0"/>
               <a:t>39</a:t>
             </a:fld>
-            <a:endParaRPr lang="en-US" dirty="0">
-              <a:solidFill>
-                <a:prstClr val="black"/>
-              </a:solidFill>
-            </a:endParaRPr>
-          </a:p>
-        </p:txBody>
-      </p:sp>
-      <p:sp>
-        <p:nvSpPr>
-          <p:cNvPr id="6" name="Footer Placeholder 5"/>
-          <p:cNvSpPr>
-            <a:spLocks noGrp="1"/>
-          </p:cNvSpPr>
-          <p:nvPr>
-            <p:ph type="ftr" sz="quarter" idx="14"/>
-          </p:nvPr>
-        </p:nvSpPr>
-        <p:spPr/>
-        <p:txBody>
-          <a:bodyPr/>
-          <a:lstStyle/>
-          <a:p>
-            <a:pPr defTabSz="914099" eaLnBrk="0" hangingPunct="0"/>
-            <a:r>
-              <a:rPr lang="en-US" sz="400" dirty="0">
-                <a:gradFill>
-                  <a:gsLst>
-                    <a:gs pos="0">
-                      <a:prstClr val="black"/>
-                    </a:gs>
-                    <a:gs pos="100000">
-                      <a:prstClr val="black"/>
-                    </a:gs>
-                  </a:gsLst>
-                  <a:lin ang="5400000" scaled="0"/>
-                </a:gradFill>
-                <a:latin typeface="Segoe UI" pitchFamily="34" charset="0"/>
-                <a:ea typeface="Segoe UI" pitchFamily="34" charset="0"/>
-                <a:cs typeface="Segoe UI" pitchFamily="34" charset="0"/>
-              </a:rPr>
-              <a:t>© Microsoft Corporation. All rights reserved. MICROSOFT MAKES NO WARRANTIES, EXPRESS, IMPLIED OR STATUTORY, AS TO THE INFORMATION IN THIS PRESENTATION.</a:t>
-            </a:r>
+            <a:endParaRPr lang="en-US" dirty="0"/>
           </a:p>
         </p:txBody>
       </p:sp>
     </p:spTree>
     <p:extLst>
       <p:ext uri="{BB962C8B-B14F-4D97-AF65-F5344CB8AC3E}">
-        <p14:creationId xmlns:p14="http://schemas.microsoft.com/office/powerpoint/2010/main" val="4011344012"/>
+        <p14:creationId xmlns:p14="http://schemas.microsoft.com/office/powerpoint/2010/main" val="3100247705"/>
       </p:ext>
     </p:extLst>
   </p:cSld>
@@ -7793,121 +8121,109 @@
           <a:bodyPr/>
           <a:lstStyle/>
           <a:p>
-            <a:r>
-              <a:rPr lang="en-US" sz="1200" b="0" kern="1200" dirty="0">
-                <a:solidFill>
-                  <a:schemeClr val="tx1"/>
+            <a:pPr algn="l"/>
+            <a:r>
+              <a:rPr lang="en-US" b="0" i="0" dirty="0">
+                <a:solidFill>
+                  <a:srgbClr val="24292E"/>
                 </a:solidFill>
                 <a:effectLst/>
-                <a:latin typeface="+mn-lt"/>
-                <a:ea typeface="+mn-ea"/>
-                <a:cs typeface="+mn-cs"/>
-              </a:rPr>
-              <a:t>Wide World Importers (WWI) has hundreds of brick and mortar stores and an online store where they sell a variety of products.</a:t>
-            </a:r>
-          </a:p>
-          <a:p>
-            <a:br>
-              <a:rPr lang="en-US" sz="1200" b="0" kern="1200" dirty="0">
-                <a:solidFill>
-                  <a:schemeClr val="tx1"/>
+                <a:latin typeface="-apple-system"/>
+              </a:rPr>
+              <a:t>Wide World Importers (WWI) has hundreds of brick-and-mortar stores and an online store where they sell various products.</a:t>
+            </a:r>
+          </a:p>
+          <a:p>
+            <a:pPr algn="l"/>
+            <a:endParaRPr lang="en-US" b="0" i="0" dirty="0">
+              <a:solidFill>
+                <a:srgbClr val="24292E"/>
+              </a:solidFill>
+              <a:effectLst/>
+              <a:latin typeface="-apple-system"/>
+            </a:endParaRPr>
+          </a:p>
+          <a:p>
+            <a:pPr algn="l"/>
+            <a:r>
+              <a:rPr lang="en-US" b="0" i="0" dirty="0">
+                <a:solidFill>
+                  <a:srgbClr val="24292E"/>
                 </a:solidFill>
                 <a:effectLst/>
-                <a:latin typeface="+mn-lt"/>
-                <a:ea typeface="+mn-ea"/>
-                <a:cs typeface="+mn-cs"/>
-              </a:rPr>
-            </a:br>
-            <a:r>
-              <a:rPr lang="en-US" sz="1200" b="0" kern="1200" dirty="0">
-                <a:solidFill>
-                  <a:schemeClr val="tx1"/>
+                <a:latin typeface="-apple-system"/>
+              </a:rPr>
+              <a:t>WWI believes that data is the oxygen of retail. Retail has never been short of data, but they have not been able to maximize the value of this data. They struggle with fragmented data and a lack of understanding of customer behavior and expectations. They believe that a successful customer experience strategy is founded upon the effective use of data.</a:t>
+            </a:r>
+          </a:p>
+          <a:p>
+            <a:pPr algn="l"/>
+            <a:endParaRPr lang="en-US" b="0" i="0" dirty="0">
+              <a:solidFill>
+                <a:srgbClr val="24292E"/>
+              </a:solidFill>
+              <a:effectLst/>
+              <a:latin typeface="-apple-system"/>
+            </a:endParaRPr>
+          </a:p>
+          <a:p>
+            <a:pPr algn="l"/>
+            <a:r>
+              <a:rPr lang="en-US" b="0" i="0" dirty="0">
+                <a:solidFill>
+                  <a:srgbClr val="24292E"/>
                 </a:solidFill>
                 <a:effectLst/>
-                <a:latin typeface="+mn-lt"/>
-                <a:ea typeface="+mn-ea"/>
-                <a:cs typeface="+mn-cs"/>
-              </a:rPr>
-              <a:t>WWI believes that data is the oxygen of retail. Retail has never been short of data, but they have not been able to maximize the value of this data. They struggle with fragmented data and a lack of understanding of customer behavior and expectations and believe that a successful customer experience strategy is founded upon the effective use of data.</a:t>
-            </a:r>
-          </a:p>
-          <a:p>
-            <a:br>
-              <a:rPr lang="en-US" sz="1200" b="0" kern="1200" dirty="0">
-                <a:solidFill>
-                  <a:schemeClr val="tx1"/>
+                <a:latin typeface="-apple-system"/>
+              </a:rPr>
+              <a:t>They understand that using analytics on top of retail data has the potential to unlock ways for them to improve personalized, omnichannel campaigns that engage potential and existing customers across their buying journey.</a:t>
+            </a:r>
+          </a:p>
+          <a:p>
+            <a:pPr algn="l"/>
+            <a:endParaRPr lang="en-US" b="0" i="0" dirty="0">
+              <a:solidFill>
+                <a:srgbClr val="24292E"/>
+              </a:solidFill>
+              <a:effectLst/>
+              <a:latin typeface="-apple-system"/>
+            </a:endParaRPr>
+          </a:p>
+          <a:p>
+            <a:pPr algn="l"/>
+            <a:r>
+              <a:rPr lang="en-US" b="0" i="0" dirty="0">
+                <a:solidFill>
+                  <a:srgbClr val="24292E"/>
                 </a:solidFill>
                 <a:effectLst/>
-                <a:latin typeface="+mn-lt"/>
-                <a:ea typeface="+mn-ea"/>
-                <a:cs typeface="+mn-cs"/>
-              </a:rPr>
-            </a:br>
-            <a:r>
-              <a:rPr lang="en-US" sz="1200" b="0" kern="1200" dirty="0">
-                <a:solidFill>
-                  <a:schemeClr val="tx1"/>
+                <a:latin typeface="-apple-system"/>
+              </a:rPr>
+              <a:t>They would like to combine their retail lifecycle data, including customer data, operations data, sourcing, and supplier data as well as transaction data with analytics to reduce churn, enhance loyalty, advance customer journeys, enable the ability to conduct contextual marketing, measure attribution and provide insights across their enterprise to drive growth across the organization holistically. However, WWI is worried that finding the correct data in a larger pool can be much more challenging after the unification.</a:t>
+            </a:r>
+          </a:p>
+          <a:p>
+            <a:pPr algn="l"/>
+            <a:endParaRPr lang="en-US" b="0" i="0" dirty="0">
+              <a:solidFill>
+                <a:srgbClr val="24292E"/>
+              </a:solidFill>
+              <a:effectLst/>
+              <a:latin typeface="-apple-system"/>
+            </a:endParaRPr>
+          </a:p>
+          <a:p>
+            <a:pPr algn="l"/>
+            <a:r>
+              <a:rPr lang="en-US" b="0" i="0" dirty="0">
+                <a:solidFill>
+                  <a:srgbClr val="24292E"/>
                 </a:solidFill>
                 <a:effectLst/>
-                <a:latin typeface="+mn-lt"/>
-                <a:ea typeface="+mn-ea"/>
-                <a:cs typeface="+mn-cs"/>
-              </a:rPr>
-              <a:t>They understand that using analytics on top of retail data has the potential to unlock ways for them to improve personalized, omni-channel campaigns that engage potential and existing customers across their buying journey.</a:t>
-            </a:r>
-          </a:p>
-          <a:p>
-            <a:br>
-              <a:rPr lang="en-US" sz="1200" b="0" kern="1200" dirty="0">
-                <a:solidFill>
-                  <a:schemeClr val="tx1"/>
-                </a:solidFill>
-                <a:effectLst/>
-                <a:latin typeface="+mn-lt"/>
-                <a:ea typeface="+mn-ea"/>
-                <a:cs typeface="+mn-cs"/>
-              </a:rPr>
-            </a:br>
-            <a:r>
-              <a:rPr lang="en-US" sz="1200" b="0" kern="1200" dirty="0">
-                <a:solidFill>
-                  <a:schemeClr val="tx1"/>
-                </a:solidFill>
-                <a:effectLst/>
-                <a:latin typeface="+mn-lt"/>
-                <a:ea typeface="+mn-ea"/>
-                <a:cs typeface="+mn-cs"/>
-              </a:rPr>
-              <a:t>They would like to combine their retail lifecycle data including customer data, operations data, sourcing and supplier data as well as transaction data with analytics to reduce churn, enhance loyalty, advance customer journeys, enable the ability to conduct contextual marketing, measure attribution and provide insights across their enterprise to holistically drive growth across the organization.</a:t>
-            </a:r>
-          </a:p>
-          <a:p>
-            <a:br>
-              <a:rPr lang="en-US" sz="1200" b="0" kern="1200" dirty="0">
-                <a:solidFill>
-                  <a:schemeClr val="tx1"/>
-                </a:solidFill>
-                <a:effectLst/>
-                <a:latin typeface="+mn-lt"/>
-                <a:ea typeface="+mn-ea"/>
-                <a:cs typeface="+mn-cs"/>
-              </a:rPr>
-            </a:br>
-            <a:r>
-              <a:rPr lang="en-US" sz="1200" b="0" kern="1200" dirty="0">
-                <a:solidFill>
-                  <a:schemeClr val="tx1"/>
-                </a:solidFill>
-                <a:effectLst/>
-                <a:latin typeface="+mn-lt"/>
-                <a:ea typeface="+mn-ea"/>
-                <a:cs typeface="+mn-cs"/>
-              </a:rPr>
-              <a:t>They are looking to use historical campaign and customer analytics data and make decisions for the present. Beyond these large historical data sets, they would like to use streaming tweet data from Twitter as well as telemetry from IoT sensors in their brick and mortar locations. In effect, they would like to use data from the present moment to inform decisions for the next moment. WWI sees an opportunity to use their data to predict the future, initially by making product recommendations.</a:t>
-            </a:r>
-          </a:p>
-          <a:p>
-            <a:endParaRPr lang="en-US" dirty="0"/>
+                <a:latin typeface="-apple-system"/>
+              </a:rPr>
+              <a:t>They are looking to use historical campaign and customer analytics data and make decisions for the present. Beyond these large historical data sets, they would like to use streaming tweet data from Twitter and telemetry from IoT sensors in their brick and mortar locations. In effect, they would like to use data from the present moment to inform decisions for the next moment. WWI sees an opportunity to use their data to predict the future, initially by making product recommendations.</a:t>
+            </a:r>
           </a:p>
         </p:txBody>
       </p:sp>
@@ -7938,6 +8254,290 @@
     <p:extLst>
       <p:ext uri="{BB962C8B-B14F-4D97-AF65-F5344CB8AC3E}">
         <p14:creationId xmlns:p14="http://schemas.microsoft.com/office/powerpoint/2010/main" val="767710843"/>
+      </p:ext>
+    </p:extLst>
+  </p:cSld>
+  <p:clrMapOvr>
+    <a:masterClrMapping/>
+  </p:clrMapOvr>
+</p:notes>
+</file>
+
+<file path=ppt/notesSlides/notesSlide40.xml><?xml version="1.0" encoding="utf-8"?>
+<p:notes xmlns:a="http://schemas.openxmlformats.org/drawingml/2006/main" xmlns:r="http://schemas.openxmlformats.org/officeDocument/2006/relationships" xmlns:p="http://schemas.openxmlformats.org/presentationml/2006/main">
+  <p:cSld>
+    <p:spTree>
+      <p:nvGrpSpPr>
+        <p:cNvPr id="1" name=""/>
+        <p:cNvGrpSpPr/>
+        <p:nvPr/>
+      </p:nvGrpSpPr>
+      <p:grpSpPr>
+        <a:xfrm>
+          <a:off x="0" y="0"/>
+          <a:ext cx="0" cy="0"/>
+          <a:chOff x="0" y="0"/>
+          <a:chExt cx="0" cy="0"/>
+        </a:xfrm>
+      </p:grpSpPr>
+      <p:sp>
+        <p:nvSpPr>
+          <p:cNvPr id="2" name="Slide Image Placeholder 1"/>
+          <p:cNvSpPr>
+            <a:spLocks noGrp="1" noRot="1" noChangeAspect="1"/>
+          </p:cNvSpPr>
+          <p:nvPr>
+            <p:ph type="sldImg"/>
+          </p:nvPr>
+        </p:nvSpPr>
+        <p:spPr/>
+      </p:sp>
+      <p:sp>
+        <p:nvSpPr>
+          <p:cNvPr id="3" name="Notes Placeholder 2"/>
+          <p:cNvSpPr>
+            <a:spLocks noGrp="1"/>
+          </p:cNvSpPr>
+          <p:nvPr>
+            <p:ph type="body" idx="1"/>
+          </p:nvPr>
+        </p:nvSpPr>
+        <p:spPr/>
+        <p:txBody>
+          <a:bodyPr/>
+          <a:lstStyle/>
+          <a:p>
+            <a:endParaRPr lang="en-US" dirty="0"/>
+          </a:p>
+        </p:txBody>
+      </p:sp>
+      <p:sp>
+        <p:nvSpPr>
+          <p:cNvPr id="4" name="Slide Number Placeholder 3"/>
+          <p:cNvSpPr>
+            <a:spLocks noGrp="1"/>
+          </p:cNvSpPr>
+          <p:nvPr>
+            <p:ph type="sldNum" sz="quarter" idx="10"/>
+          </p:nvPr>
+        </p:nvSpPr>
+        <p:spPr/>
+        <p:txBody>
+          <a:bodyPr/>
+          <a:lstStyle/>
+          <a:p>
+            <a:fld id="{0998D5BB-B127-481F-BC0A-2F77C576BB34}" type="slidenum">
+              <a:rPr lang="en-US" smtClean="0"/>
+              <a:t>40</a:t>
+            </a:fld>
+            <a:endParaRPr lang="en-US" dirty="0"/>
+          </a:p>
+        </p:txBody>
+      </p:sp>
+    </p:spTree>
+    <p:extLst>
+      <p:ext uri="{BB962C8B-B14F-4D97-AF65-F5344CB8AC3E}">
+        <p14:creationId xmlns:p14="http://schemas.microsoft.com/office/powerpoint/2010/main" val="671285550"/>
+      </p:ext>
+    </p:extLst>
+  </p:cSld>
+  <p:clrMapOvr>
+    <a:masterClrMapping/>
+  </p:clrMapOvr>
+</p:notes>
+</file>
+
+<file path=ppt/notesSlides/notesSlide41.xml><?xml version="1.0" encoding="utf-8"?>
+<p:notes xmlns:a="http://schemas.openxmlformats.org/drawingml/2006/main" xmlns:r="http://schemas.openxmlformats.org/officeDocument/2006/relationships" xmlns:p="http://schemas.openxmlformats.org/presentationml/2006/main">
+  <p:cSld>
+    <p:spTree>
+      <p:nvGrpSpPr>
+        <p:cNvPr id="1" name=""/>
+        <p:cNvGrpSpPr/>
+        <p:nvPr/>
+      </p:nvGrpSpPr>
+      <p:grpSpPr>
+        <a:xfrm>
+          <a:off x="0" y="0"/>
+          <a:ext cx="0" cy="0"/>
+          <a:chOff x="0" y="0"/>
+          <a:chExt cx="0" cy="0"/>
+        </a:xfrm>
+      </p:grpSpPr>
+      <p:sp>
+        <p:nvSpPr>
+          <p:cNvPr id="2" name="Slide Image Placeholder 1"/>
+          <p:cNvSpPr>
+            <a:spLocks noGrp="1" noRot="1" noChangeAspect="1"/>
+          </p:cNvSpPr>
+          <p:nvPr>
+            <p:ph type="sldImg"/>
+          </p:nvPr>
+        </p:nvSpPr>
+        <p:spPr>
+          <a:xfrm>
+            <a:off x="381000" y="685800"/>
+            <a:ext cx="6096000" cy="3429000"/>
+          </a:xfrm>
+        </p:spPr>
+      </p:sp>
+      <p:sp>
+        <p:nvSpPr>
+          <p:cNvPr id="3" name="Notes Placeholder 2"/>
+          <p:cNvSpPr>
+            <a:spLocks noGrp="1"/>
+          </p:cNvSpPr>
+          <p:nvPr>
+            <p:ph type="body" idx="1"/>
+          </p:nvPr>
+        </p:nvSpPr>
+        <p:spPr/>
+        <p:txBody>
+          <a:bodyPr>
+            <a:normAutofit/>
+          </a:bodyPr>
+          <a:lstStyle/>
+          <a:p>
+            <a:endParaRPr lang="en-US" dirty="0"/>
+          </a:p>
+        </p:txBody>
+      </p:sp>
+      <p:sp>
+        <p:nvSpPr>
+          <p:cNvPr id="4" name="Header Placeholder 3"/>
+          <p:cNvSpPr>
+            <a:spLocks noGrp="1"/>
+          </p:cNvSpPr>
+          <p:nvPr>
+            <p:ph type="hdr" sz="quarter" idx="10"/>
+          </p:nvPr>
+        </p:nvSpPr>
+        <p:spPr>
+          <a:xfrm>
+            <a:off x="0" y="0"/>
+            <a:ext cx="2971800" cy="457200"/>
+          </a:xfrm>
+          <a:prstGeom prst="rect">
+            <a:avLst/>
+          </a:prstGeom>
+        </p:spPr>
+        <p:txBody>
+          <a:bodyPr/>
+          <a:lstStyle/>
+          <a:p>
+            <a:endParaRPr lang="en-US" dirty="0">
+              <a:solidFill>
+                <a:prstClr val="black"/>
+              </a:solidFill>
+            </a:endParaRPr>
+          </a:p>
+        </p:txBody>
+      </p:sp>
+      <p:sp>
+        <p:nvSpPr>
+          <p:cNvPr id="5" name="Date Placeholder 4"/>
+          <p:cNvSpPr>
+            <a:spLocks noGrp="1"/>
+          </p:cNvSpPr>
+          <p:nvPr>
+            <p:ph type="dt" idx="11"/>
+          </p:nvPr>
+        </p:nvSpPr>
+        <p:spPr/>
+        <p:txBody>
+          <a:bodyPr/>
+          <a:lstStyle/>
+          <a:p>
+            <a:fld id="{8AB9A6D4-FB34-4BDB-BA1E-7271914431FC}" type="datetime8">
+              <a:rPr lang="en-US" smtClean="0">
+                <a:solidFill>
+                  <a:prstClr val="black"/>
+                </a:solidFill>
+              </a:rPr>
+              <a:t>2021-06-09 4:10 PM</a:t>
+            </a:fld>
+            <a:endParaRPr lang="en-US" dirty="0">
+              <a:solidFill>
+                <a:prstClr val="black"/>
+              </a:solidFill>
+            </a:endParaRPr>
+          </a:p>
+        </p:txBody>
+      </p:sp>
+      <p:sp>
+        <p:nvSpPr>
+          <p:cNvPr id="7" name="Slide Number Placeholder 6"/>
+          <p:cNvSpPr>
+            <a:spLocks noGrp="1"/>
+          </p:cNvSpPr>
+          <p:nvPr>
+            <p:ph type="sldNum" sz="quarter" idx="13"/>
+          </p:nvPr>
+        </p:nvSpPr>
+        <p:spPr/>
+        <p:txBody>
+          <a:bodyPr/>
+          <a:lstStyle/>
+          <a:p>
+            <a:fld id="{EC87E0CF-87F6-4B58-B8B8-DCAB2DAAF3CA}" type="slidenum">
+              <a:rPr lang="en-US" smtClean="0">
+                <a:solidFill>
+                  <a:prstClr val="black"/>
+                </a:solidFill>
+              </a:rPr>
+              <a:pPr/>
+              <a:t>41</a:t>
+            </a:fld>
+            <a:endParaRPr lang="en-US" dirty="0">
+              <a:solidFill>
+                <a:prstClr val="black"/>
+              </a:solidFill>
+            </a:endParaRPr>
+          </a:p>
+        </p:txBody>
+      </p:sp>
+      <p:sp>
+        <p:nvSpPr>
+          <p:cNvPr id="6" name="Footer Placeholder 5"/>
+          <p:cNvSpPr>
+            <a:spLocks noGrp="1"/>
+          </p:cNvSpPr>
+          <p:nvPr>
+            <p:ph type="ftr" sz="quarter" idx="14"/>
+          </p:nvPr>
+        </p:nvSpPr>
+        <p:spPr/>
+        <p:txBody>
+          <a:bodyPr/>
+          <a:lstStyle/>
+          <a:p>
+            <a:pPr defTabSz="914099" eaLnBrk="0" hangingPunct="0"/>
+            <a:r>
+              <a:rPr lang="en-US" sz="400" dirty="0">
+                <a:gradFill>
+                  <a:gsLst>
+                    <a:gs pos="0">
+                      <a:prstClr val="black"/>
+                    </a:gs>
+                    <a:gs pos="100000">
+                      <a:prstClr val="black"/>
+                    </a:gs>
+                  </a:gsLst>
+                  <a:lin ang="5400000" scaled="0"/>
+                </a:gradFill>
+                <a:latin typeface="Segoe UI" pitchFamily="34" charset="0"/>
+                <a:ea typeface="Segoe UI" pitchFamily="34" charset="0"/>
+                <a:cs typeface="Segoe UI" pitchFamily="34" charset="0"/>
+              </a:rPr>
+              <a:t>© Microsoft Corporation. All rights reserved. MICROSOFT MAKES NO WARRANTIES, EXPRESS, IMPLIED OR STATUTORY, AS TO THE INFORMATION IN THIS PRESENTATION.</a:t>
+            </a:r>
+          </a:p>
+        </p:txBody>
+      </p:sp>
+    </p:spTree>
+    <p:extLst>
+      <p:ext uri="{BB962C8B-B14F-4D97-AF65-F5344CB8AC3E}">
+        <p14:creationId xmlns:p14="http://schemas.microsoft.com/office/powerpoint/2010/main" val="4011344012"/>
       </p:ext>
     </p:extLst>
   </p:cSld>
@@ -7992,30 +8592,15 @@
           <a:lstStyle/>
           <a:p>
             <a:r>
-              <a:rPr lang="en-US" sz="1200" b="0" kern="1200" dirty="0">
-                <a:solidFill>
-                  <a:schemeClr val="tx1"/>
+              <a:rPr lang="en-US" b="0" i="0" dirty="0">
+                <a:solidFill>
+                  <a:srgbClr val="24292E"/>
                 </a:solidFill>
                 <a:effectLst/>
-                <a:latin typeface="+mn-lt"/>
-                <a:ea typeface="+mn-ea"/>
-                <a:cs typeface="+mn-cs"/>
-              </a:rPr>
-              <a:t>According to Peter Guerin, Chief Technical Officer (CTO), Wide World Importers has over 5 years of sales transaction data from Oracle, consisting of more than 30 billion rows. But that is not their only enterprise data source. They have finance data stored in SAP Hana, marketing data in Teradata and social media data coming in from Twitter. They need a solution that allows them to integrate, query over and analyze the data from all of these sources. Additionally, regardless of the volume, they want to be able to execute queries across such data with results returning in seconds.</a:t>
-            </a:r>
-          </a:p>
-          <a:p>
-            <a:br>
-              <a:rPr lang="en-US" sz="1200" b="0" kern="1200" dirty="0">
-                <a:solidFill>
-                  <a:schemeClr val="tx1"/>
-                </a:solidFill>
-                <a:effectLst/>
-                <a:latin typeface="+mn-lt"/>
-                <a:ea typeface="+mn-ea"/>
-                <a:cs typeface="+mn-cs"/>
-              </a:rPr>
-            </a:br>
+                <a:latin typeface="-apple-system"/>
+              </a:rPr>
+              <a:t>According to Peter Guerin, Chief Technical Officer (CTO), Wide World Importers has over five years of sales transaction data from Oracle, consisting of more than 30 billion rows. But that is not their only enterprise data source. They have finance data stored in SAP HANA, marketing data in Teradata, and social media data coming in from Twitter. They need a solution that allows them to discover, integrate, query, and analyze the data from all of these sources. They worry that their current catalog might be missing some internal data sets used by smaller departments. Additionally, regardless of the volume, they want to be able to execute queries across such data with results returning in seconds.</a:t>
+            </a:r>
             <a:endParaRPr lang="en-US" dirty="0"/>
           </a:p>
         </p:txBody>
@@ -8118,19 +8703,15 @@
               <a:defRPr/>
             </a:pPr>
             <a:r>
-              <a:rPr lang="en-US" sz="1200" b="0" kern="1200" dirty="0">
-                <a:solidFill>
-                  <a:schemeClr val="tx1"/>
+              <a:rPr lang="en-US" b="0" i="0" dirty="0">
+                <a:solidFill>
+                  <a:srgbClr val="24292E"/>
                 </a:solidFill>
                 <a:effectLst/>
-                <a:latin typeface="+mn-lt"/>
-                <a:ea typeface="+mn-ea"/>
-                <a:cs typeface="+mn-cs"/>
-              </a:rPr>
-              <a:t>In addition to those data sources, they have in-store IoT sensors producing telemetry data that tracks the traffic patterns of customers walking the aisles. Each store has 50 sensors, and they have 100 stores equipped to provide this real-time data. Using this data they want to understand in which departments (or groups of aisles) people are spending most of their time, and which of those they are not. They would like a solution to ensure that this data gets ingested and processed in near real time, allowing them to quickly identify patterns that can be shared between stores. For example, as stores open on the East Coast, patterns detected in early buying behavior could inform last minute offers and in store product placement of products in their West Coast stores that have yet to open.</a:t>
-            </a:r>
-          </a:p>
-          <a:p>
+                <a:latin typeface="-apple-system"/>
+              </a:rPr>
+              <a:t>In addition to those data sources, they have in-store IoT sensors producing telemetry data that track the traffic patterns of customers walking the aisles. Each store has 50 sensors, and they have 100 stores equipped to provide this real-time data. Using this data, they want to understand in which departments (or groups of aisles) people are spending most of their time and which of those they are not. They would like a solution to ensure that this data gets ingested and processed in near real-time, allowing them to quickly identify patterns that can be shared between stores. For example, as stores open on the East Coast, patterns detected in early buying behavior could inform last-minute offers and in-store product placement of products in their West Coast stores that have yet to open.</a:t>
+            </a:r>
             <a:endParaRPr lang="en-US" dirty="0"/>
           </a:p>
         </p:txBody>
@@ -8250,8 +8831,27 @@
                 <a:ea typeface="+mn-ea"/>
                 <a:cs typeface="+mn-cs"/>
               </a:rPr>
-              <a:t>Peter (CTO)  also mentioned that, in his experience, a point of frustration with the tools was how much setup was required before any preliminary exploratory data analysis could be performed. So he would prefer a solution that allows WWI to quickly explore the raw ingested data to understand its contents.</a:t>
-            </a:r>
+              <a:t>Peter (CTO)  also mentioned that, in his experience, a point of frustration with the tools was how much setup was required before any preliminary exploratory data analysis could be performed. So he would prefer a solution that allows WWI to quickly explore the raw ingested data to understand its contents. </a:t>
+            </a:r>
+            <a:r>
+              <a:rPr lang="en-US" b="0" i="0" dirty="0">
+                <a:solidFill>
+                  <a:srgbClr val="24292E"/>
+                </a:solidFill>
+                <a:effectLst/>
+                <a:latin typeface="-apple-system"/>
+              </a:rPr>
+              <a:t>Though, Peter is worried that by centralizing multiple sources into a single unified environment, they can lose track of the origin of the data and where it moves over. </a:t>
+            </a:r>
+            <a:endParaRPr lang="en-US" sz="1200" b="0" kern="1200" dirty="0">
+              <a:solidFill>
+                <a:schemeClr val="tx1"/>
+              </a:solidFill>
+              <a:effectLst/>
+              <a:latin typeface="+mn-lt"/>
+              <a:ea typeface="+mn-ea"/>
+              <a:cs typeface="+mn-cs"/>
+            </a:endParaRPr>
           </a:p>
           <a:p>
             <a:endParaRPr lang="en-US" dirty="0"/>
@@ -20691,7 +21291,7 @@
         </p:spPr>
         <p:txBody>
           <a:bodyPr>
-            <a:normAutofit/>
+            <a:normAutofit fontScale="92500" lnSpcReduction="10000"/>
           </a:bodyPr>
           <a:lstStyle/>
           <a:p>
@@ -20707,7 +21307,7 @@
                 </a:solidFill>
                 <a:latin typeface="+mj-lt"/>
               </a:rPr>
-              <a:t>Minimize the number of services used to ingest, transform, query and store data.</a:t>
+              <a:t>Enhanced ability to discovery data using business or technical terms for business analysts.</a:t>
             </a:r>
           </a:p>
           <a:p>
@@ -20721,8 +21321,9 @@
                 <a:solidFill>
                   <a:schemeClr val="tx1"/>
                 </a:solidFill>
-              </a:rPr>
-              <a:t>Work within a single collaborative environment.</a:t>
+                <a:latin typeface="+mj-lt"/>
+              </a:rPr>
+              <a:t>Minimize the number of services used to ingest, transform, query and store data.</a:t>
             </a:r>
           </a:p>
           <a:p>
@@ -20737,7 +21338,52 @@
                   <a:schemeClr val="tx1"/>
                 </a:solidFill>
               </a:rPr>
+              <a:t>Work within a single collaborative environment.</a:t>
+            </a:r>
+          </a:p>
+          <a:p>
+            <a:pPr>
+              <a:lnSpc>
+                <a:spcPct val="100000"/>
+              </a:lnSpc>
+            </a:pPr>
+            <a:r>
+              <a:rPr lang="en-US" sz="2800" dirty="0">
+                <a:solidFill>
+                  <a:schemeClr val="tx1"/>
+                </a:solidFill>
+              </a:rPr>
               <a:t>Concerned about performance, must make sure core approaches for best performance of the solution are well understood.</a:t>
+            </a:r>
+          </a:p>
+          <a:p>
+            <a:pPr>
+              <a:lnSpc>
+                <a:spcPct val="100000"/>
+              </a:lnSpc>
+            </a:pPr>
+            <a:r>
+              <a:rPr lang="en-US" sz="2800" dirty="0">
+                <a:solidFill>
+                  <a:schemeClr val="tx1"/>
+                </a:solidFill>
+              </a:rPr>
+              <a:t>Worried about the side effects of data centralization. Data governance, regulatory compliance risks have to be managed.</a:t>
+            </a:r>
+          </a:p>
+          <a:p>
+            <a:pPr>
+              <a:lnSpc>
+                <a:spcPct val="100000"/>
+              </a:lnSpc>
+            </a:pPr>
+            <a:r>
+              <a:rPr lang="en-US" sz="2800" dirty="0">
+                <a:solidFill>
+                  <a:schemeClr val="tx1"/>
+                </a:solidFill>
+              </a:rPr>
+              <a:t>Monitor the use of data across pipelines and reports.</a:t>
             </a:r>
           </a:p>
           <a:p>
@@ -21037,7 +21683,7 @@
         <p:spPr>
           <a:xfrm>
             <a:off x="269239" y="1189177"/>
-            <a:ext cx="11653523" cy="4752070"/>
+            <a:ext cx="11653523" cy="5182957"/>
           </a:xfrm>
         </p:spPr>
         <p:txBody>
@@ -21073,7 +21719,7 @@
             </a:pPr>
             <a:r>
               <a:rPr lang="en-US" sz="2800" dirty="0"/>
-              <a:t>Would data be protected at rest and are there controls over the keys used to encrypt it?</a:t>
+              <a:t>Having multiple data sources, pipelines and reports makes it hard to track what data goes where and is accessed by who. Is there a way to visualize a complete data supply chain from raw data to business insights?</a:t>
             </a:r>
           </a:p>
           <a:p>
@@ -21084,7 +21730,7 @@
             </a:pPr>
             <a:r>
               <a:rPr lang="en-US" sz="2800" dirty="0"/>
-              <a:t>Azure Databricks and Azure Synapse Analytics seem to have overlapping capabilities, how does one choose between them?</a:t>
+              <a:t>Would data be protected at rest and are there controls over the keys used to encrypt it?</a:t>
             </a:r>
           </a:p>
         </p:txBody>
@@ -21189,12 +21835,23 @@
         <p:spPr>
           <a:xfrm>
             <a:off x="269239" y="1189177"/>
-            <a:ext cx="11653523" cy="4579715"/>
+            <a:ext cx="11653523" cy="5527667"/>
           </a:xfrm>
         </p:spPr>
         <p:txBody>
           <a:bodyPr/>
           <a:lstStyle/>
+          <a:p>
+            <a:pPr>
+              <a:lnSpc>
+                <a:spcPct val="100000"/>
+              </a:lnSpc>
+            </a:pPr>
+            <a:r>
+              <a:rPr lang="en-US" sz="2800" dirty="0"/>
+              <a:t>Azure Databricks and Azure Synapse Analytics seem to have overlapping capabilities, how does one choose between them?</a:t>
+            </a:r>
+          </a:p>
           <a:p>
             <a:pPr>
               <a:lnSpc>
@@ -21300,41 +21957,146 @@
           </a:p>
         </p:txBody>
       </p:sp>
-      <p:pic>
-        <p:nvPicPr>
-          <p:cNvPr id="7" name="Picture 6" descr="Overview of Azure Synapse Analytics features and capabilities. Showing how one solution provides the user experience with Azure Synapse Studio, a platform for processing data with SQL and Spark, and integrated management of the data lake.">
+      <p:grpSp>
+        <p:nvGrpSpPr>
+          <p:cNvPr id="3" name="Group 2" descr="Overview of Azure Synapse Analytics features and capabilities. Showing how one solution provides the user experience with Azure Synapse Studio, a platform for processing data with SQL and Spark, and integrated management of the data lake.">
             <a:extLst>
               <a:ext uri="{FF2B5EF4-FFF2-40B4-BE49-F238E27FC236}">
-                <a16:creationId xmlns:a16="http://schemas.microsoft.com/office/drawing/2014/main" id="{F7761FDD-1C22-494C-B895-4A02D9FDBEC0}"/>
+                <a16:creationId xmlns:a16="http://schemas.microsoft.com/office/drawing/2014/main" id="{E07992A7-5540-4CDF-A9D7-7AA04E492CA4}"/>
               </a:ext>
             </a:extLst>
           </p:cNvPr>
-          <p:cNvPicPr>
-            <a:picLocks noChangeAspect="1"/>
-          </p:cNvPicPr>
+          <p:cNvGrpSpPr/>
           <p:nvPr/>
-        </p:nvPicPr>
-        <p:blipFill>
-          <a:blip r:embed="rId3">
-            <a:extLst>
-              <a:ext uri="{28A0092B-C50C-407E-A947-70E740481C1C}">
-                <a14:useLocalDpi xmlns:a14="http://schemas.microsoft.com/office/drawing/2010/main" val="0"/>
-              </a:ext>
-            </a:extLst>
-          </a:blip>
-          <a:srcRect/>
-          <a:stretch/>
-        </p:blipFill>
-        <p:spPr>
+        </p:nvGrpSpPr>
+        <p:grpSpPr>
           <a:xfrm>
-            <a:off x="964962" y="1228813"/>
-            <a:ext cx="10262076" cy="5202226"/>
+            <a:off x="1" y="1189176"/>
+            <a:ext cx="12192000" cy="5668824"/>
+            <a:chOff x="1" y="1189176"/>
+            <a:chExt cx="12192000" cy="5668824"/>
           </a:xfrm>
-          <a:prstGeom prst="rect">
-            <a:avLst/>
-          </a:prstGeom>
-        </p:spPr>
-      </p:pic>
+        </p:grpSpPr>
+        <p:sp>
+          <p:nvSpPr>
+            <p:cNvPr id="4" name="Rectangle 3">
+              <a:extLst>
+                <a:ext uri="{FF2B5EF4-FFF2-40B4-BE49-F238E27FC236}">
+                  <a16:creationId xmlns:a16="http://schemas.microsoft.com/office/drawing/2014/main" id="{BD0DAD16-AFCC-45A6-892B-377B1A0378CC}"/>
+                </a:ext>
+              </a:extLst>
+            </p:cNvPr>
+            <p:cNvSpPr/>
+            <p:nvPr/>
+          </p:nvSpPr>
+          <p:spPr bwMode="auto">
+            <a:xfrm>
+              <a:off x="1" y="1189176"/>
+              <a:ext cx="12192000" cy="5668824"/>
+            </a:xfrm>
+            <a:prstGeom prst="rect">
+              <a:avLst/>
+            </a:prstGeom>
+            <a:solidFill>
+              <a:schemeClr val="tx1"/>
+            </a:solidFill>
+            <a:ln>
+              <a:solidFill>
+                <a:schemeClr val="tx1"/>
+              </a:solidFill>
+              <a:headEnd type="none" w="med" len="med"/>
+              <a:tailEnd type="none" w="med" len="med"/>
+            </a:ln>
+            <a:effectLst/>
+          </p:spPr>
+          <p:style>
+            <a:lnRef idx="1">
+              <a:schemeClr val="accent2"/>
+            </a:lnRef>
+            <a:fillRef idx="3">
+              <a:schemeClr val="accent2"/>
+            </a:fillRef>
+            <a:effectRef idx="2">
+              <a:schemeClr val="accent2"/>
+            </a:effectRef>
+            <a:fontRef idx="minor">
+              <a:schemeClr val="lt1"/>
+            </a:fontRef>
+          </p:style>
+          <p:txBody>
+            <a:bodyPr rot="0" spcFirstLastPara="0" vertOverflow="overflow" horzOverflow="overflow" vert="horz" wrap="square" lIns="182880" tIns="146304" rIns="182880" bIns="146304" numCol="1" spcCol="0" rtlCol="0" fromWordArt="0" anchor="t" anchorCtr="0" forceAA="0" compatLnSpc="1">
+              <a:prstTxWarp prst="textNoShape">
+                <a:avLst/>
+              </a:prstTxWarp>
+              <a:noAutofit/>
+            </a:bodyPr>
+            <a:lstStyle/>
+            <a:p>
+              <a:pPr algn="ctr" defTabSz="932472" fontAlgn="base">
+                <a:lnSpc>
+                  <a:spcPct val="90000"/>
+                </a:lnSpc>
+                <a:spcBef>
+                  <a:spcPct val="0"/>
+                </a:spcBef>
+                <a:spcAft>
+                  <a:spcPct val="0"/>
+                </a:spcAft>
+              </a:pPr>
+              <a:endParaRPr lang="en-US" sz="2400" dirty="0" err="1">
+                <a:gradFill>
+                  <a:gsLst>
+                    <a:gs pos="0">
+                      <a:srgbClr val="FFFFFF"/>
+                    </a:gs>
+                    <a:gs pos="100000">
+                      <a:srgbClr val="FFFFFF"/>
+                    </a:gs>
+                  </a:gsLst>
+                  <a:lin ang="5400000" scaled="0"/>
+                </a:gradFill>
+                <a:ea typeface="Segoe UI" pitchFamily="34" charset="0"/>
+                <a:cs typeface="Segoe UI" pitchFamily="34" charset="0"/>
+              </a:endParaRPr>
+            </a:p>
+          </p:txBody>
+        </p:sp>
+        <p:pic>
+          <p:nvPicPr>
+            <p:cNvPr id="7" name="Picture 6" descr="Overview of Azure Synapse Analytics features and capabilities. Showing how one solution provides the user experience with Azure Synapse Studio, a platform for processing data with SQL and Spark, and integrated management of the data lake.">
+              <a:extLst>
+                <a:ext uri="{FF2B5EF4-FFF2-40B4-BE49-F238E27FC236}">
+                  <a16:creationId xmlns:a16="http://schemas.microsoft.com/office/drawing/2014/main" id="{F7761FDD-1C22-494C-B895-4A02D9FDBEC0}"/>
+                </a:ext>
+              </a:extLst>
+            </p:cNvPr>
+            <p:cNvPicPr>
+              <a:picLocks noChangeAspect="1"/>
+            </p:cNvPicPr>
+            <p:nvPr/>
+          </p:nvPicPr>
+          <p:blipFill>
+            <a:blip r:embed="rId3">
+              <a:extLst>
+                <a:ext uri="{28A0092B-C50C-407E-A947-70E740481C1C}">
+                  <a14:useLocalDpi xmlns:a14="http://schemas.microsoft.com/office/drawing/2010/main" val="0"/>
+                </a:ext>
+              </a:extLst>
+            </a:blip>
+            <a:srcRect/>
+            <a:stretch/>
+          </p:blipFill>
+          <p:spPr>
+            <a:xfrm>
+              <a:off x="964962" y="1422475"/>
+              <a:ext cx="10262076" cy="5202226"/>
+            </a:xfrm>
+            <a:prstGeom prst="rect">
+              <a:avLst/>
+            </a:prstGeom>
+          </p:spPr>
+        </p:pic>
+      </p:grpSp>
     </p:spTree>
     <p:extLst>
       <p:ext uri="{BB962C8B-B14F-4D97-AF65-F5344CB8AC3E}">
@@ -22687,41 +23449,147 @@
           </a:p>
         </p:txBody>
       </p:sp>
-      <p:pic>
-        <p:nvPicPr>
-          <p:cNvPr id="9" name="Picture 8" descr="Diagram of the cold path as described in the speaker notes.">
+      <p:grpSp>
+        <p:nvGrpSpPr>
+          <p:cNvPr id="6" name="Group 5" descr="The diagram illustrates the high level process for the &quot;cold path&quot; of the data pipeline architecture">
             <a:extLst>
               <a:ext uri="{FF2B5EF4-FFF2-40B4-BE49-F238E27FC236}">
-                <a16:creationId xmlns:a16="http://schemas.microsoft.com/office/drawing/2014/main" id="{A6C40F34-5393-4FB3-AA5C-EDD5B6B783AE}"/>
+                <a16:creationId xmlns:a16="http://schemas.microsoft.com/office/drawing/2014/main" id="{8DC3051D-CF4B-444C-B1F3-F2B386A3294F}"/>
               </a:ext>
             </a:extLst>
           </p:cNvPr>
-          <p:cNvPicPr>
-            <a:picLocks noChangeAspect="1"/>
-          </p:cNvPicPr>
+          <p:cNvGrpSpPr/>
           <p:nvPr/>
-        </p:nvPicPr>
-        <p:blipFill>
-          <a:blip r:embed="rId3">
-            <a:extLst>
-              <a:ext uri="{28A0092B-C50C-407E-A947-70E740481C1C}">
-                <a14:useLocalDpi xmlns:a14="http://schemas.microsoft.com/office/drawing/2010/main" val="0"/>
-              </a:ext>
-            </a:extLst>
-          </a:blip>
-          <a:srcRect/>
-          <a:stretch/>
-        </p:blipFill>
-        <p:spPr>
+        </p:nvGrpSpPr>
+        <p:grpSpPr>
           <a:xfrm>
-            <a:off x="1192188" y="1205168"/>
-            <a:ext cx="9926608" cy="5275992"/>
+            <a:off x="1" y="1189176"/>
+            <a:ext cx="12192000" cy="5668824"/>
+            <a:chOff x="1" y="1189176"/>
+            <a:chExt cx="12192000" cy="5668824"/>
           </a:xfrm>
-          <a:prstGeom prst="rect">
-            <a:avLst/>
-          </a:prstGeom>
-        </p:spPr>
-      </p:pic>
+        </p:grpSpPr>
+        <p:sp>
+          <p:nvSpPr>
+            <p:cNvPr id="5" name="Rectangle 4">
+              <a:extLst>
+                <a:ext uri="{FF2B5EF4-FFF2-40B4-BE49-F238E27FC236}">
+                  <a16:creationId xmlns:a16="http://schemas.microsoft.com/office/drawing/2014/main" id="{7874D9A6-ACC3-4FC5-9347-6894537576A0}"/>
+                </a:ext>
+              </a:extLst>
+            </p:cNvPr>
+            <p:cNvSpPr/>
+            <p:nvPr/>
+          </p:nvSpPr>
+          <p:spPr bwMode="auto">
+            <a:xfrm>
+              <a:off x="1" y="1189176"/>
+              <a:ext cx="12192000" cy="5668824"/>
+            </a:xfrm>
+            <a:prstGeom prst="rect">
+              <a:avLst/>
+            </a:prstGeom>
+            <a:solidFill>
+              <a:schemeClr val="tx1"/>
+            </a:solidFill>
+            <a:ln>
+              <a:solidFill>
+                <a:schemeClr val="tx1"/>
+              </a:solidFill>
+              <a:headEnd type="none" w="med" len="med"/>
+              <a:tailEnd type="none" w="med" len="med"/>
+            </a:ln>
+            <a:effectLst/>
+          </p:spPr>
+          <p:style>
+            <a:lnRef idx="1">
+              <a:schemeClr val="accent2"/>
+            </a:lnRef>
+            <a:fillRef idx="3">
+              <a:schemeClr val="accent2"/>
+            </a:fillRef>
+            <a:effectRef idx="2">
+              <a:schemeClr val="accent2"/>
+            </a:effectRef>
+            <a:fontRef idx="minor">
+              <a:schemeClr val="lt1"/>
+            </a:fontRef>
+          </p:style>
+          <p:txBody>
+            <a:bodyPr rot="0" spcFirstLastPara="0" vertOverflow="overflow" horzOverflow="overflow" vert="horz" wrap="square" lIns="182880" tIns="146304" rIns="182880" bIns="146304" numCol="1" spcCol="0" rtlCol="0" fromWordArt="0" anchor="t" anchorCtr="0" forceAA="0" compatLnSpc="1">
+              <a:prstTxWarp prst="textNoShape">
+                <a:avLst/>
+              </a:prstTxWarp>
+              <a:noAutofit/>
+            </a:bodyPr>
+            <a:lstStyle/>
+            <a:p>
+              <a:pPr algn="ctr" defTabSz="932472" fontAlgn="base">
+                <a:lnSpc>
+                  <a:spcPct val="90000"/>
+                </a:lnSpc>
+                <a:spcBef>
+                  <a:spcPct val="0"/>
+                </a:spcBef>
+                <a:spcAft>
+                  <a:spcPct val="0"/>
+                </a:spcAft>
+              </a:pPr>
+              <a:endParaRPr lang="en-US" sz="2400" dirty="0" err="1">
+                <a:gradFill>
+                  <a:gsLst>
+                    <a:gs pos="0">
+                      <a:srgbClr val="FFFFFF"/>
+                    </a:gs>
+                    <a:gs pos="100000">
+                      <a:srgbClr val="FFFFFF"/>
+                    </a:gs>
+                  </a:gsLst>
+                  <a:lin ang="5400000" scaled="0"/>
+                </a:gradFill>
+                <a:ea typeface="Segoe UI" pitchFamily="34" charset="0"/>
+                <a:cs typeface="Segoe UI" pitchFamily="34" charset="0"/>
+              </a:endParaRPr>
+            </a:p>
+          </p:txBody>
+        </p:sp>
+        <p:pic>
+          <p:nvPicPr>
+            <p:cNvPr id="4" name="Picture 3">
+              <a:extLst>
+                <a:ext uri="{FF2B5EF4-FFF2-40B4-BE49-F238E27FC236}">
+                  <a16:creationId xmlns:a16="http://schemas.microsoft.com/office/drawing/2014/main" id="{9C549839-6BDD-4E47-8481-DF5B25FD4896}"/>
+                </a:ext>
+              </a:extLst>
+            </p:cNvPr>
+            <p:cNvPicPr>
+              <a:picLocks noChangeAspect="1"/>
+            </p:cNvPicPr>
+            <p:nvPr/>
+          </p:nvPicPr>
+          <p:blipFill>
+            <a:blip r:embed="rId3">
+              <a:extLst>
+                <a:ext uri="{28A0092B-C50C-407E-A947-70E740481C1C}">
+                  <a14:useLocalDpi xmlns:a14="http://schemas.microsoft.com/office/drawing/2010/main" val="0"/>
+                </a:ext>
+              </a:extLst>
+            </a:blip>
+            <a:stretch>
+              <a:fillRect/>
+            </a:stretch>
+          </p:blipFill>
+          <p:spPr>
+            <a:xfrm>
+              <a:off x="1678193" y="1344266"/>
+              <a:ext cx="8669588" cy="5373885"/>
+            </a:xfrm>
+            <a:prstGeom prst="rect">
+              <a:avLst/>
+            </a:prstGeom>
+          </p:spPr>
+        </p:pic>
+      </p:grpSp>
     </p:spTree>
     <p:extLst>
       <p:ext uri="{BB962C8B-B14F-4D97-AF65-F5344CB8AC3E}">
@@ -22818,7 +23686,7 @@
         <p:spPr>
           <a:xfrm>
             <a:off x="568586" y="1094646"/>
-            <a:ext cx="7355243" cy="4881336"/>
+            <a:ext cx="7355243" cy="5620000"/>
           </a:xfrm>
           <a:prstGeom prst="rect">
             <a:avLst/>
@@ -22850,7 +23718,7 @@
                   <a:lin ang="5400000" scaled="0"/>
                 </a:gradFill>
               </a:rPr>
-              <a:t>In this whiteboard design session, you will work in a group to look at the process of designing an end-to-end solution using Azure Synapse Analytics. The design session will cover data loading, data preparation, data transformation and data serving, along with performing machine learning and handling of both batch and real-time data.</a:t>
+              <a:t>In this whiteboard design session, you will work in a group to look at the process of designing an end-to-end solution using Azure Synapse Analytics. The design session will cover data loading, data preparation, data transformation, and data serving, along with data governance, data discovery, data classification, data lineage identification, performing machine learning, and handling both batch and real-time data.</a:t>
             </a:r>
           </a:p>
           <a:p>
@@ -23009,41 +23877,146 @@
           </a:p>
         </p:txBody>
       </p:sp>
-      <p:pic>
-        <p:nvPicPr>
-          <p:cNvPr id="3" name="Picture 2" descr="Diagram of the hot path as described in the speaker notes.">
+      <p:grpSp>
+        <p:nvGrpSpPr>
+          <p:cNvPr id="5" name="Group 4" descr="Diagram of the hot path as described in the speaker notes.">
             <a:extLst>
               <a:ext uri="{FF2B5EF4-FFF2-40B4-BE49-F238E27FC236}">
-                <a16:creationId xmlns:a16="http://schemas.microsoft.com/office/drawing/2014/main" id="{7F6CF8AC-7212-4F8C-A1F4-BD3B9334C23D}"/>
+                <a16:creationId xmlns:a16="http://schemas.microsoft.com/office/drawing/2014/main" id="{34B122C8-C8CB-4778-87BE-21BE7BE48758}"/>
               </a:ext>
             </a:extLst>
           </p:cNvPr>
-          <p:cNvPicPr>
-            <a:picLocks noChangeAspect="1"/>
-          </p:cNvPicPr>
+          <p:cNvGrpSpPr/>
           <p:nvPr/>
-        </p:nvPicPr>
-        <p:blipFill>
-          <a:blip r:embed="rId3">
-            <a:extLst>
-              <a:ext uri="{28A0092B-C50C-407E-A947-70E740481C1C}">
-                <a14:useLocalDpi xmlns:a14="http://schemas.microsoft.com/office/drawing/2010/main" val="0"/>
-              </a:ext>
-            </a:extLst>
-          </a:blip>
-          <a:srcRect/>
-          <a:stretch/>
-        </p:blipFill>
-        <p:spPr>
+        </p:nvGrpSpPr>
+        <p:grpSpPr>
           <a:xfrm>
-            <a:off x="838200" y="1244688"/>
-            <a:ext cx="10515600" cy="5242026"/>
+            <a:off x="1" y="1189176"/>
+            <a:ext cx="12192000" cy="5668824"/>
+            <a:chOff x="1" y="1189176"/>
+            <a:chExt cx="12192000" cy="5668824"/>
           </a:xfrm>
-          <a:prstGeom prst="rect">
-            <a:avLst/>
-          </a:prstGeom>
-        </p:spPr>
-      </p:pic>
+        </p:grpSpPr>
+        <p:sp>
+          <p:nvSpPr>
+            <p:cNvPr id="4" name="Rectangle 3">
+              <a:extLst>
+                <a:ext uri="{FF2B5EF4-FFF2-40B4-BE49-F238E27FC236}">
+                  <a16:creationId xmlns:a16="http://schemas.microsoft.com/office/drawing/2014/main" id="{0598E6C9-62D6-4C2A-9DBC-1A18453EF6A9}"/>
+                </a:ext>
+              </a:extLst>
+            </p:cNvPr>
+            <p:cNvSpPr/>
+            <p:nvPr/>
+          </p:nvSpPr>
+          <p:spPr bwMode="auto">
+            <a:xfrm>
+              <a:off x="1" y="1189176"/>
+              <a:ext cx="12192000" cy="5668824"/>
+            </a:xfrm>
+            <a:prstGeom prst="rect">
+              <a:avLst/>
+            </a:prstGeom>
+            <a:solidFill>
+              <a:schemeClr val="tx1"/>
+            </a:solidFill>
+            <a:ln>
+              <a:solidFill>
+                <a:schemeClr val="tx1"/>
+              </a:solidFill>
+              <a:headEnd type="none" w="med" len="med"/>
+              <a:tailEnd type="none" w="med" len="med"/>
+            </a:ln>
+            <a:effectLst/>
+          </p:spPr>
+          <p:style>
+            <a:lnRef idx="1">
+              <a:schemeClr val="accent2"/>
+            </a:lnRef>
+            <a:fillRef idx="3">
+              <a:schemeClr val="accent2"/>
+            </a:fillRef>
+            <a:effectRef idx="2">
+              <a:schemeClr val="accent2"/>
+            </a:effectRef>
+            <a:fontRef idx="minor">
+              <a:schemeClr val="lt1"/>
+            </a:fontRef>
+          </p:style>
+          <p:txBody>
+            <a:bodyPr rot="0" spcFirstLastPara="0" vertOverflow="overflow" horzOverflow="overflow" vert="horz" wrap="square" lIns="182880" tIns="146304" rIns="182880" bIns="146304" numCol="1" spcCol="0" rtlCol="0" fromWordArt="0" anchor="t" anchorCtr="0" forceAA="0" compatLnSpc="1">
+              <a:prstTxWarp prst="textNoShape">
+                <a:avLst/>
+              </a:prstTxWarp>
+              <a:noAutofit/>
+            </a:bodyPr>
+            <a:lstStyle/>
+            <a:p>
+              <a:pPr algn="ctr" defTabSz="932472" fontAlgn="base">
+                <a:lnSpc>
+                  <a:spcPct val="90000"/>
+                </a:lnSpc>
+                <a:spcBef>
+                  <a:spcPct val="0"/>
+                </a:spcBef>
+                <a:spcAft>
+                  <a:spcPct val="0"/>
+                </a:spcAft>
+              </a:pPr>
+              <a:endParaRPr lang="en-US" sz="2400" dirty="0" err="1">
+                <a:gradFill>
+                  <a:gsLst>
+                    <a:gs pos="0">
+                      <a:srgbClr val="FFFFFF"/>
+                    </a:gs>
+                    <a:gs pos="100000">
+                      <a:srgbClr val="FFFFFF"/>
+                    </a:gs>
+                  </a:gsLst>
+                  <a:lin ang="5400000" scaled="0"/>
+                </a:gradFill>
+                <a:ea typeface="Segoe UI" pitchFamily="34" charset="0"/>
+                <a:cs typeface="Segoe UI" pitchFamily="34" charset="0"/>
+              </a:endParaRPr>
+            </a:p>
+          </p:txBody>
+        </p:sp>
+        <p:pic>
+          <p:nvPicPr>
+            <p:cNvPr id="3" name="Picture 2" descr="Diagram of the hot path as described in the speaker notes.">
+              <a:extLst>
+                <a:ext uri="{FF2B5EF4-FFF2-40B4-BE49-F238E27FC236}">
+                  <a16:creationId xmlns:a16="http://schemas.microsoft.com/office/drawing/2014/main" id="{7F6CF8AC-7212-4F8C-A1F4-BD3B9334C23D}"/>
+                </a:ext>
+              </a:extLst>
+            </p:cNvPr>
+            <p:cNvPicPr>
+              <a:picLocks noChangeAspect="1"/>
+            </p:cNvPicPr>
+            <p:nvPr/>
+          </p:nvPicPr>
+          <p:blipFill>
+            <a:blip r:embed="rId3">
+              <a:extLst>
+                <a:ext uri="{28A0092B-C50C-407E-A947-70E740481C1C}">
+                  <a14:useLocalDpi xmlns:a14="http://schemas.microsoft.com/office/drawing/2010/main" val="0"/>
+                </a:ext>
+              </a:extLst>
+            </a:blip>
+            <a:srcRect/>
+            <a:stretch/>
+          </p:blipFill>
+          <p:spPr>
+            <a:xfrm>
+              <a:off x="838200" y="1402575"/>
+              <a:ext cx="10515600" cy="5242026"/>
+            </a:xfrm>
+            <a:prstGeom prst="rect">
+              <a:avLst/>
+            </a:prstGeom>
+          </p:spPr>
+        </p:pic>
+      </p:grpSp>
     </p:spTree>
     <p:extLst>
       <p:ext uri="{BB962C8B-B14F-4D97-AF65-F5344CB8AC3E}">
@@ -23125,36 +24098,141 @@
           </a:p>
         </p:txBody>
       </p:sp>
-      <p:pic>
-        <p:nvPicPr>
-          <p:cNvPr id="4" name="Picture 3" descr="The notes on the slide describe the image.">
+      <p:grpSp>
+        <p:nvGrpSpPr>
+          <p:cNvPr id="3" name="Group 2" descr="The diagram illustrates the approach the Azure Synapse Analytics enables for WWI with regards to machine learning. ">
             <a:extLst>
               <a:ext uri="{FF2B5EF4-FFF2-40B4-BE49-F238E27FC236}">
-                <a16:creationId xmlns:a16="http://schemas.microsoft.com/office/drawing/2014/main" id="{F9CA0F88-74A7-4A52-B58F-DAF42656F072}"/>
+                <a16:creationId xmlns:a16="http://schemas.microsoft.com/office/drawing/2014/main" id="{A51F2AD9-68A5-455C-96E7-4D3693CF92C3}"/>
               </a:ext>
             </a:extLst>
           </p:cNvPr>
-          <p:cNvPicPr>
-            <a:picLocks noChangeAspect="1"/>
-          </p:cNvPicPr>
+          <p:cNvGrpSpPr/>
           <p:nvPr/>
-        </p:nvPicPr>
-        <p:blipFill>
-          <a:blip r:embed="rId3"/>
-          <a:stretch>
-            <a:fillRect/>
-          </a:stretch>
-        </p:blipFill>
-        <p:spPr>
+        </p:nvGrpSpPr>
+        <p:grpSpPr>
           <a:xfrm>
-            <a:off x="792299" y="1189176"/>
-            <a:ext cx="10371428" cy="5219048"/>
+            <a:off x="1" y="1189176"/>
+            <a:ext cx="12192000" cy="5668824"/>
+            <a:chOff x="1" y="1189176"/>
+            <a:chExt cx="12192000" cy="5668824"/>
           </a:xfrm>
-          <a:prstGeom prst="rect">
-            <a:avLst/>
-          </a:prstGeom>
-        </p:spPr>
-      </p:pic>
+        </p:grpSpPr>
+        <p:sp>
+          <p:nvSpPr>
+            <p:cNvPr id="5" name="Rectangle 4">
+              <a:extLst>
+                <a:ext uri="{FF2B5EF4-FFF2-40B4-BE49-F238E27FC236}">
+                  <a16:creationId xmlns:a16="http://schemas.microsoft.com/office/drawing/2014/main" id="{F26561AF-8B0F-4F74-904F-36567705BBB1}"/>
+                </a:ext>
+              </a:extLst>
+            </p:cNvPr>
+            <p:cNvSpPr/>
+            <p:nvPr/>
+          </p:nvSpPr>
+          <p:spPr bwMode="auto">
+            <a:xfrm>
+              <a:off x="1" y="1189176"/>
+              <a:ext cx="12192000" cy="5668824"/>
+            </a:xfrm>
+            <a:prstGeom prst="rect">
+              <a:avLst/>
+            </a:prstGeom>
+            <a:solidFill>
+              <a:schemeClr val="tx1"/>
+            </a:solidFill>
+            <a:ln>
+              <a:solidFill>
+                <a:schemeClr val="tx1"/>
+              </a:solidFill>
+              <a:headEnd type="none" w="med" len="med"/>
+              <a:tailEnd type="none" w="med" len="med"/>
+            </a:ln>
+            <a:effectLst/>
+          </p:spPr>
+          <p:style>
+            <a:lnRef idx="1">
+              <a:schemeClr val="accent2"/>
+            </a:lnRef>
+            <a:fillRef idx="3">
+              <a:schemeClr val="accent2"/>
+            </a:fillRef>
+            <a:effectRef idx="2">
+              <a:schemeClr val="accent2"/>
+            </a:effectRef>
+            <a:fontRef idx="minor">
+              <a:schemeClr val="lt1"/>
+            </a:fontRef>
+          </p:style>
+          <p:txBody>
+            <a:bodyPr rot="0" spcFirstLastPara="0" vertOverflow="overflow" horzOverflow="overflow" vert="horz" wrap="square" lIns="182880" tIns="146304" rIns="182880" bIns="146304" numCol="1" spcCol="0" rtlCol="0" fromWordArt="0" anchor="t" anchorCtr="0" forceAA="0" compatLnSpc="1">
+              <a:prstTxWarp prst="textNoShape">
+                <a:avLst/>
+              </a:prstTxWarp>
+              <a:noAutofit/>
+            </a:bodyPr>
+            <a:lstStyle/>
+            <a:p>
+              <a:pPr algn="ctr" defTabSz="932472" fontAlgn="base">
+                <a:lnSpc>
+                  <a:spcPct val="90000"/>
+                </a:lnSpc>
+                <a:spcBef>
+                  <a:spcPct val="0"/>
+                </a:spcBef>
+                <a:spcAft>
+                  <a:spcPct val="0"/>
+                </a:spcAft>
+              </a:pPr>
+              <a:endParaRPr lang="en-US" sz="2400" dirty="0" err="1">
+                <a:gradFill>
+                  <a:gsLst>
+                    <a:gs pos="0">
+                      <a:srgbClr val="FFFFFF"/>
+                    </a:gs>
+                    <a:gs pos="100000">
+                      <a:srgbClr val="FFFFFF"/>
+                    </a:gs>
+                  </a:gsLst>
+                  <a:lin ang="5400000" scaled="0"/>
+                </a:gradFill>
+                <a:ea typeface="Segoe UI" pitchFamily="34" charset="0"/>
+                <a:cs typeface="Segoe UI" pitchFamily="34" charset="0"/>
+              </a:endParaRPr>
+            </a:p>
+          </p:txBody>
+        </p:sp>
+        <p:pic>
+          <p:nvPicPr>
+            <p:cNvPr id="4" name="Picture 3" descr="The notes on the slide describe the image.">
+              <a:extLst>
+                <a:ext uri="{FF2B5EF4-FFF2-40B4-BE49-F238E27FC236}">
+                  <a16:creationId xmlns:a16="http://schemas.microsoft.com/office/drawing/2014/main" id="{F9CA0F88-74A7-4A52-B58F-DAF42656F072}"/>
+                </a:ext>
+              </a:extLst>
+            </p:cNvPr>
+            <p:cNvPicPr>
+              <a:picLocks noChangeAspect="1"/>
+            </p:cNvPicPr>
+            <p:nvPr/>
+          </p:nvPicPr>
+          <p:blipFill>
+            <a:blip r:embed="rId3"/>
+            <a:stretch>
+              <a:fillRect/>
+            </a:stretch>
+          </p:blipFill>
+          <p:spPr>
+            <a:xfrm>
+              <a:off x="781541" y="1414064"/>
+              <a:ext cx="10371428" cy="5219048"/>
+            </a:xfrm>
+            <a:prstGeom prst="rect">
+              <a:avLst/>
+            </a:prstGeom>
+          </p:spPr>
+        </p:pic>
+      </p:grpSp>
     </p:spTree>
     <p:extLst>
       <p:ext uri="{BB962C8B-B14F-4D97-AF65-F5344CB8AC3E}">
@@ -23240,7 +24318,7 @@
         <p:spPr>
           <a:xfrm>
             <a:off x="269239" y="1189177"/>
-            <a:ext cx="11653523" cy="3200876"/>
+            <a:ext cx="11653523" cy="3717941"/>
           </a:xfrm>
         </p:spPr>
         <p:txBody>
@@ -23255,6 +24333,17 @@
             <a:r>
               <a:rPr lang="en-US" sz="2800" dirty="0"/>
               <a:t>Ingest flat file data into Azure Storage (Azure Data Lake Store Gen2) </a:t>
+            </a:r>
+          </a:p>
+          <a:p>
+            <a:pPr>
+              <a:lnSpc>
+                <a:spcPct val="100000"/>
+              </a:lnSpc>
+            </a:pPr>
+            <a:r>
+              <a:rPr lang="en-US" sz="2800" dirty="0"/>
+              <a:t>Register and scan all data source with Azure Purview.</a:t>
             </a:r>
           </a:p>
           <a:p>
@@ -23896,7 +24985,7 @@
         <p:spPr>
           <a:xfrm>
             <a:off x="266920" y="1150756"/>
-            <a:ext cx="11653523" cy="5398401"/>
+            <a:ext cx="11653523" cy="5915466"/>
           </a:xfrm>
         </p:spPr>
         <p:txBody>
@@ -23966,6 +25055,17 @@
             <a:r>
               <a:rPr lang="en-US" sz="2800" dirty="0"/>
               <a:t>Result-set cache persists when SQL Pool is paused and resumed.</a:t>
+            </a:r>
+          </a:p>
+          <a:p>
+            <a:pPr>
+              <a:lnSpc>
+                <a:spcPct val="100000"/>
+              </a:lnSpc>
+            </a:pPr>
+            <a:r>
+              <a:rPr lang="en-US" sz="2800" dirty="0"/>
+              <a:t>Use Semantic Search in Azure Purview Catalog and custom terms.</a:t>
             </a:r>
           </a:p>
           <a:p>
@@ -25005,50 +26105,13 @@
       </p:grpSpPr>
       <p:sp>
         <p:nvSpPr>
-          <p:cNvPr id="2" name="Title 1"/>
-          <p:cNvSpPr>
-            <a:spLocks noGrp="1"/>
-          </p:cNvSpPr>
-          <p:nvPr>
-            <p:ph type="title"/>
-          </p:nvPr>
-        </p:nvSpPr>
-        <p:spPr/>
-        <p:txBody>
-          <a:bodyPr>
-            <a:normAutofit fontScale="90000"/>
-          </a:bodyPr>
-          <a:lstStyle/>
-          <a:p>
-            <a:r>
-              <a:rPr lang="en-US" sz="4900" dirty="0">
-                <a:solidFill>
-                  <a:schemeClr val="tx1"/>
-                </a:solidFill>
-                <a:cs typeface="Segoe UI" panose="020B0502040204020203" pitchFamily="34" charset="0"/>
-              </a:rPr>
-              <a:t>Preferred objections handling</a:t>
-            </a:r>
-            <a:br>
-              <a:rPr lang="en-US" dirty="0">
-                <a:solidFill>
-                  <a:schemeClr val="tx1"/>
-                </a:solidFill>
-                <a:latin typeface="Segoe UI" panose="020B0502040204020203" pitchFamily="34" charset="0"/>
-              </a:rPr>
-            </a:br>
-            <a:endParaRPr lang="en-US" sz="3236" dirty="0">
-              <a:solidFill>
-                <a:schemeClr val="tx1"/>
-              </a:solidFill>
-              <a:latin typeface="Segoe UI" panose="020B0502040204020203" pitchFamily="34" charset="0"/>
-            </a:endParaRPr>
-          </a:p>
-        </p:txBody>
-      </p:sp>
-      <p:sp>
-        <p:nvSpPr>
-          <p:cNvPr id="3" name="Content Placeholder 2"/>
+          <p:cNvPr id="2" name="Text Placeholder 1">
+            <a:extLst>
+              <a:ext uri="{FF2B5EF4-FFF2-40B4-BE49-F238E27FC236}">
+                <a16:creationId xmlns:a16="http://schemas.microsoft.com/office/drawing/2014/main" id="{AE1899AE-2979-4E05-AC56-BA44B9D6B2B7}"/>
+              </a:ext>
+            </a:extLst>
+          </p:cNvPr>
           <p:cNvSpPr>
             <a:spLocks noGrp="1"/>
           </p:cNvSpPr>
@@ -25058,156 +26121,96 @@
         </p:nvSpPr>
         <p:spPr>
           <a:xfrm>
-            <a:off x="269239" y="1189177"/>
-            <a:ext cx="11653523" cy="5495932"/>
+            <a:off x="266920" y="1150756"/>
+            <a:ext cx="11653523" cy="4881336"/>
           </a:xfrm>
         </p:spPr>
         <p:txBody>
           <a:bodyPr>
-            <a:normAutofit lnSpcReduction="10000"/>
+            <a:noAutofit/>
           </a:bodyPr>
           <a:lstStyle/>
           <a:p>
-            <a:pPr marL="0" indent="0">
+            <a:pPr>
               <a:lnSpc>
                 <a:spcPct val="100000"/>
               </a:lnSpc>
-              <a:buNone/>
             </a:pPr>
             <a:r>
-              <a:rPr lang="en-US" sz="2800" dirty="0">
-                <a:solidFill>
-                  <a:schemeClr val="tx1"/>
-                </a:solidFill>
-              </a:rPr>
-              <a:t>WWI understands that Azure offers several services with overlapping capabilities.  They do not want to spend the time stitching them together to get to the desired analytics solution.</a:t>
-            </a:r>
-            <a:br>
-              <a:rPr lang="en-US" sz="2800" dirty="0">
-                <a:solidFill>
-                  <a:schemeClr val="tx1"/>
-                </a:solidFill>
-              </a:rPr>
-            </a:br>
-            <a:endParaRPr lang="en-US" sz="2800" dirty="0">
-              <a:solidFill>
-                <a:schemeClr val="tx1"/>
-              </a:solidFill>
-            </a:endParaRPr>
-          </a:p>
-          <a:p>
-            <a:pPr marL="0" indent="0">
+              <a:rPr lang="en-US" sz="2800" dirty="0"/>
+              <a:t>Use Azure Purview Data Lineage to monitor the data lifecycle that spans the data’s origin and where it moves over time across the data estate.</a:t>
+            </a:r>
+          </a:p>
+          <a:p>
+            <a:pPr>
               <a:lnSpc>
                 <a:spcPct val="100000"/>
               </a:lnSpc>
-              <a:buNone/>
             </a:pPr>
             <a:r>
-              <a:rPr lang="en-US" sz="2400" dirty="0">
-                <a:solidFill>
-                  <a:schemeClr val="tx1"/>
-                </a:solidFill>
-              </a:rPr>
-              <a:t>Azure Synapse Analytics was designed to address exactly this situation and enables customers to quickly get to creating business value from their analytics instead of spending time on plumbing infrastructure connecting disparate services</a:t>
-            </a:r>
-          </a:p>
-          <a:p>
-            <a:pPr marL="336145" lvl="1" indent="0">
+              <a:rPr lang="en-US" sz="2800" dirty="0"/>
+              <a:t>Scan and automatically classify data with the 100+ built-in classifications that range from credit cards, account numbers through a wide range of types such as government IDs, location data, and more.</a:t>
+            </a:r>
+          </a:p>
+          <a:p>
+            <a:pPr>
               <a:lnSpc>
                 <a:spcPct val="100000"/>
               </a:lnSpc>
-              <a:buNone/>
             </a:pPr>
-            <a:endParaRPr lang="en-US" sz="2032" dirty="0">
-              <a:solidFill>
-                <a:schemeClr val="tx1"/>
-              </a:solidFill>
-            </a:endParaRPr>
-          </a:p>
-          <a:p>
-            <a:pPr marL="0" indent="0">
-              <a:lnSpc>
-                <a:spcPct val="100000"/>
-              </a:lnSpc>
-              <a:buNone/>
-            </a:pPr>
-            <a:r>
-              <a:rPr lang="en-US" sz="2800" dirty="0">
-                <a:solidFill>
-                  <a:schemeClr val="tx1"/>
-                </a:solidFill>
-              </a:rPr>
-              <a:t>WWI have seen demos from competing systems that claim to load massive datasets in seconds. Does Azure offer such a solution?</a:t>
-            </a:r>
-          </a:p>
-          <a:p>
-            <a:pPr marL="0" indent="0">
-              <a:lnSpc>
-                <a:spcPct val="100000"/>
-              </a:lnSpc>
-              <a:buNone/>
-            </a:pPr>
-            <a:endParaRPr lang="en-US" sz="2800" dirty="0">
-              <a:solidFill>
-                <a:schemeClr val="tx1"/>
-              </a:solidFill>
-            </a:endParaRPr>
-          </a:p>
-          <a:p>
-            <a:pPr marL="0" indent="0">
-              <a:lnSpc>
-                <a:spcPct val="100000"/>
-              </a:lnSpc>
-              <a:buNone/>
-            </a:pPr>
-            <a:r>
-              <a:rPr lang="en-US" sz="2400" dirty="0">
-                <a:solidFill>
-                  <a:schemeClr val="tx1"/>
-                </a:solidFill>
-              </a:rPr>
-              <a:t>Azure Synapse Analytics is Microsoft's answer to this challenge and is designed for supporting fast loads of massive datasets.</a:t>
-            </a:r>
-            <a:endParaRPr lang="en-US" sz="2032" dirty="0">
-              <a:solidFill>
-                <a:schemeClr val="tx1"/>
-              </a:solidFill>
-            </a:endParaRPr>
-          </a:p>
-          <a:p>
-            <a:endParaRPr lang="en-US" sz="3600" dirty="0">
-              <a:solidFill>
-                <a:schemeClr val="tx1"/>
-              </a:solidFill>
-            </a:endParaRPr>
-          </a:p>
-          <a:p>
-            <a:endParaRPr lang="en-US" sz="3600" dirty="0">
-              <a:solidFill>
-                <a:schemeClr val="tx1"/>
-              </a:solidFill>
-            </a:endParaRPr>
+            <a:r>
+              <a:rPr lang="en-US" sz="2800" dirty="0"/>
+              <a:t>Use Purview Data Map as a unified map of all data assets and relationships that enable more effective governance for a data estate.</a:t>
+            </a:r>
+          </a:p>
+        </p:txBody>
+      </p:sp>
+      <p:sp>
+        <p:nvSpPr>
+          <p:cNvPr id="3" name="Title 2">
+            <a:extLst>
+              <a:ext uri="{FF2B5EF4-FFF2-40B4-BE49-F238E27FC236}">
+                <a16:creationId xmlns:a16="http://schemas.microsoft.com/office/drawing/2014/main" id="{0E64472F-6084-46EC-A165-7396C457B8E9}"/>
+              </a:ext>
+            </a:extLst>
+          </p:cNvPr>
+          <p:cNvSpPr>
+            <a:spLocks noGrp="1"/>
+          </p:cNvSpPr>
+          <p:nvPr>
+            <p:ph type="title"/>
+          </p:nvPr>
+        </p:nvSpPr>
+        <p:spPr>
+          <a:xfrm>
+            <a:off x="269240" y="289511"/>
+            <a:ext cx="11655840" cy="899665"/>
+          </a:xfrm>
+        </p:spPr>
+        <p:txBody>
+          <a:bodyPr/>
+          <a:lstStyle/>
+          <a:p>
+            <a:r>
+              <a:rPr lang="en-US" dirty="0"/>
+              <a:t>Preferred solution – Governance</a:t>
+            </a:r>
           </a:p>
         </p:txBody>
       </p:sp>
     </p:spTree>
     <p:extLst>
       <p:ext uri="{BB962C8B-B14F-4D97-AF65-F5344CB8AC3E}">
-        <p14:creationId xmlns:p14="http://schemas.microsoft.com/office/powerpoint/2010/main" val="2371438961"/>
+        <p14:creationId xmlns:p14="http://schemas.microsoft.com/office/powerpoint/2010/main" val="1739922787"/>
       </p:ext>
     </p:extLst>
   </p:cSld>
   <p:clrMapOvr>
     <a:masterClrMapping/>
   </p:clrMapOvr>
-  <mc:AlternateContent xmlns:mc="http://schemas.openxmlformats.org/markup-compatibility/2006" xmlns:p14="http://schemas.microsoft.com/office/powerpoint/2010/main">
-    <mc:Choice Requires="p14">
-      <p:transition p14:dur="0"/>
-    </mc:Choice>
-    <mc:Fallback xmlns="">
-      <p:transition/>
-    </mc:Fallback>
-  </mc:AlternateContent>
+  <p:transition>
+    <p:fade/>
+  </p:transition>
 </p:sld>
 </file>
 
@@ -25252,7 +26255,7 @@
                 </a:solidFill>
                 <a:cs typeface="Segoe UI" panose="020B0502040204020203" pitchFamily="34" charset="0"/>
               </a:rPr>
-              <a:t>Preferred objections handling - 2</a:t>
+              <a:t>Preferred objections handling</a:t>
             </a:r>
             <a:br>
               <a:rPr lang="en-US" dirty="0">
@@ -25284,65 +26287,62 @@
         <p:spPr>
           <a:xfrm>
             <a:off x="269239" y="1189177"/>
-            <a:ext cx="11653523" cy="5809500"/>
+            <a:ext cx="11653523" cy="5495932"/>
           </a:xfrm>
         </p:spPr>
         <p:txBody>
           <a:bodyPr>
-            <a:normAutofit fontScale="62500" lnSpcReduction="20000"/>
+            <a:normAutofit lnSpcReduction="10000"/>
           </a:bodyPr>
           <a:lstStyle/>
           <a:p>
             <a:pPr marL="0" indent="0">
               <a:lnSpc>
-                <a:spcPct val="120000"/>
+                <a:spcPct val="100000"/>
               </a:lnSpc>
               <a:buNone/>
             </a:pPr>
             <a:r>
-              <a:rPr lang="en-US" sz="3800" dirty="0">
+              <a:rPr lang="en-US" sz="2800" dirty="0">
                 <a:solidFill>
                   <a:schemeClr val="tx1"/>
                 </a:solidFill>
               </a:rPr>
-              <a:t>Is it really possible to minimize the number of disparate services they use across ingest, transformation, querying and storage, so that WWI team of data engineers, data scientists and database administrators can master one tool, and can build shared best practices for development, management and monitoring?</a:t>
-            </a:r>
+              <a:t>WWI understands that Azure offers several services with overlapping capabilities.  They do not want to spend the time stitching them together to get to the desired analytics solution.</a:t>
+            </a:r>
+            <a:br>
+              <a:rPr lang="en-US" sz="2800" dirty="0">
+                <a:solidFill>
+                  <a:schemeClr val="tx1"/>
+                </a:solidFill>
+              </a:rPr>
+            </a:br>
+            <a:endParaRPr lang="en-US" sz="2800" dirty="0">
+              <a:solidFill>
+                <a:schemeClr val="tx1"/>
+              </a:solidFill>
+            </a:endParaRPr>
           </a:p>
           <a:p>
             <a:pPr marL="0" indent="0">
               <a:lnSpc>
-                <a:spcPct val="120000"/>
+                <a:spcPct val="100000"/>
               </a:lnSpc>
               <a:buNone/>
             </a:pPr>
-            <a:endParaRPr lang="en-US" sz="1600" dirty="0">
-              <a:solidFill>
-                <a:schemeClr val="tx1"/>
-              </a:solidFill>
-              <a:latin typeface="+mj-lt"/>
-            </a:endParaRPr>
-          </a:p>
-          <a:p>
-            <a:pPr marL="0" indent="0">
-              <a:lnSpc>
-                <a:spcPct val="120000"/>
-              </a:lnSpc>
-              <a:buNone/>
-            </a:pPr>
-            <a:r>
-              <a:rPr lang="en-US" sz="3200" dirty="0">
+            <a:r>
+              <a:rPr lang="en-US" sz="2400" dirty="0">
                 <a:solidFill>
                   <a:schemeClr val="tx1"/>
                 </a:solidFill>
-                <a:latin typeface="+mj-lt"/>
-              </a:rPr>
-              <a:t>Azure Synapse Analytics provides an integrated environment that does exactly this.</a:t>
+              </a:rPr>
+              <a:t>Azure Synapse Analytics was designed to address exactly this situation and enables customers to quickly get to creating business value from their analytics instead of spending time on plumbing infrastructure connecting disparate services</a:t>
             </a:r>
           </a:p>
           <a:p>
             <a:pPr marL="336145" lvl="1" indent="0">
               <a:lnSpc>
-                <a:spcPct val="120000"/>
+                <a:spcPct val="100000"/>
               </a:lnSpc>
               <a:buNone/>
             </a:pPr>
@@ -25350,55 +26350,57 @@
               <a:solidFill>
                 <a:schemeClr val="tx1"/>
               </a:solidFill>
-              <a:latin typeface="+mj-lt"/>
             </a:endParaRPr>
           </a:p>
           <a:p>
             <a:pPr marL="0" indent="0">
               <a:lnSpc>
-                <a:spcPct val="120000"/>
+                <a:spcPct val="100000"/>
               </a:lnSpc>
               <a:buNone/>
             </a:pPr>
             <a:r>
-              <a:rPr lang="en-US" sz="3800" dirty="0">
+              <a:rPr lang="en-US" sz="2800" dirty="0">
                 <a:solidFill>
                   <a:schemeClr val="tx1"/>
                 </a:solidFill>
               </a:rPr>
-              <a:t>WWI have heard of serverless querying, does Azure offer this? Does it support querying the data at the scale of WWI and what formats does it support? Would this be appropriate for supporting WWI dashboards or reports?</a:t>
+              <a:t>WWI have seen demos from competing systems that claim to load massive datasets in seconds. Does Azure offer such a solution?</a:t>
             </a:r>
           </a:p>
           <a:p>
             <a:pPr marL="0" indent="0">
               <a:lnSpc>
-                <a:spcPct val="120000"/>
+                <a:spcPct val="100000"/>
               </a:lnSpc>
               <a:buNone/>
             </a:pPr>
-            <a:endParaRPr lang="en-US" sz="1600" dirty="0">
+            <a:endParaRPr lang="en-US" sz="2800" dirty="0">
               <a:solidFill>
                 <a:schemeClr val="tx1"/>
               </a:solidFill>
-              <a:latin typeface="+mj-lt"/>
             </a:endParaRPr>
           </a:p>
           <a:p>
             <a:pPr marL="0" indent="0">
               <a:lnSpc>
-                <a:spcPct val="120000"/>
+                <a:spcPct val="100000"/>
               </a:lnSpc>
               <a:buNone/>
             </a:pPr>
             <a:r>
-              <a:rPr lang="en-US" sz="3200" dirty="0">
+              <a:rPr lang="en-US" sz="2400" dirty="0">
                 <a:solidFill>
                   <a:schemeClr val="tx1"/>
                 </a:solidFill>
-                <a:latin typeface="+mj-lt"/>
-              </a:rPr>
-              <a:t>Azure Synapse Analytics supports serverless querying via Azure Synapse SQL serverless allowing for interactive queries that utilize T-SQL queries over high scale data in Azure storage. It supports data in various formats including Parquet, CSV, and JSON. It would be appropriate for dashboards and reports, as it supports Power BI and can be used refresh dashboard datasets. It is also appropriate for basic data discovery and exploration and supporting "single query ETL" that transforms Azure Storage based data in a massively parallel fashion.</a:t>
-            </a:r>
+              </a:rPr>
+              <a:t>Azure Synapse Analytics is Microsoft's answer to this challenge and is designed for supporting fast loads of massive datasets.</a:t>
+            </a:r>
+            <a:endParaRPr lang="en-US" sz="2032" dirty="0">
+              <a:solidFill>
+                <a:schemeClr val="tx1"/>
+              </a:solidFill>
+            </a:endParaRPr>
           </a:p>
           <a:p>
             <a:endParaRPr lang="en-US" sz="3600" dirty="0">
@@ -25419,7 +26421,7 @@
     </p:spTree>
     <p:extLst>
       <p:ext uri="{BB962C8B-B14F-4D97-AF65-F5344CB8AC3E}">
-        <p14:creationId xmlns:p14="http://schemas.microsoft.com/office/powerpoint/2010/main" val="1953069638"/>
+        <p14:creationId xmlns:p14="http://schemas.microsoft.com/office/powerpoint/2010/main" val="2371438961"/>
       </p:ext>
     </p:extLst>
   </p:cSld>
@@ -25478,7 +26480,7 @@
                 </a:solidFill>
                 <a:cs typeface="Segoe UI" panose="020B0502040204020203" pitchFamily="34" charset="0"/>
               </a:rPr>
-              <a:t>Preferred objections handling - 3</a:t>
+              <a:t>Preferred objections handling - 2</a:t>
             </a:r>
             <a:br>
               <a:rPr lang="en-US" dirty="0">
@@ -25510,12 +26512,12 @@
         <p:spPr>
           <a:xfrm>
             <a:off x="269239" y="1189177"/>
-            <a:ext cx="11653523" cy="5668824"/>
+            <a:ext cx="11653523" cy="5809500"/>
           </a:xfrm>
         </p:spPr>
         <p:txBody>
           <a:bodyPr>
-            <a:normAutofit fontScale="77500" lnSpcReduction="20000"/>
+            <a:normAutofit fontScale="62500" lnSpcReduction="20000"/>
           </a:bodyPr>
           <a:lstStyle/>
           <a:p>
@@ -25526,12 +26528,12 @@
               <a:buNone/>
             </a:pPr>
             <a:r>
-              <a:rPr lang="en-US" sz="3100" dirty="0">
+              <a:rPr lang="en-US" sz="3800" dirty="0">
                 <a:solidFill>
                   <a:schemeClr val="tx1"/>
                 </a:solidFill>
               </a:rPr>
-              <a:t>If Azure provides serverless querying, does selecting serverless remove the option of using pre-allocated query resources?</a:t>
+              <a:t>Is it really possible to minimize the number of disparate services they use across ingest, transformation, querying and storage, so that WWI team of data engineers, data scientists and database administrators can master one tool, and can build shared best practices for development, management and monitoring?</a:t>
             </a:r>
           </a:p>
           <a:p>
@@ -25541,7 +26543,7 @@
               </a:lnSpc>
               <a:buNone/>
             </a:pPr>
-            <a:endParaRPr lang="en-US" sz="2400" dirty="0">
+            <a:endParaRPr lang="en-US" sz="1600" dirty="0">
               <a:solidFill>
                 <a:schemeClr val="tx1"/>
               </a:solidFill>
@@ -25556,13 +26558,13 @@
               <a:buNone/>
             </a:pPr>
             <a:r>
-              <a:rPr lang="en-US" sz="2600" dirty="0">
+              <a:rPr lang="en-US" sz="3200" dirty="0">
                 <a:solidFill>
                   <a:schemeClr val="tx1"/>
                 </a:solidFill>
                 <a:latin typeface="+mj-lt"/>
               </a:rPr>
-              <a:t>No. This is a unique differentiator of Azure Synapse Analytics. Within one Azure Synapse Analytics workspace, they can have pre-provisioned Azure Synapse SQL Pools, and have serverless querying using the Azure Synapse SQL serverless endpoint.</a:t>
+              <a:t>Azure Synapse Analytics provides an integrated environment that does exactly this.</a:t>
             </a:r>
           </a:p>
           <a:p>
@@ -25587,12 +26589,12 @@
               <a:buNone/>
             </a:pPr>
             <a:r>
-              <a:rPr lang="en-US" sz="3100" dirty="0">
+              <a:rPr lang="en-US" sz="3800" dirty="0">
                 <a:solidFill>
                   <a:schemeClr val="tx1"/>
                 </a:solidFill>
               </a:rPr>
-              <a:t>Would data be protected at rest and are there controls over the keys used to encrypt it?</a:t>
+              <a:t>WWI have heard of serverless querying, does Azure offer this? Does it support querying the data at the scale of WWI and what formats does it support? Would this be appropriate for supporting WWI dashboards or reports?</a:t>
             </a:r>
           </a:p>
           <a:p>
@@ -25602,7 +26604,7 @@
               </a:lnSpc>
               <a:buNone/>
             </a:pPr>
-            <a:endParaRPr lang="en-US" sz="2400" dirty="0">
+            <a:endParaRPr lang="en-US" sz="1600" dirty="0">
               <a:solidFill>
                 <a:schemeClr val="tx1"/>
               </a:solidFill>
@@ -25617,13 +26619,13 @@
               <a:buNone/>
             </a:pPr>
             <a:r>
-              <a:rPr lang="en-US" sz="2600" dirty="0">
+              <a:rPr lang="en-US" sz="3200" dirty="0">
                 <a:solidFill>
                   <a:schemeClr val="tx1"/>
                 </a:solidFill>
                 <a:latin typeface="+mj-lt"/>
               </a:rPr>
-              <a:t>For data stored in Azure Synapse SQL databases as well as data stored in Azure Storage (including Azure Data Lake Store Gen2), Azure Synapse Analytics supports transparent data encryption (TDE), which means all data is encrypted when written to disk and decrypted when read. When it comes to the keys used for encryption and decryption, TDE provides the option of using service managed keys that are supplied by Microsoft, or user managed keys that are provided by the customer and are stored securely in Azure Key Vault.</a:t>
+              <a:t>Azure Synapse Analytics supports serverless querying via Azure Synapse SQL serverless allowing for interactive queries that utilize T-SQL queries over high scale data in Azure storage. It supports data in various formats including Parquet, CSV, and JSON. It would be appropriate for dashboards and reports, as it supports Power BI and can be used refresh dashboard datasets. It is also appropriate for basic data discovery and exploration and supporting "single query ETL" that transforms Azure Storage based data in a massively parallel fashion.</a:t>
             </a:r>
           </a:p>
           <a:p>
@@ -25633,12 +26635,19 @@
               </a:solidFill>
             </a:endParaRPr>
           </a:p>
+          <a:p>
+            <a:endParaRPr lang="en-US" sz="3600" dirty="0">
+              <a:solidFill>
+                <a:schemeClr val="tx1"/>
+              </a:solidFill>
+            </a:endParaRPr>
+          </a:p>
         </p:txBody>
       </p:sp>
     </p:spTree>
     <p:extLst>
       <p:ext uri="{BB962C8B-B14F-4D97-AF65-F5344CB8AC3E}">
-        <p14:creationId xmlns:p14="http://schemas.microsoft.com/office/powerpoint/2010/main" val="2807529211"/>
+        <p14:creationId xmlns:p14="http://schemas.microsoft.com/office/powerpoint/2010/main" val="1953069638"/>
       </p:ext>
     </p:extLst>
   </p:cSld>
@@ -25697,7 +26706,7 @@
                 </a:solidFill>
                 <a:cs typeface="Segoe UI" panose="020B0502040204020203" pitchFamily="34" charset="0"/>
               </a:rPr>
-              <a:t>Preferred objections handling - 4</a:t>
+              <a:t>Preferred objections handling - 3</a:t>
             </a:r>
             <a:br>
               <a:rPr lang="en-US" dirty="0">
@@ -25734,25 +26743,9 @@
         </p:spPr>
         <p:txBody>
           <a:bodyPr>
-            <a:normAutofit/>
+            <a:normAutofit fontScale="70000" lnSpcReduction="20000"/>
           </a:bodyPr>
           <a:lstStyle/>
-          <a:p>
-            <a:pPr marL="0" indent="0">
-              <a:lnSpc>
-                <a:spcPct val="100000"/>
-              </a:lnSpc>
-              <a:buNone/>
-            </a:pPr>
-            <a:r>
-              <a:rPr lang="en-US" sz="3000" dirty="0">
-                <a:solidFill>
-                  <a:schemeClr val="tx1"/>
-                </a:solidFill>
-              </a:rPr>
-              <a:t>Azure Databricks and Azure Synapse Analytics seem to have overlapping capabilities, how does one choose between them?</a:t>
-            </a:r>
-          </a:p>
           <a:p>
             <a:pPr marL="0" indent="0">
               <a:lnSpc>
@@ -25760,42 +26753,19 @@
               </a:lnSpc>
               <a:buNone/>
             </a:pPr>
-            <a:endParaRPr lang="en-US" sz="1100" dirty="0">
-              <a:solidFill>
-                <a:schemeClr val="tx1"/>
-              </a:solidFill>
-              <a:latin typeface="+mj-lt"/>
-            </a:endParaRPr>
+            <a:r>
+              <a:rPr lang="en-US" sz="3100" dirty="0">
+                <a:solidFill>
+                  <a:schemeClr val="tx1"/>
+                </a:solidFill>
+              </a:rPr>
+              <a:t>If Azure provides serverless querying, does selecting serverless remove the option of using pre-allocated query resources?</a:t>
+            </a:r>
           </a:p>
           <a:p>
             <a:pPr marL="0" indent="0">
               <a:lnSpc>
-                <a:spcPct val="100000"/>
-              </a:lnSpc>
-              <a:buNone/>
-            </a:pPr>
-            <a:r>
-              <a:rPr lang="en-US" sz="2400" dirty="0">
-                <a:solidFill>
-                  <a:schemeClr val="tx1"/>
-                </a:solidFill>
-                <a:latin typeface="+mj-lt"/>
-              </a:rPr>
-              <a:t>For customers primarily looking for a Data Warehousing solution, we recommend Azure Synapse Analytics</a:t>
-            </a:r>
-            <a:r>
-              <a:rPr lang="en-US" sz="2400" dirty="0">
-                <a:solidFill>
-                  <a:schemeClr val="tx1"/>
-                </a:solidFill>
-              </a:rPr>
-              <a:t>. </a:t>
-            </a:r>
-          </a:p>
-          <a:p>
-            <a:pPr marL="0" indent="0">
-              <a:lnSpc>
-                <a:spcPct val="100000"/>
+                <a:spcPct val="120000"/>
               </a:lnSpc>
               <a:buNone/>
             </a:pPr>
@@ -25809,29 +26779,54 @@
           <a:p>
             <a:pPr marL="0" indent="0">
               <a:lnSpc>
-                <a:spcPct val="100000"/>
+                <a:spcPct val="120000"/>
               </a:lnSpc>
               <a:buNone/>
             </a:pPr>
             <a:r>
-              <a:rPr lang="en-US" sz="2400" dirty="0">
+              <a:rPr lang="en-US" sz="2600" dirty="0">
                 <a:solidFill>
                   <a:schemeClr val="tx1"/>
                 </a:solidFill>
                 <a:latin typeface="+mj-lt"/>
               </a:rPr>
-              <a:t>For customers primarily looking for a Spark solution and don’t have data warehousing needs, we recommend Azure Databricks. In case of Spark based ML scenarios, we also recommend using Azure Machine Learning from within Azure Databricks for experiment tracking, automated machine learning and MLOPs.</a:t>
-            </a:r>
-            <a:endParaRPr lang="en-US" sz="2400" dirty="0">
+              <a:t>No. This is a unique differentiator of Azure Synapse Analytics. Within one Azure Synapse Analytics workspace, they can have pre-provisioned Azure Synapse SQL Pools, and have serverless querying using the Azure Synapse SQL serverless endpoint.</a:t>
+            </a:r>
+          </a:p>
+          <a:p>
+            <a:pPr marL="336145" lvl="1" indent="0">
+              <a:lnSpc>
+                <a:spcPct val="120000"/>
+              </a:lnSpc>
+              <a:buNone/>
+            </a:pPr>
+            <a:endParaRPr lang="en-US" sz="2032" dirty="0">
               <a:solidFill>
                 <a:schemeClr val="tx1"/>
               </a:solidFill>
+              <a:latin typeface="+mj-lt"/>
             </a:endParaRPr>
           </a:p>
           <a:p>
             <a:pPr marL="0" indent="0">
               <a:lnSpc>
-                <a:spcPct val="100000"/>
+                <a:spcPct val="120000"/>
+              </a:lnSpc>
+              <a:buNone/>
+            </a:pPr>
+            <a:r>
+              <a:rPr lang="en-US" sz="3100" dirty="0">
+                <a:solidFill>
+                  <a:schemeClr val="tx1"/>
+                </a:solidFill>
+              </a:rPr>
+              <a:t>Having multiple data sources, pipelines and reports makes it hard to track what data goes where and is accessed by who. Is there a way to visualize a complete data supply chain from raw data to business insights? </a:t>
+            </a:r>
+          </a:p>
+          <a:p>
+            <a:pPr marL="0" indent="0">
+              <a:lnSpc>
+                <a:spcPct val="120000"/>
               </a:lnSpc>
               <a:buNone/>
             </a:pPr>
@@ -25845,26 +26840,51 @@
           <a:p>
             <a:pPr marL="0" indent="0">
               <a:lnSpc>
-                <a:spcPct val="100000"/>
+                <a:spcPct val="120000"/>
               </a:lnSpc>
               <a:buNone/>
             </a:pPr>
             <a:r>
-              <a:rPr lang="en-US" sz="2400" dirty="0">
+              <a:rPr lang="en-US" sz="2600" dirty="0">
                 <a:solidFill>
                   <a:schemeClr val="tx1"/>
                 </a:solidFill>
                 <a:latin typeface="+mj-lt"/>
               </a:rPr>
-              <a:t>For customers who are heavily investing in Spark and have data warehousing needs, we recommend both Azure Databricks and Azure Synapse.</a:t>
-            </a:r>
+              <a:t>Azure Purview Data Catalog can connect with data processing, storage, and analytics systems to extract lineage information. Data lineage is broadly understood as the lifecycle that spans the data’s origin and where it moves over time across the data estate. It is used for different kinds of backward-looking scenarios such as troubleshooting, tracing root causes in data pipelines, and debugging. Lineage is also used for data quality analysis, compliance, and “what if” scenarios, often referred to as impact analysis. In Azure </a:t>
+            </a:r>
+            <a:r>
+              <a:rPr lang="en-US" sz="2600" dirty="0" err="1">
+                <a:solidFill>
+                  <a:schemeClr val="tx1"/>
+                </a:solidFill>
+                <a:latin typeface="+mj-lt"/>
+              </a:rPr>
+              <a:t>Pureview</a:t>
+            </a:r>
+            <a:r>
+              <a:rPr lang="en-US" sz="2600" dirty="0">
+                <a:solidFill>
+                  <a:schemeClr val="tx1"/>
+                </a:solidFill>
+                <a:latin typeface="+mj-lt"/>
+              </a:rPr>
+              <a:t>, the Lineage is represented visually to show data moving from source to destination, including how the data was transformed. The information is combined to represent a generic, scenario-specific lineage experience in the Catalog.</a:t>
+            </a:r>
+          </a:p>
+          <a:p>
+            <a:endParaRPr lang="en-US" sz="3600" dirty="0">
+              <a:solidFill>
+                <a:schemeClr val="tx1"/>
+              </a:solidFill>
+            </a:endParaRPr>
           </a:p>
         </p:txBody>
       </p:sp>
     </p:spTree>
     <p:extLst>
       <p:ext uri="{BB962C8B-B14F-4D97-AF65-F5344CB8AC3E}">
-        <p14:creationId xmlns:p14="http://schemas.microsoft.com/office/powerpoint/2010/main" val="1693185608"/>
+        <p14:creationId xmlns:p14="http://schemas.microsoft.com/office/powerpoint/2010/main" val="2807529211"/>
       </p:ext>
     </p:extLst>
   </p:cSld>
@@ -25923,7 +26943,7 @@
                 </a:solidFill>
                 <a:cs typeface="Segoe UI" panose="020B0502040204020203" pitchFamily="34" charset="0"/>
               </a:rPr>
-              <a:t>Preferred objections handling - 5</a:t>
+              <a:t>Preferred objections handling - 4</a:t>
             </a:r>
             <a:br>
               <a:rPr lang="en-US" dirty="0">
@@ -25960,55 +26980,16 @@
         </p:spPr>
         <p:txBody>
           <a:bodyPr>
-            <a:normAutofit/>
+            <a:normAutofit lnSpcReduction="10000"/>
           </a:bodyPr>
           <a:lstStyle/>
           <a:p>
-            <a:pPr marL="0" indent="0">
+            <a:pPr marL="336145" lvl="1" indent="0">
               <a:lnSpc>
-                <a:spcPct val="100000"/>
+                <a:spcPct val="120000"/>
               </a:lnSpc>
               <a:buNone/>
             </a:pPr>
-            <a:r>
-              <a:rPr lang="en-US" sz="3000" dirty="0">
-                <a:solidFill>
-                  <a:schemeClr val="tx1"/>
-                </a:solidFill>
-              </a:rPr>
-              <a:t>How does Azure support deploying the models as web services so that they can easily be invoked from client applications? How does a model get deployed as a webservice?</a:t>
-            </a:r>
-          </a:p>
-          <a:p>
-            <a:pPr marL="0" indent="0">
-              <a:lnSpc>
-                <a:spcPct val="100000"/>
-              </a:lnSpc>
-              <a:buNone/>
-            </a:pPr>
-            <a:endParaRPr lang="en-US" sz="3000" dirty="0">
-              <a:solidFill>
-                <a:schemeClr val="tx1"/>
-              </a:solidFill>
-              <a:latin typeface="+mj-lt"/>
-            </a:endParaRPr>
-          </a:p>
-          <a:p>
-            <a:pPr marL="0" indent="0">
-              <a:lnSpc>
-                <a:spcPct val="100000"/>
-              </a:lnSpc>
-              <a:buNone/>
-            </a:pPr>
-            <a:r>
-              <a:rPr lang="en-US" sz="2400" dirty="0">
-                <a:solidFill>
-                  <a:schemeClr val="tx1"/>
-                </a:solidFill>
-                <a:latin typeface="+mj-lt"/>
-              </a:rPr>
-              <a:t>By leveraging Azure Machine Learning, models can be deployed and exposed using REST web services. The services can be deployed via Azure Kubernetes Services or Azure Container Instances. Integration with the Azure Machine Learning model registry ensures that the web services always have the most up-to-date model.</a:t>
-            </a:r>
             <a:endParaRPr lang="en-US" sz="2032" dirty="0">
               <a:solidFill>
                 <a:schemeClr val="tx1"/>
@@ -26016,12 +26997,66 @@
               <a:latin typeface="+mj-lt"/>
             </a:endParaRPr>
           </a:p>
+          <a:p>
+            <a:pPr marL="0" indent="0">
+              <a:lnSpc>
+                <a:spcPct val="120000"/>
+              </a:lnSpc>
+              <a:buNone/>
+            </a:pPr>
+            <a:r>
+              <a:rPr lang="en-US" sz="3100" dirty="0">
+                <a:solidFill>
+                  <a:schemeClr val="tx1"/>
+                </a:solidFill>
+              </a:rPr>
+              <a:t>Would data be protected at rest and are there controls over the keys used to encrypt it?</a:t>
+            </a:r>
+          </a:p>
+          <a:p>
+            <a:pPr marL="0" indent="0">
+              <a:lnSpc>
+                <a:spcPct val="120000"/>
+              </a:lnSpc>
+              <a:buNone/>
+            </a:pPr>
+            <a:endParaRPr lang="en-US" sz="2400" dirty="0">
+              <a:solidFill>
+                <a:schemeClr val="tx1"/>
+              </a:solidFill>
+              <a:latin typeface="+mj-lt"/>
+            </a:endParaRPr>
+          </a:p>
+          <a:p>
+            <a:pPr marL="0" indent="0">
+              <a:lnSpc>
+                <a:spcPct val="120000"/>
+              </a:lnSpc>
+              <a:buNone/>
+            </a:pPr>
+            <a:r>
+              <a:rPr lang="en-US" sz="2600" dirty="0">
+                <a:solidFill>
+                  <a:schemeClr val="tx1"/>
+                </a:solidFill>
+                <a:latin typeface="+mj-lt"/>
+              </a:rPr>
+              <a:t>For data stored in Azure Synapse SQL databases as well as data stored in Azure Storage (including Azure Data Lake Store Gen2), Azure Synapse Analytics supports transparent data encryption (TDE), which means all data is encrypted when written to disk and decrypted when read. When it comes to the keys used for encryption and decryption, TDE provides the option of using service managed keys that are supplied by Microsoft, or user managed keys that are provided by the customer and are stored securely in Azure Key Vault.</a:t>
+            </a:r>
+          </a:p>
+          <a:p>
+            <a:endParaRPr lang="en-US" sz="3600" dirty="0">
+              <a:solidFill>
+                <a:schemeClr val="tx1"/>
+              </a:solidFill>
+            </a:endParaRPr>
+          </a:p>
         </p:txBody>
       </p:sp>
     </p:spTree>
     <p:extLst>
       <p:ext uri="{BB962C8B-B14F-4D97-AF65-F5344CB8AC3E}">
-        <p14:creationId xmlns:p14="http://schemas.microsoft.com/office/powerpoint/2010/main" val="1018017215"/>
+        <p14:creationId xmlns:p14="http://schemas.microsoft.com/office/powerpoint/2010/main" val="3995063586"/>
       </p:ext>
     </p:extLst>
   </p:cSld>
@@ -26080,7 +27115,7 @@
                 </a:solidFill>
                 <a:cs typeface="Segoe UI" panose="020B0502040204020203" pitchFamily="34" charset="0"/>
               </a:rPr>
-              <a:t>Preferred objections handling - 6</a:t>
+              <a:t>Preferred objections handling - 5</a:t>
             </a:r>
             <a:br>
               <a:rPr lang="en-US" dirty="0">
@@ -26133,6 +27168,389 @@
                   <a:schemeClr val="tx1"/>
                 </a:solidFill>
               </a:rPr>
+              <a:t>Azure Databricks and Azure Synapse Analytics seem to have overlapping capabilities, how does one choose between them?</a:t>
+            </a:r>
+          </a:p>
+          <a:p>
+            <a:pPr marL="0" indent="0">
+              <a:lnSpc>
+                <a:spcPct val="120000"/>
+              </a:lnSpc>
+              <a:buNone/>
+            </a:pPr>
+            <a:endParaRPr lang="en-US" sz="1100" dirty="0">
+              <a:solidFill>
+                <a:schemeClr val="tx1"/>
+              </a:solidFill>
+              <a:latin typeface="+mj-lt"/>
+            </a:endParaRPr>
+          </a:p>
+          <a:p>
+            <a:pPr marL="0" indent="0">
+              <a:lnSpc>
+                <a:spcPct val="100000"/>
+              </a:lnSpc>
+              <a:buNone/>
+            </a:pPr>
+            <a:r>
+              <a:rPr lang="en-US" sz="2400" dirty="0">
+                <a:solidFill>
+                  <a:schemeClr val="tx1"/>
+                </a:solidFill>
+                <a:latin typeface="+mj-lt"/>
+              </a:rPr>
+              <a:t>For customers primarily looking for a Data Warehousing solution, we recommend Azure Synapse Analytics</a:t>
+            </a:r>
+            <a:r>
+              <a:rPr lang="en-US" sz="2400" dirty="0">
+                <a:solidFill>
+                  <a:schemeClr val="tx1"/>
+                </a:solidFill>
+              </a:rPr>
+              <a:t>. </a:t>
+            </a:r>
+          </a:p>
+          <a:p>
+            <a:pPr marL="0" indent="0">
+              <a:lnSpc>
+                <a:spcPct val="100000"/>
+              </a:lnSpc>
+              <a:buNone/>
+            </a:pPr>
+            <a:endParaRPr lang="en-US" sz="2400" dirty="0">
+              <a:solidFill>
+                <a:schemeClr val="tx1"/>
+              </a:solidFill>
+              <a:latin typeface="+mj-lt"/>
+            </a:endParaRPr>
+          </a:p>
+          <a:p>
+            <a:pPr marL="0" indent="0">
+              <a:lnSpc>
+                <a:spcPct val="100000"/>
+              </a:lnSpc>
+              <a:buNone/>
+            </a:pPr>
+            <a:r>
+              <a:rPr lang="en-US" sz="2400" dirty="0">
+                <a:solidFill>
+                  <a:schemeClr val="tx1"/>
+                </a:solidFill>
+                <a:latin typeface="+mj-lt"/>
+              </a:rPr>
+              <a:t>For customers primarily looking for a Spark solution and don’t have data warehousing needs, we recommend Azure Databricks. In case of Spark based ML scenarios, we also recommend using Azure Machine Learning from within Azure Databricks for experiment tracking, automated machine learning and MLOPs.</a:t>
+            </a:r>
+            <a:endParaRPr lang="en-US" sz="2400" dirty="0">
+              <a:solidFill>
+                <a:schemeClr val="tx1"/>
+              </a:solidFill>
+            </a:endParaRPr>
+          </a:p>
+          <a:p>
+            <a:pPr marL="0" indent="0">
+              <a:lnSpc>
+                <a:spcPct val="100000"/>
+              </a:lnSpc>
+              <a:buNone/>
+            </a:pPr>
+            <a:endParaRPr lang="en-US" sz="2400" dirty="0">
+              <a:solidFill>
+                <a:schemeClr val="tx1"/>
+              </a:solidFill>
+              <a:latin typeface="+mj-lt"/>
+            </a:endParaRPr>
+          </a:p>
+          <a:p>
+            <a:pPr marL="0" indent="0">
+              <a:lnSpc>
+                <a:spcPct val="100000"/>
+              </a:lnSpc>
+              <a:buNone/>
+            </a:pPr>
+            <a:r>
+              <a:rPr lang="en-US" sz="2400" dirty="0">
+                <a:solidFill>
+                  <a:schemeClr val="tx1"/>
+                </a:solidFill>
+                <a:latin typeface="+mj-lt"/>
+              </a:rPr>
+              <a:t>For customers who are heavily investing in Spark and have data warehousing needs, we recommend both Azure Databricks and Azure Synapse.</a:t>
+            </a:r>
+          </a:p>
+        </p:txBody>
+      </p:sp>
+    </p:spTree>
+    <p:extLst>
+      <p:ext uri="{BB962C8B-B14F-4D97-AF65-F5344CB8AC3E}">
+        <p14:creationId xmlns:p14="http://schemas.microsoft.com/office/powerpoint/2010/main" val="1693185608"/>
+      </p:ext>
+    </p:extLst>
+  </p:cSld>
+  <p:clrMapOvr>
+    <a:masterClrMapping/>
+  </p:clrMapOvr>
+  <mc:AlternateContent xmlns:mc="http://schemas.openxmlformats.org/markup-compatibility/2006" xmlns:p14="http://schemas.microsoft.com/office/powerpoint/2010/main">
+    <mc:Choice Requires="p14">
+      <p:transition p14:dur="0"/>
+    </mc:Choice>
+    <mc:Fallback xmlns="">
+      <p:transition/>
+    </mc:Fallback>
+  </mc:AlternateContent>
+</p:sld>
+</file>
+
+<file path=ppt/slides/slide38.xml><?xml version="1.0" encoding="utf-8"?>
+<p:sld xmlns:a="http://schemas.openxmlformats.org/drawingml/2006/main" xmlns:r="http://schemas.openxmlformats.org/officeDocument/2006/relationships" xmlns:p="http://schemas.openxmlformats.org/presentationml/2006/main">
+  <p:cSld>
+    <p:spTree>
+      <p:nvGrpSpPr>
+        <p:cNvPr id="1" name=""/>
+        <p:cNvGrpSpPr/>
+        <p:nvPr/>
+      </p:nvGrpSpPr>
+      <p:grpSpPr>
+        <a:xfrm>
+          <a:off x="0" y="0"/>
+          <a:ext cx="0" cy="0"/>
+          <a:chOff x="0" y="0"/>
+          <a:chExt cx="0" cy="0"/>
+        </a:xfrm>
+      </p:grpSpPr>
+      <p:sp>
+        <p:nvSpPr>
+          <p:cNvPr id="2" name="Title 1"/>
+          <p:cNvSpPr>
+            <a:spLocks noGrp="1"/>
+          </p:cNvSpPr>
+          <p:nvPr>
+            <p:ph type="title"/>
+          </p:nvPr>
+        </p:nvSpPr>
+        <p:spPr/>
+        <p:txBody>
+          <a:bodyPr>
+            <a:normAutofit fontScale="90000"/>
+          </a:bodyPr>
+          <a:lstStyle/>
+          <a:p>
+            <a:r>
+              <a:rPr lang="en-US" sz="4900" dirty="0">
+                <a:solidFill>
+                  <a:schemeClr val="tx1"/>
+                </a:solidFill>
+                <a:cs typeface="Segoe UI" panose="020B0502040204020203" pitchFamily="34" charset="0"/>
+              </a:rPr>
+              <a:t>Preferred objections handling - 6</a:t>
+            </a:r>
+            <a:br>
+              <a:rPr lang="en-US" dirty="0">
+                <a:solidFill>
+                  <a:schemeClr val="tx1"/>
+                </a:solidFill>
+                <a:latin typeface="Segoe UI" panose="020B0502040204020203" pitchFamily="34" charset="0"/>
+              </a:rPr>
+            </a:br>
+            <a:endParaRPr lang="en-US" sz="3236" dirty="0">
+              <a:solidFill>
+                <a:schemeClr val="tx1"/>
+              </a:solidFill>
+              <a:latin typeface="Segoe UI" panose="020B0502040204020203" pitchFamily="34" charset="0"/>
+            </a:endParaRPr>
+          </a:p>
+        </p:txBody>
+      </p:sp>
+      <p:sp>
+        <p:nvSpPr>
+          <p:cNvPr id="3" name="Content Placeholder 2"/>
+          <p:cNvSpPr>
+            <a:spLocks noGrp="1"/>
+          </p:cNvSpPr>
+          <p:nvPr>
+            <p:ph type="body" sz="quarter" idx="10"/>
+          </p:nvPr>
+        </p:nvSpPr>
+        <p:spPr>
+          <a:xfrm>
+            <a:off x="269239" y="1189177"/>
+            <a:ext cx="11653523" cy="5668824"/>
+          </a:xfrm>
+        </p:spPr>
+        <p:txBody>
+          <a:bodyPr>
+            <a:normAutofit/>
+          </a:bodyPr>
+          <a:lstStyle/>
+          <a:p>
+            <a:pPr marL="0" indent="0">
+              <a:lnSpc>
+                <a:spcPct val="100000"/>
+              </a:lnSpc>
+              <a:buNone/>
+            </a:pPr>
+            <a:r>
+              <a:rPr lang="en-US" sz="3000" dirty="0">
+                <a:solidFill>
+                  <a:schemeClr val="tx1"/>
+                </a:solidFill>
+              </a:rPr>
+              <a:t>How does Azure support deploying the models as web services so that they can easily be invoked from client applications? How does a model get deployed as a webservice?</a:t>
+            </a:r>
+          </a:p>
+          <a:p>
+            <a:pPr marL="0" indent="0">
+              <a:lnSpc>
+                <a:spcPct val="100000"/>
+              </a:lnSpc>
+              <a:buNone/>
+            </a:pPr>
+            <a:endParaRPr lang="en-US" sz="3000" dirty="0">
+              <a:solidFill>
+                <a:schemeClr val="tx1"/>
+              </a:solidFill>
+              <a:latin typeface="+mj-lt"/>
+            </a:endParaRPr>
+          </a:p>
+          <a:p>
+            <a:pPr marL="0" indent="0">
+              <a:lnSpc>
+                <a:spcPct val="100000"/>
+              </a:lnSpc>
+              <a:buNone/>
+            </a:pPr>
+            <a:r>
+              <a:rPr lang="en-US" sz="2400" dirty="0">
+                <a:solidFill>
+                  <a:schemeClr val="tx1"/>
+                </a:solidFill>
+                <a:latin typeface="+mj-lt"/>
+              </a:rPr>
+              <a:t>By leveraging Azure Machine Learning, models can be deployed and exposed using REST web services. The services can be deployed via Azure Kubernetes Services or Azure Container Instances. Integration with the Azure Machine Learning model registry ensures that the web services always have the most up-to-date model.</a:t>
+            </a:r>
+            <a:endParaRPr lang="en-US" sz="2032" dirty="0">
+              <a:solidFill>
+                <a:schemeClr val="tx1"/>
+              </a:solidFill>
+              <a:latin typeface="+mj-lt"/>
+            </a:endParaRPr>
+          </a:p>
+        </p:txBody>
+      </p:sp>
+    </p:spTree>
+    <p:extLst>
+      <p:ext uri="{BB962C8B-B14F-4D97-AF65-F5344CB8AC3E}">
+        <p14:creationId xmlns:p14="http://schemas.microsoft.com/office/powerpoint/2010/main" val="1018017215"/>
+      </p:ext>
+    </p:extLst>
+  </p:cSld>
+  <p:clrMapOvr>
+    <a:masterClrMapping/>
+  </p:clrMapOvr>
+  <mc:AlternateContent xmlns:mc="http://schemas.openxmlformats.org/markup-compatibility/2006" xmlns:p14="http://schemas.microsoft.com/office/powerpoint/2010/main">
+    <mc:Choice Requires="p14">
+      <p:transition p14:dur="0"/>
+    </mc:Choice>
+    <mc:Fallback xmlns="">
+      <p:transition/>
+    </mc:Fallback>
+  </mc:AlternateContent>
+</p:sld>
+</file>
+
+<file path=ppt/slides/slide39.xml><?xml version="1.0" encoding="utf-8"?>
+<p:sld xmlns:a="http://schemas.openxmlformats.org/drawingml/2006/main" xmlns:r="http://schemas.openxmlformats.org/officeDocument/2006/relationships" xmlns:p="http://schemas.openxmlformats.org/presentationml/2006/main">
+  <p:cSld>
+    <p:spTree>
+      <p:nvGrpSpPr>
+        <p:cNvPr id="1" name=""/>
+        <p:cNvGrpSpPr/>
+        <p:nvPr/>
+      </p:nvGrpSpPr>
+      <p:grpSpPr>
+        <a:xfrm>
+          <a:off x="0" y="0"/>
+          <a:ext cx="0" cy="0"/>
+          <a:chOff x="0" y="0"/>
+          <a:chExt cx="0" cy="0"/>
+        </a:xfrm>
+      </p:grpSpPr>
+      <p:sp>
+        <p:nvSpPr>
+          <p:cNvPr id="2" name="Title 1"/>
+          <p:cNvSpPr>
+            <a:spLocks noGrp="1"/>
+          </p:cNvSpPr>
+          <p:nvPr>
+            <p:ph type="title"/>
+          </p:nvPr>
+        </p:nvSpPr>
+        <p:spPr/>
+        <p:txBody>
+          <a:bodyPr>
+            <a:normAutofit fontScale="90000"/>
+          </a:bodyPr>
+          <a:lstStyle/>
+          <a:p>
+            <a:r>
+              <a:rPr lang="en-US" sz="4900" dirty="0">
+                <a:solidFill>
+                  <a:schemeClr val="tx1"/>
+                </a:solidFill>
+                <a:cs typeface="Segoe UI" panose="020B0502040204020203" pitchFamily="34" charset="0"/>
+              </a:rPr>
+              <a:t>Preferred objections handling - 7</a:t>
+            </a:r>
+            <a:br>
+              <a:rPr lang="en-US" dirty="0">
+                <a:solidFill>
+                  <a:schemeClr val="tx1"/>
+                </a:solidFill>
+                <a:latin typeface="Segoe UI" panose="020B0502040204020203" pitchFamily="34" charset="0"/>
+              </a:rPr>
+            </a:br>
+            <a:endParaRPr lang="en-US" sz="3236" dirty="0">
+              <a:solidFill>
+                <a:schemeClr val="tx1"/>
+              </a:solidFill>
+              <a:latin typeface="Segoe UI" panose="020B0502040204020203" pitchFamily="34" charset="0"/>
+            </a:endParaRPr>
+          </a:p>
+        </p:txBody>
+      </p:sp>
+      <p:sp>
+        <p:nvSpPr>
+          <p:cNvPr id="3" name="Content Placeholder 2"/>
+          <p:cNvSpPr>
+            <a:spLocks noGrp="1"/>
+          </p:cNvSpPr>
+          <p:nvPr>
+            <p:ph type="body" sz="quarter" idx="10"/>
+          </p:nvPr>
+        </p:nvSpPr>
+        <p:spPr>
+          <a:xfrm>
+            <a:off x="269239" y="1189177"/>
+            <a:ext cx="11653523" cy="5668824"/>
+          </a:xfrm>
+        </p:spPr>
+        <p:txBody>
+          <a:bodyPr>
+            <a:normAutofit/>
+          </a:bodyPr>
+          <a:lstStyle/>
+          <a:p>
+            <a:pPr marL="0" indent="0">
+              <a:lnSpc>
+                <a:spcPct val="100000"/>
+              </a:lnSpc>
+              <a:buNone/>
+            </a:pPr>
+            <a:r>
+              <a:rPr lang="en-US" sz="3000" dirty="0">
+                <a:solidFill>
+                  <a:schemeClr val="tx1"/>
+                </a:solidFill>
+              </a:rPr>
               <a:t>What does the model re-training process look like in Azure? How can WWI data scientists train and evaluate new models but also ensure this re-training becomes part of the DevOps process used to deploy any updates to the application. Can Azure help them orchestrate updates to the client applications, the machine learning API's and the models that power the API’s?</a:t>
             </a:r>
             <a:endParaRPr lang="en-US" sz="2400" dirty="0">
@@ -26201,7 +27619,203 @@
 </p:sld>
 </file>
 
-<file path=ppt/slides/slide38.xml><?xml version="1.0" encoding="utf-8"?>
+<file path=ppt/slides/slide4.xml><?xml version="1.0" encoding="utf-8"?>
+<p:sld xmlns:a="http://schemas.openxmlformats.org/drawingml/2006/main" xmlns:r="http://schemas.openxmlformats.org/officeDocument/2006/relationships" xmlns:p="http://schemas.openxmlformats.org/presentationml/2006/main">
+  <p:cSld>
+    <p:spTree>
+      <p:nvGrpSpPr>
+        <p:cNvPr id="1" name=""/>
+        <p:cNvGrpSpPr/>
+        <p:nvPr/>
+      </p:nvGrpSpPr>
+      <p:grpSpPr>
+        <a:xfrm>
+          <a:off x="0" y="0"/>
+          <a:ext cx="0" cy="0"/>
+          <a:chOff x="0" y="0"/>
+          <a:chExt cx="0" cy="0"/>
+        </a:xfrm>
+      </p:grpSpPr>
+      <p:sp>
+        <p:nvSpPr>
+          <p:cNvPr id="2" name="Title 1"/>
+          <p:cNvSpPr>
+            <a:spLocks noGrp="1"/>
+          </p:cNvSpPr>
+          <p:nvPr>
+            <p:ph type="title"/>
+          </p:nvPr>
+        </p:nvSpPr>
+        <p:spPr/>
+        <p:txBody>
+          <a:bodyPr>
+            <a:normAutofit fontScale="90000"/>
+          </a:bodyPr>
+          <a:lstStyle/>
+          <a:p>
+            <a:r>
+              <a:rPr lang="en-US" sz="4900" dirty="0">
+                <a:solidFill>
+                  <a:schemeClr val="tx1"/>
+                </a:solidFill>
+                <a:cs typeface="Segoe UI" panose="020B0502040204020203" pitchFamily="34" charset="0"/>
+              </a:rPr>
+              <a:t>Customer situation</a:t>
+            </a:r>
+            <a:br>
+              <a:rPr lang="en-US" dirty="0">
+                <a:solidFill>
+                  <a:schemeClr val="tx1"/>
+                </a:solidFill>
+                <a:latin typeface="Segoe UI" panose="020B0502040204020203" pitchFamily="34" charset="0"/>
+              </a:rPr>
+            </a:br>
+            <a:endParaRPr lang="en-US" sz="3236" dirty="0">
+              <a:solidFill>
+                <a:schemeClr val="tx1"/>
+              </a:solidFill>
+              <a:latin typeface="Segoe UI" panose="020B0502040204020203" pitchFamily="34" charset="0"/>
+            </a:endParaRPr>
+          </a:p>
+        </p:txBody>
+      </p:sp>
+      <p:sp>
+        <p:nvSpPr>
+          <p:cNvPr id="3" name="Content Placeholder 2"/>
+          <p:cNvSpPr>
+            <a:spLocks noGrp="1"/>
+          </p:cNvSpPr>
+          <p:nvPr>
+            <p:ph type="body" sz="quarter" idx="10"/>
+          </p:nvPr>
+        </p:nvSpPr>
+        <p:spPr>
+          <a:xfrm>
+            <a:off x="269240" y="1189177"/>
+            <a:ext cx="7522370" cy="5449828"/>
+          </a:xfrm>
+        </p:spPr>
+        <p:txBody>
+          <a:bodyPr>
+            <a:normAutofit/>
+          </a:bodyPr>
+          <a:lstStyle/>
+          <a:p>
+            <a:r>
+              <a:rPr lang="en-US" sz="2800" dirty="0">
+                <a:solidFill>
+                  <a:schemeClr val="tx1"/>
+                </a:solidFill>
+                <a:latin typeface="+mj-lt"/>
+              </a:rPr>
+              <a:t>Wide World Importers (WWI) has hundreds of brick and mortar stores. </a:t>
+            </a:r>
+            <a:r>
+              <a:rPr lang="en-US" sz="2800" dirty="0">
+                <a:solidFill>
+                  <a:schemeClr val="tx1"/>
+                </a:solidFill>
+              </a:rPr>
+              <a:t>Over their years of operation, they have amassed large amounts of historical data stored in disparate systems.</a:t>
+            </a:r>
+          </a:p>
+          <a:p>
+            <a:pPr marL="0" indent="0">
+              <a:buNone/>
+            </a:pPr>
+            <a:r>
+              <a:rPr lang="en-US" sz="2800" dirty="0">
+                <a:solidFill>
+                  <a:schemeClr val="tx1"/>
+                </a:solidFill>
+              </a:rPr>
+              <a:t> </a:t>
+            </a:r>
+          </a:p>
+          <a:p>
+            <a:r>
+              <a:rPr lang="en-US" sz="2800" dirty="0">
+                <a:solidFill>
+                  <a:schemeClr val="tx1"/>
+                </a:solidFill>
+              </a:rPr>
+              <a:t>They wish to combine their historic data and tie it together with near real-time data streams to produce dashboard KPIs and machine learning models that enable them to make informed up to the minute decisions.</a:t>
+            </a:r>
+            <a:endParaRPr lang="en-US" sz="2800" dirty="0">
+              <a:solidFill>
+                <a:schemeClr val="tx1"/>
+              </a:solidFill>
+              <a:latin typeface="Segoe UI Semilight" panose="020B0402040204020203" pitchFamily="34" charset="0"/>
+              <a:cs typeface="Segoe UI Semilight" panose="020B0402040204020203" pitchFamily="34" charset="0"/>
+            </a:endParaRPr>
+          </a:p>
+          <a:p>
+            <a:pPr marL="0" indent="0">
+              <a:spcAft>
+                <a:spcPts val="882"/>
+              </a:spcAft>
+              <a:buNone/>
+            </a:pPr>
+            <a:endParaRPr lang="en-US" sz="2800" dirty="0">
+              <a:solidFill>
+                <a:schemeClr val="tx1"/>
+              </a:solidFill>
+            </a:endParaRPr>
+          </a:p>
+        </p:txBody>
+      </p:sp>
+      <p:pic>
+        <p:nvPicPr>
+          <p:cNvPr id="4" name="Picture 3" descr="Logo of Wide World Importers.">
+            <a:extLst>
+              <a:ext uri="{FF2B5EF4-FFF2-40B4-BE49-F238E27FC236}">
+                <a16:creationId xmlns:a16="http://schemas.microsoft.com/office/drawing/2014/main" id="{83CC0415-C07A-484F-A129-46775733BBF1}"/>
+              </a:ext>
+            </a:extLst>
+          </p:cNvPr>
+          <p:cNvPicPr>
+            <a:picLocks noChangeAspect="1"/>
+          </p:cNvPicPr>
+          <p:nvPr/>
+        </p:nvPicPr>
+        <p:blipFill>
+          <a:blip r:embed="rId3"/>
+          <a:stretch>
+            <a:fillRect/>
+          </a:stretch>
+        </p:blipFill>
+        <p:spPr>
+          <a:xfrm>
+            <a:off x="7740542" y="1350084"/>
+            <a:ext cx="4182218" cy="4157832"/>
+          </a:xfrm>
+          <a:prstGeom prst="rect">
+            <a:avLst/>
+          </a:prstGeom>
+        </p:spPr>
+      </p:pic>
+    </p:spTree>
+    <p:extLst>
+      <p:ext uri="{BB962C8B-B14F-4D97-AF65-F5344CB8AC3E}">
+        <p14:creationId xmlns:p14="http://schemas.microsoft.com/office/powerpoint/2010/main" val="3429127010"/>
+      </p:ext>
+    </p:extLst>
+  </p:cSld>
+  <p:clrMapOvr>
+    <a:masterClrMapping/>
+  </p:clrMapOvr>
+  <mc:AlternateContent xmlns:mc="http://schemas.openxmlformats.org/markup-compatibility/2006" xmlns:p14="http://schemas.microsoft.com/office/powerpoint/2010/main">
+    <mc:Choice Requires="p14">
+      <p:transition p14:dur="0"/>
+    </mc:Choice>
+    <mc:Fallback xmlns="">
+      <p:transition/>
+    </mc:Fallback>
+  </mc:AlternateContent>
+</p:sld>
+</file>
+
+<file path=ppt/slides/slide40.xml><?xml version="1.0" encoding="utf-8"?>
 <p:sld xmlns:a="http://schemas.openxmlformats.org/drawingml/2006/main" xmlns:r="http://schemas.openxmlformats.org/officeDocument/2006/relationships" xmlns:p="http://schemas.openxmlformats.org/presentationml/2006/main">
   <p:cSld>
     <p:spTree>
@@ -26368,7 +27982,7 @@
 </p:sld>
 </file>
 
-<file path=ppt/slides/slide39.xml><?xml version="1.0" encoding="utf-8"?>
+<file path=ppt/slides/slide41.xml><?xml version="1.0" encoding="utf-8"?>
 <p:sld xmlns:a="http://schemas.openxmlformats.org/drawingml/2006/main" xmlns:r="http://schemas.openxmlformats.org/officeDocument/2006/relationships" xmlns:p="http://schemas.openxmlformats.org/presentationml/2006/main">
   <p:cSld>
     <p:bg>
@@ -26393,6 +28007,43 @@
           <a:chExt cx="0" cy="0"/>
         </a:xfrm>
       </p:grpSpPr>
+      <p:sp>
+        <p:nvSpPr>
+          <p:cNvPr id="3" name="Title 2">
+            <a:extLst>
+              <a:ext uri="{FF2B5EF4-FFF2-40B4-BE49-F238E27FC236}">
+                <a16:creationId xmlns:a16="http://schemas.microsoft.com/office/drawing/2014/main" id="{C3F85663-EA6A-45B5-9C0C-E3BA3D03B051}"/>
+              </a:ext>
+            </a:extLst>
+          </p:cNvPr>
+          <p:cNvSpPr>
+            <a:spLocks noGrp="1"/>
+          </p:cNvSpPr>
+          <p:nvPr>
+            <p:ph type="title" idx="4294967295"/>
+          </p:nvPr>
+        </p:nvSpPr>
+        <p:spPr>
+          <a:xfrm>
+            <a:off x="2383276" y="289511"/>
+            <a:ext cx="9541803" cy="899665"/>
+          </a:xfrm>
+        </p:spPr>
+        <p:txBody>
+          <a:bodyPr/>
+          <a:lstStyle/>
+          <a:p>
+            <a:r>
+              <a:rPr lang="en-US" dirty="0">
+                <a:solidFill>
+                  <a:srgbClr val="0078D7"/>
+                </a:solidFill>
+              </a:rPr>
+              <a:t>Final Closing Slide</a:t>
+            </a:r>
+          </a:p>
+        </p:txBody>
+      </p:sp>
     </p:spTree>
     <p:extLst>
       <p:ext uri="{BB962C8B-B14F-4D97-AF65-F5344CB8AC3E}">
@@ -26413,202 +28064,6 @@
       <p:transition spd="med">
         <p:fade/>
       </p:transition>
-    </mc:Fallback>
-  </mc:AlternateContent>
-</p:sld>
-</file>
-
-<file path=ppt/slides/slide4.xml><?xml version="1.0" encoding="utf-8"?>
-<p:sld xmlns:a="http://schemas.openxmlformats.org/drawingml/2006/main" xmlns:r="http://schemas.openxmlformats.org/officeDocument/2006/relationships" xmlns:p="http://schemas.openxmlformats.org/presentationml/2006/main">
-  <p:cSld>
-    <p:spTree>
-      <p:nvGrpSpPr>
-        <p:cNvPr id="1" name=""/>
-        <p:cNvGrpSpPr/>
-        <p:nvPr/>
-      </p:nvGrpSpPr>
-      <p:grpSpPr>
-        <a:xfrm>
-          <a:off x="0" y="0"/>
-          <a:ext cx="0" cy="0"/>
-          <a:chOff x="0" y="0"/>
-          <a:chExt cx="0" cy="0"/>
-        </a:xfrm>
-      </p:grpSpPr>
-      <p:sp>
-        <p:nvSpPr>
-          <p:cNvPr id="2" name="Title 1"/>
-          <p:cNvSpPr>
-            <a:spLocks noGrp="1"/>
-          </p:cNvSpPr>
-          <p:nvPr>
-            <p:ph type="title"/>
-          </p:nvPr>
-        </p:nvSpPr>
-        <p:spPr/>
-        <p:txBody>
-          <a:bodyPr>
-            <a:normAutofit fontScale="90000"/>
-          </a:bodyPr>
-          <a:lstStyle/>
-          <a:p>
-            <a:r>
-              <a:rPr lang="en-US" sz="4900" dirty="0">
-                <a:solidFill>
-                  <a:schemeClr val="tx1"/>
-                </a:solidFill>
-                <a:cs typeface="Segoe UI" panose="020B0502040204020203" pitchFamily="34" charset="0"/>
-              </a:rPr>
-              <a:t>Customer situation</a:t>
-            </a:r>
-            <a:br>
-              <a:rPr lang="en-US" dirty="0">
-                <a:solidFill>
-                  <a:schemeClr val="tx1"/>
-                </a:solidFill>
-                <a:latin typeface="Segoe UI" panose="020B0502040204020203" pitchFamily="34" charset="0"/>
-              </a:rPr>
-            </a:br>
-            <a:endParaRPr lang="en-US" sz="3236" dirty="0">
-              <a:solidFill>
-                <a:schemeClr val="tx1"/>
-              </a:solidFill>
-              <a:latin typeface="Segoe UI" panose="020B0502040204020203" pitchFamily="34" charset="0"/>
-            </a:endParaRPr>
-          </a:p>
-        </p:txBody>
-      </p:sp>
-      <p:sp>
-        <p:nvSpPr>
-          <p:cNvPr id="3" name="Content Placeholder 2"/>
-          <p:cNvSpPr>
-            <a:spLocks noGrp="1"/>
-          </p:cNvSpPr>
-          <p:nvPr>
-            <p:ph type="body" sz="quarter" idx="10"/>
-          </p:nvPr>
-        </p:nvSpPr>
-        <p:spPr>
-          <a:xfrm>
-            <a:off x="269240" y="1189177"/>
-            <a:ext cx="7522370" cy="5449828"/>
-          </a:xfrm>
-        </p:spPr>
-        <p:txBody>
-          <a:bodyPr>
-            <a:normAutofit/>
-          </a:bodyPr>
-          <a:lstStyle/>
-          <a:p>
-            <a:r>
-              <a:rPr lang="en-US" sz="2800" dirty="0">
-                <a:solidFill>
-                  <a:schemeClr val="tx1"/>
-                </a:solidFill>
-                <a:latin typeface="+mj-lt"/>
-              </a:rPr>
-              <a:t>Wide World Importers (WWI) has hundreds of brick and mortar stores. </a:t>
-            </a:r>
-            <a:r>
-              <a:rPr lang="en-US" sz="2800" dirty="0">
-                <a:solidFill>
-                  <a:schemeClr val="tx1"/>
-                </a:solidFill>
-              </a:rPr>
-              <a:t>Over their years of operation, they have amassed large amounts of historical data stored in disparate systems.</a:t>
-            </a:r>
-          </a:p>
-          <a:p>
-            <a:pPr marL="0" indent="0">
-              <a:buNone/>
-            </a:pPr>
-            <a:r>
-              <a:rPr lang="en-US" sz="2800" dirty="0">
-                <a:solidFill>
-                  <a:schemeClr val="tx1"/>
-                </a:solidFill>
-              </a:rPr>
-              <a:t> </a:t>
-            </a:r>
-          </a:p>
-          <a:p>
-            <a:r>
-              <a:rPr lang="en-US" sz="2800" dirty="0">
-                <a:solidFill>
-                  <a:schemeClr val="tx1"/>
-                </a:solidFill>
-              </a:rPr>
-              <a:t>They wish to combine their historic data and tie it together with near real-time data streams to produce dashboard KPIs and machine learning models that enable them to make informed up to the minute decisions.</a:t>
-            </a:r>
-            <a:endParaRPr lang="en-US" sz="2800" dirty="0">
-              <a:solidFill>
-                <a:schemeClr val="tx1"/>
-              </a:solidFill>
-              <a:latin typeface="Segoe UI Semilight" panose="020B0402040204020203" pitchFamily="34" charset="0"/>
-              <a:cs typeface="Segoe UI Semilight" panose="020B0402040204020203" pitchFamily="34" charset="0"/>
-            </a:endParaRPr>
-          </a:p>
-          <a:p>
-            <a:pPr marL="0" indent="0">
-              <a:spcAft>
-                <a:spcPts val="882"/>
-              </a:spcAft>
-              <a:buNone/>
-            </a:pPr>
-            <a:endParaRPr lang="en-US" sz="2800" dirty="0">
-              <a:solidFill>
-                <a:schemeClr val="tx1"/>
-              </a:solidFill>
-            </a:endParaRPr>
-          </a:p>
-        </p:txBody>
-      </p:sp>
-      <p:pic>
-        <p:nvPicPr>
-          <p:cNvPr id="4" name="Picture 3" descr="Logo of Wide World Importers.">
-            <a:extLst>
-              <a:ext uri="{FF2B5EF4-FFF2-40B4-BE49-F238E27FC236}">
-                <a16:creationId xmlns:a16="http://schemas.microsoft.com/office/drawing/2014/main" id="{83CC0415-C07A-484F-A129-46775733BBF1}"/>
-              </a:ext>
-            </a:extLst>
-          </p:cNvPr>
-          <p:cNvPicPr>
-            <a:picLocks noChangeAspect="1"/>
-          </p:cNvPicPr>
-          <p:nvPr/>
-        </p:nvPicPr>
-        <p:blipFill>
-          <a:blip r:embed="rId3"/>
-          <a:stretch>
-            <a:fillRect/>
-          </a:stretch>
-        </p:blipFill>
-        <p:spPr>
-          <a:xfrm>
-            <a:off x="7740542" y="1350084"/>
-            <a:ext cx="4182218" cy="4157832"/>
-          </a:xfrm>
-          <a:prstGeom prst="rect">
-            <a:avLst/>
-          </a:prstGeom>
-        </p:spPr>
-      </p:pic>
-    </p:spTree>
-    <p:extLst>
-      <p:ext uri="{BB962C8B-B14F-4D97-AF65-F5344CB8AC3E}">
-        <p14:creationId xmlns:p14="http://schemas.microsoft.com/office/powerpoint/2010/main" val="3429127010"/>
-      </p:ext>
-    </p:extLst>
-  </p:cSld>
-  <p:clrMapOvr>
-    <a:masterClrMapping/>
-  </p:clrMapOvr>
-  <mc:AlternateContent xmlns:mc="http://schemas.openxmlformats.org/markup-compatibility/2006" xmlns:p14="http://schemas.microsoft.com/office/powerpoint/2010/main">
-    <mc:Choice Requires="p14">
-      <p:transition p14:dur="0"/>
-    </mc:Choice>
-    <mc:Fallback xmlns="">
-      <p:transition/>
     </mc:Fallback>
   </mc:AlternateContent>
 </p:sld>
@@ -26735,7 +28190,50 @@
                   <a:schemeClr val="tx1"/>
                 </a:solidFill>
               </a:rPr>
-              <a:t>They need a solution that allows them to query across and analyze the data from all these sources. Regardless of volume, they want these queries to return in seconds.</a:t>
+              <a:t>They need a solution that allows them to discover, integrate, query across and analyze the data from all these sources. Regardless of volume, they want these queries to return in seconds.</a:t>
+            </a:r>
+          </a:p>
+          <a:p>
+            <a:pPr marL="0" indent="0">
+              <a:lnSpc>
+                <a:spcPct val="100000"/>
+              </a:lnSpc>
+              <a:buNone/>
+            </a:pPr>
+            <a:endParaRPr lang="en-US" sz="1600" dirty="0">
+              <a:solidFill>
+                <a:schemeClr val="tx1"/>
+              </a:solidFill>
+            </a:endParaRPr>
+          </a:p>
+          <a:p>
+            <a:pPr>
+              <a:lnSpc>
+                <a:spcPct val="100000"/>
+              </a:lnSpc>
+            </a:pPr>
+            <a:r>
+              <a:rPr lang="en-US" sz="2800" dirty="0">
+                <a:solidFill>
+                  <a:schemeClr val="tx1"/>
+                </a:solidFill>
+              </a:rPr>
+              <a:t>They worry that their current catalog might be missing </a:t>
+            </a:r>
+            <a:br>
+              <a:rPr lang="en-US" sz="2800" dirty="0">
+                <a:solidFill>
+                  <a:schemeClr val="tx1"/>
+                </a:solidFill>
+              </a:rPr>
+            </a:br>
+            <a:r>
+              <a:rPr lang="en-US" sz="2800" dirty="0">
+                <a:solidFill>
+                  <a:schemeClr val="tx1"/>
+                </a:solidFill>
+              </a:rPr>
+              <a:t>some internal data sets used by smaller departments. </a:t>
             </a:r>
           </a:p>
           <a:p>
@@ -26767,7 +28265,7 @@
         </p:nvGrpSpPr>
         <p:grpSpPr>
           <a:xfrm>
-            <a:off x="9713976" y="4380437"/>
+            <a:off x="9810795" y="4272860"/>
             <a:ext cx="2478024" cy="2478024"/>
             <a:chOff x="9713976" y="4380437"/>
             <a:chExt cx="2478024" cy="2478024"/>
@@ -28397,15 +29895,6 @@
 </file>
 
 <file path=customXml/item1.xml><?xml version="1.0" encoding="utf-8"?>
-<p:properties xmlns:p="http://schemas.microsoft.com/office/2006/metadata/properties" xmlns:xsi="http://www.w3.org/2001/XMLSchema-instance" xmlns:pc="http://schemas.microsoft.com/office/infopath/2007/PartnerControls">
-  <documentManagement>
-    <_ip_UnifiedCompliancePolicyUIAction xmlns="http://schemas.microsoft.com/sharepoint/v3" xsi:nil="true"/>
-    <_ip_UnifiedCompliancePolicyProperties xmlns="http://schemas.microsoft.com/sharepoint/v3" xsi:nil="true"/>
-  </documentManagement>
-</p:properties>
-</file>
-
-<file path=customXml/item2.xml><?xml version="1.0" encoding="utf-8"?>
 <ct:contentTypeSchema xmlns:ct="http://schemas.microsoft.com/office/2006/metadata/contentType" xmlns:ma="http://schemas.microsoft.com/office/2006/metadata/properties/metaAttributes" ct:_="" ma:_="" ma:contentTypeName="Document" ma:contentTypeID="0x010100D15DFA3690A15B4081582BBCC6BEAC3E" ma:contentTypeVersion="9" ma:contentTypeDescription="Create a new document." ma:contentTypeScope="" ma:versionID="642da1784587cbe85a7fdbbe4dc36103">
   <xsd:schema xmlns:xsd="http://www.w3.org/2001/XMLSchema" xmlns:xs="http://www.w3.org/2001/XMLSchema" xmlns:p="http://schemas.microsoft.com/office/2006/metadata/properties" xmlns:ns1="http://schemas.microsoft.com/sharepoint/v3" xmlns:ns2="2023ac63-7b75-4916-a9ee-591457758eee" xmlns:ns3="d9c797ad-d7c3-4982-82b7-81352a75e4a5" targetNamespace="http://schemas.microsoft.com/office/2006/metadata/properties" ma:root="true" ma:fieldsID="91198b0246576053cc55dd2c67035a89" ns1:_="" ns2:_="" ns3:_="">
     <xsd:import namespace="http://schemas.microsoft.com/sharepoint/v3"/>
@@ -28607,6 +30096,15 @@
 </ct:contentTypeSchema>
 </file>
 
+<file path=customXml/item2.xml><?xml version="1.0" encoding="utf-8"?>
+<p:properties xmlns:p="http://schemas.microsoft.com/office/2006/metadata/properties" xmlns:xsi="http://www.w3.org/2001/XMLSchema-instance" xmlns:pc="http://schemas.microsoft.com/office/infopath/2007/PartnerControls">
+  <documentManagement>
+    <_ip_UnifiedCompliancePolicyUIAction xmlns="http://schemas.microsoft.com/sharepoint/v3" xsi:nil="true"/>
+    <_ip_UnifiedCompliancePolicyProperties xmlns="http://schemas.microsoft.com/sharepoint/v3" xsi:nil="true"/>
+  </documentManagement>
+</p:properties>
+</file>
+
 <file path=customXml/item3.xml><?xml version="1.0" encoding="utf-8"?>
 <?mso-contentType ?>
 <FormTemplates xmlns="http://schemas.microsoft.com/sharepoint/v3/contenttype/forms">
@@ -28617,24 +30115,6 @@
 </file>
 
 <file path=customXml/itemProps1.xml><?xml version="1.0" encoding="utf-8"?>
-<ds:datastoreItem xmlns:ds="http://schemas.openxmlformats.org/officeDocument/2006/customXml" ds:itemID="{BAF7D529-36AB-45DA-B239-2F912F2D1610}">
-  <ds:schemaRefs>
-    <ds:schemaRef ds:uri="http://schemas.microsoft.com/office/2006/documentManagement/types"/>
-    <ds:schemaRef ds:uri="http://schemas.microsoft.com/office/infopath/2007/PartnerControls"/>
-    <ds:schemaRef ds:uri="2023ac63-7b75-4916-a9ee-591457758eee"/>
-    <ds:schemaRef ds:uri="http://purl.org/dc/elements/1.1/"/>
-    <ds:schemaRef ds:uri="http://schemas.microsoft.com/office/2006/metadata/properties"/>
-    <ds:schemaRef ds:uri="http://schemas.microsoft.com/sharepoint/v3"/>
-    <ds:schemaRef ds:uri="http://purl.org/dc/terms/"/>
-    <ds:schemaRef ds:uri="http://schemas.openxmlformats.org/package/2006/metadata/core-properties"/>
-    <ds:schemaRef ds:uri="d9c797ad-d7c3-4982-82b7-81352a75e4a5"/>
-    <ds:schemaRef ds:uri="http://www.w3.org/XML/1998/namespace"/>
-    <ds:schemaRef ds:uri="http://purl.org/dc/dcmitype/"/>
-  </ds:schemaRefs>
-</ds:datastoreItem>
-</file>
-
-<file path=customXml/itemProps2.xml><?xml version="1.0" encoding="utf-8"?>
 <ds:datastoreItem xmlns:ds="http://schemas.openxmlformats.org/officeDocument/2006/customXml" ds:itemID="{255F5BEB-6AD6-480A-8556-C80C5EBC10F2}">
   <ds:schemaRefs>
     <ds:schemaRef ds:uri="http://schemas.microsoft.com/office/2006/metadata/contentType"/>
@@ -28654,6 +30134,24 @@
 </ds:datastoreItem>
 </file>
 
+<file path=customXml/itemProps2.xml><?xml version="1.0" encoding="utf-8"?>
+<ds:datastoreItem xmlns:ds="http://schemas.openxmlformats.org/officeDocument/2006/customXml" ds:itemID="{BAF7D529-36AB-45DA-B239-2F912F2D1610}">
+  <ds:schemaRefs>
+    <ds:schemaRef ds:uri="http://schemas.microsoft.com/sharepoint/v3"/>
+    <ds:schemaRef ds:uri="http://purl.org/dc/terms/"/>
+    <ds:schemaRef ds:uri="http://schemas.openxmlformats.org/package/2006/metadata/core-properties"/>
+    <ds:schemaRef ds:uri="http://purl.org/dc/dcmitype/"/>
+    <ds:schemaRef ds:uri="http://schemas.microsoft.com/office/infopath/2007/PartnerControls"/>
+    <ds:schemaRef ds:uri="2023ac63-7b75-4916-a9ee-591457758eee"/>
+    <ds:schemaRef ds:uri="http://purl.org/dc/elements/1.1/"/>
+    <ds:schemaRef ds:uri="http://schemas.microsoft.com/office/2006/metadata/properties"/>
+    <ds:schemaRef ds:uri="http://schemas.microsoft.com/office/2006/documentManagement/types"/>
+    <ds:schemaRef ds:uri="d9c797ad-d7c3-4982-82b7-81352a75e4a5"/>
+    <ds:schemaRef ds:uri="http://www.w3.org/XML/1998/namespace"/>
+  </ds:schemaRefs>
+</ds:datastoreItem>
+</file>
+
 <file path=customXml/itemProps3.xml><?xml version="1.0" encoding="utf-8"?>
 <ds:datastoreItem xmlns:ds="http://schemas.openxmlformats.org/officeDocument/2006/customXml" ds:itemID="{F18501AF-04CF-4482-BAE1-607B49DDC378}">
   <ds:schemaRefs>

</xml_diff>

<commit_message>
updated infographic with Azure Purview and added requested links to the Additional References
</commit_message>
<xml_diff>
--- a/Whiteboard design session/WDS trainer presentation - Azure Synapse Analytics and AI.pptx
+++ b/Whiteboard design session/WDS trainer presentation - Azure Synapse Analytics and AI.pptx
@@ -238,7 +238,7 @@
           <a:p>
             <a:fld id="{52A13B17-C506-4D51-BB37-16B365906619}" type="datetimeFigureOut">
               <a:rPr lang="en-US" smtClean="0"/>
-              <a:t>2021-06-09</a:t>
+              <a:t>6/24/2021</a:t>
             </a:fld>
             <a:endParaRPr lang="en-US" dirty="0"/>
           </a:p>
@@ -8454,7 +8454,7 @@
                   <a:prstClr val="black"/>
                 </a:solidFill>
               </a:rPr>
-              <a:t>2021-06-09 4:10 PM</a:t>
+              <a:t>6/24/2021 12:01 AM</a:t>
             </a:fld>
             <a:endParaRPr lang="en-US" dirty="0">
               <a:solidFill>
@@ -21957,146 +21957,42 @@
           </a:p>
         </p:txBody>
       </p:sp>
-      <p:grpSp>
-        <p:nvGrpSpPr>
-          <p:cNvPr id="3" name="Group 2" descr="Overview of Azure Synapse Analytics features and capabilities. Showing how one solution provides the user experience with Azure Synapse Studio, a platform for processing data with SQL and Spark, and integrated management of the data lake.">
+      <p:pic>
+        <p:nvPicPr>
+          <p:cNvPr id="6" name="Picture 5" descr="Overview of Azure Synapse Analytics features and capabilities. Showing how one solution provides the user experience with Azure Synapse Studio, a platform for processing data with SQL and Spark, and integrated management of the data lake.">
             <a:extLst>
               <a:ext uri="{FF2B5EF4-FFF2-40B4-BE49-F238E27FC236}">
-                <a16:creationId xmlns:a16="http://schemas.microsoft.com/office/drawing/2014/main" id="{E07992A7-5540-4CDF-A9D7-7AA04E492CA4}"/>
+                <a16:creationId xmlns:a16="http://schemas.microsoft.com/office/drawing/2014/main" id="{02D28FF3-0B75-413B-895E-7A2AFCCDFD15}"/>
               </a:ext>
             </a:extLst>
           </p:cNvPr>
-          <p:cNvGrpSpPr/>
+          <p:cNvPicPr>
+            <a:picLocks noChangeAspect="1"/>
+          </p:cNvPicPr>
           <p:nvPr/>
-        </p:nvGrpSpPr>
-        <p:grpSpPr>
+        </p:nvPicPr>
+        <p:blipFill>
+          <a:blip r:embed="rId3" cstate="print">
+            <a:extLst>
+              <a:ext uri="{28A0092B-C50C-407E-A947-70E740481C1C}">
+                <a14:useLocalDpi xmlns:a14="http://schemas.microsoft.com/office/drawing/2010/main" val="0"/>
+              </a:ext>
+            </a:extLst>
+          </a:blip>
+          <a:stretch>
+            <a:fillRect/>
+          </a:stretch>
+        </p:blipFill>
+        <p:spPr>
           <a:xfrm>
-            <a:off x="1" y="1189176"/>
-            <a:ext cx="12192000" cy="5668824"/>
-            <a:chOff x="1" y="1189176"/>
-            <a:chExt cx="12192000" cy="5668824"/>
+            <a:off x="990193" y="990600"/>
+            <a:ext cx="10211614" cy="5616388"/>
           </a:xfrm>
-        </p:grpSpPr>
-        <p:sp>
-          <p:nvSpPr>
-            <p:cNvPr id="4" name="Rectangle 3">
-              <a:extLst>
-                <a:ext uri="{FF2B5EF4-FFF2-40B4-BE49-F238E27FC236}">
-                  <a16:creationId xmlns:a16="http://schemas.microsoft.com/office/drawing/2014/main" id="{BD0DAD16-AFCC-45A6-892B-377B1A0378CC}"/>
-                </a:ext>
-              </a:extLst>
-            </p:cNvPr>
-            <p:cNvSpPr/>
-            <p:nvPr/>
-          </p:nvSpPr>
-          <p:spPr bwMode="auto">
-            <a:xfrm>
-              <a:off x="1" y="1189176"/>
-              <a:ext cx="12192000" cy="5668824"/>
-            </a:xfrm>
-            <a:prstGeom prst="rect">
-              <a:avLst/>
-            </a:prstGeom>
-            <a:solidFill>
-              <a:schemeClr val="tx1"/>
-            </a:solidFill>
-            <a:ln>
-              <a:solidFill>
-                <a:schemeClr val="tx1"/>
-              </a:solidFill>
-              <a:headEnd type="none" w="med" len="med"/>
-              <a:tailEnd type="none" w="med" len="med"/>
-            </a:ln>
-            <a:effectLst/>
-          </p:spPr>
-          <p:style>
-            <a:lnRef idx="1">
-              <a:schemeClr val="accent2"/>
-            </a:lnRef>
-            <a:fillRef idx="3">
-              <a:schemeClr val="accent2"/>
-            </a:fillRef>
-            <a:effectRef idx="2">
-              <a:schemeClr val="accent2"/>
-            </a:effectRef>
-            <a:fontRef idx="minor">
-              <a:schemeClr val="lt1"/>
-            </a:fontRef>
-          </p:style>
-          <p:txBody>
-            <a:bodyPr rot="0" spcFirstLastPara="0" vertOverflow="overflow" horzOverflow="overflow" vert="horz" wrap="square" lIns="182880" tIns="146304" rIns="182880" bIns="146304" numCol="1" spcCol="0" rtlCol="0" fromWordArt="0" anchor="t" anchorCtr="0" forceAA="0" compatLnSpc="1">
-              <a:prstTxWarp prst="textNoShape">
-                <a:avLst/>
-              </a:prstTxWarp>
-              <a:noAutofit/>
-            </a:bodyPr>
-            <a:lstStyle/>
-            <a:p>
-              <a:pPr algn="ctr" defTabSz="932472" fontAlgn="base">
-                <a:lnSpc>
-                  <a:spcPct val="90000"/>
-                </a:lnSpc>
-                <a:spcBef>
-                  <a:spcPct val="0"/>
-                </a:spcBef>
-                <a:spcAft>
-                  <a:spcPct val="0"/>
-                </a:spcAft>
-              </a:pPr>
-              <a:endParaRPr lang="en-US" sz="2400" dirty="0" err="1">
-                <a:gradFill>
-                  <a:gsLst>
-                    <a:gs pos="0">
-                      <a:srgbClr val="FFFFFF"/>
-                    </a:gs>
-                    <a:gs pos="100000">
-                      <a:srgbClr val="FFFFFF"/>
-                    </a:gs>
-                  </a:gsLst>
-                  <a:lin ang="5400000" scaled="0"/>
-                </a:gradFill>
-                <a:ea typeface="Segoe UI" pitchFamily="34" charset="0"/>
-                <a:cs typeface="Segoe UI" pitchFamily="34" charset="0"/>
-              </a:endParaRPr>
-            </a:p>
-          </p:txBody>
-        </p:sp>
-        <p:pic>
-          <p:nvPicPr>
-            <p:cNvPr id="7" name="Picture 6" descr="Overview of Azure Synapse Analytics features and capabilities. Showing how one solution provides the user experience with Azure Synapse Studio, a platform for processing data with SQL and Spark, and integrated management of the data lake.">
-              <a:extLst>
-                <a:ext uri="{FF2B5EF4-FFF2-40B4-BE49-F238E27FC236}">
-                  <a16:creationId xmlns:a16="http://schemas.microsoft.com/office/drawing/2014/main" id="{F7761FDD-1C22-494C-B895-4A02D9FDBEC0}"/>
-                </a:ext>
-              </a:extLst>
-            </p:cNvPr>
-            <p:cNvPicPr>
-              <a:picLocks noChangeAspect="1"/>
-            </p:cNvPicPr>
-            <p:nvPr/>
-          </p:nvPicPr>
-          <p:blipFill>
-            <a:blip r:embed="rId3">
-              <a:extLst>
-                <a:ext uri="{28A0092B-C50C-407E-A947-70E740481C1C}">
-                  <a14:useLocalDpi xmlns:a14="http://schemas.microsoft.com/office/drawing/2010/main" val="0"/>
-                </a:ext>
-              </a:extLst>
-            </a:blip>
-            <a:srcRect/>
-            <a:stretch/>
-          </p:blipFill>
-          <p:spPr>
-            <a:xfrm>
-              <a:off x="964962" y="1422475"/>
-              <a:ext cx="10262076" cy="5202226"/>
-            </a:xfrm>
-            <a:prstGeom prst="rect">
-              <a:avLst/>
-            </a:prstGeom>
-          </p:spPr>
-        </p:pic>
-      </p:grpSp>
+          <a:prstGeom prst="rect">
+            <a:avLst/>
+          </a:prstGeom>
+        </p:spPr>
+      </p:pic>
     </p:spTree>
     <p:extLst>
       <p:ext uri="{BB962C8B-B14F-4D97-AF65-F5344CB8AC3E}">
@@ -29895,6 +29791,15 @@
 </file>
 
 <file path=customXml/item1.xml><?xml version="1.0" encoding="utf-8"?>
+<p:properties xmlns:p="http://schemas.microsoft.com/office/2006/metadata/properties" xmlns:xsi="http://www.w3.org/2001/XMLSchema-instance" xmlns:pc="http://schemas.microsoft.com/office/infopath/2007/PartnerControls">
+  <documentManagement>
+    <_ip_UnifiedCompliancePolicyUIAction xmlns="http://schemas.microsoft.com/sharepoint/v3" xsi:nil="true"/>
+    <_ip_UnifiedCompliancePolicyProperties xmlns="http://schemas.microsoft.com/sharepoint/v3" xsi:nil="true"/>
+  </documentManagement>
+</p:properties>
+</file>
+
+<file path=customXml/item2.xml><?xml version="1.0" encoding="utf-8"?>
 <ct:contentTypeSchema xmlns:ct="http://schemas.microsoft.com/office/2006/metadata/contentType" xmlns:ma="http://schemas.microsoft.com/office/2006/metadata/properties/metaAttributes" ct:_="" ma:_="" ma:contentTypeName="Document" ma:contentTypeID="0x010100D15DFA3690A15B4081582BBCC6BEAC3E" ma:contentTypeVersion="9" ma:contentTypeDescription="Create a new document." ma:contentTypeScope="" ma:versionID="642da1784587cbe85a7fdbbe4dc36103">
   <xsd:schema xmlns:xsd="http://www.w3.org/2001/XMLSchema" xmlns:xs="http://www.w3.org/2001/XMLSchema" xmlns:p="http://schemas.microsoft.com/office/2006/metadata/properties" xmlns:ns1="http://schemas.microsoft.com/sharepoint/v3" xmlns:ns2="2023ac63-7b75-4916-a9ee-591457758eee" xmlns:ns3="d9c797ad-d7c3-4982-82b7-81352a75e4a5" targetNamespace="http://schemas.microsoft.com/office/2006/metadata/properties" ma:root="true" ma:fieldsID="91198b0246576053cc55dd2c67035a89" ns1:_="" ns2:_="" ns3:_="">
     <xsd:import namespace="http://schemas.microsoft.com/sharepoint/v3"/>
@@ -30096,15 +30001,6 @@
 </ct:contentTypeSchema>
 </file>
 
-<file path=customXml/item2.xml><?xml version="1.0" encoding="utf-8"?>
-<p:properties xmlns:p="http://schemas.microsoft.com/office/2006/metadata/properties" xmlns:xsi="http://www.w3.org/2001/XMLSchema-instance" xmlns:pc="http://schemas.microsoft.com/office/infopath/2007/PartnerControls">
-  <documentManagement>
-    <_ip_UnifiedCompliancePolicyUIAction xmlns="http://schemas.microsoft.com/sharepoint/v3" xsi:nil="true"/>
-    <_ip_UnifiedCompliancePolicyProperties xmlns="http://schemas.microsoft.com/sharepoint/v3" xsi:nil="true"/>
-  </documentManagement>
-</p:properties>
-</file>
-
 <file path=customXml/item3.xml><?xml version="1.0" encoding="utf-8"?>
 <?mso-contentType ?>
 <FormTemplates xmlns="http://schemas.microsoft.com/sharepoint/v3/contenttype/forms">
@@ -30115,6 +30011,24 @@
 </file>
 
 <file path=customXml/itemProps1.xml><?xml version="1.0" encoding="utf-8"?>
+<ds:datastoreItem xmlns:ds="http://schemas.openxmlformats.org/officeDocument/2006/customXml" ds:itemID="{BAF7D529-36AB-45DA-B239-2F912F2D1610}">
+  <ds:schemaRefs>
+    <ds:schemaRef ds:uri="http://schemas.microsoft.com/sharepoint/v3"/>
+    <ds:schemaRef ds:uri="http://purl.org/dc/terms/"/>
+    <ds:schemaRef ds:uri="http://schemas.openxmlformats.org/package/2006/metadata/core-properties"/>
+    <ds:schemaRef ds:uri="http://purl.org/dc/dcmitype/"/>
+    <ds:schemaRef ds:uri="http://schemas.microsoft.com/office/infopath/2007/PartnerControls"/>
+    <ds:schemaRef ds:uri="2023ac63-7b75-4916-a9ee-591457758eee"/>
+    <ds:schemaRef ds:uri="http://purl.org/dc/elements/1.1/"/>
+    <ds:schemaRef ds:uri="http://schemas.microsoft.com/office/2006/metadata/properties"/>
+    <ds:schemaRef ds:uri="http://schemas.microsoft.com/office/2006/documentManagement/types"/>
+    <ds:schemaRef ds:uri="d9c797ad-d7c3-4982-82b7-81352a75e4a5"/>
+    <ds:schemaRef ds:uri="http://www.w3.org/XML/1998/namespace"/>
+  </ds:schemaRefs>
+</ds:datastoreItem>
+</file>
+
+<file path=customXml/itemProps2.xml><?xml version="1.0" encoding="utf-8"?>
 <ds:datastoreItem xmlns:ds="http://schemas.openxmlformats.org/officeDocument/2006/customXml" ds:itemID="{255F5BEB-6AD6-480A-8556-C80C5EBC10F2}">
   <ds:schemaRefs>
     <ds:schemaRef ds:uri="http://schemas.microsoft.com/office/2006/metadata/contentType"/>
@@ -30134,24 +30048,6 @@
 </ds:datastoreItem>
 </file>
 
-<file path=customXml/itemProps2.xml><?xml version="1.0" encoding="utf-8"?>
-<ds:datastoreItem xmlns:ds="http://schemas.openxmlformats.org/officeDocument/2006/customXml" ds:itemID="{BAF7D529-36AB-45DA-B239-2F912F2D1610}">
-  <ds:schemaRefs>
-    <ds:schemaRef ds:uri="http://schemas.microsoft.com/sharepoint/v3"/>
-    <ds:schemaRef ds:uri="http://purl.org/dc/terms/"/>
-    <ds:schemaRef ds:uri="http://schemas.openxmlformats.org/package/2006/metadata/core-properties"/>
-    <ds:schemaRef ds:uri="http://purl.org/dc/dcmitype/"/>
-    <ds:schemaRef ds:uri="http://schemas.microsoft.com/office/infopath/2007/PartnerControls"/>
-    <ds:schemaRef ds:uri="2023ac63-7b75-4916-a9ee-591457758eee"/>
-    <ds:schemaRef ds:uri="http://purl.org/dc/elements/1.1/"/>
-    <ds:schemaRef ds:uri="http://schemas.microsoft.com/office/2006/metadata/properties"/>
-    <ds:schemaRef ds:uri="http://schemas.microsoft.com/office/2006/documentManagement/types"/>
-    <ds:schemaRef ds:uri="d9c797ad-d7c3-4982-82b7-81352a75e4a5"/>
-    <ds:schemaRef ds:uri="http://www.w3.org/XML/1998/namespace"/>
-  </ds:schemaRefs>
-</ds:datastoreItem>
-</file>
-
 <file path=customXml/itemProps3.xml><?xml version="1.0" encoding="utf-8"?>
 <ds:datastoreItem xmlns:ds="http://schemas.openxmlformats.org/officeDocument/2006/customXml" ds:itemID="{F18501AF-04CF-4482-BAE1-607B49DDC378}">
   <ds:schemaRefs>

</xml_diff>